<commit_message>
tussentijdse stuff en pomp in solid edge
</commit_message>
<xml_diff>
--- a/Tussentijdse Presentatie .pptx
+++ b/Tussentijdse Presentatie .pptx
@@ -25,17 +25,17 @@
     <p:sldId id="273" r:id="rId13"/>
     <p:sldId id="277" r:id="rId14"/>
     <p:sldId id="274" r:id="rId15"/>
-    <p:sldId id="275" r:id="rId16"/>
-    <p:sldId id="278" r:id="rId17"/>
-    <p:sldId id="276" r:id="rId18"/>
-    <p:sldId id="279" r:id="rId19"/>
-    <p:sldId id="280" r:id="rId20"/>
-    <p:sldId id="281" r:id="rId21"/>
-    <p:sldId id="282" r:id="rId22"/>
-    <p:sldId id="283" r:id="rId23"/>
-    <p:sldId id="284" r:id="rId24"/>
-    <p:sldId id="285" r:id="rId25"/>
-    <p:sldId id="286" r:id="rId26"/>
+    <p:sldId id="278" r:id="rId16"/>
+    <p:sldId id="276" r:id="rId17"/>
+    <p:sldId id="279" r:id="rId18"/>
+    <p:sldId id="280" r:id="rId19"/>
+    <p:sldId id="281" r:id="rId20"/>
+    <p:sldId id="283" r:id="rId21"/>
+    <p:sldId id="292" r:id="rId22"/>
+    <p:sldId id="294" r:id="rId23"/>
+    <p:sldId id="285" r:id="rId24"/>
+    <p:sldId id="286" r:id="rId25"/>
+    <p:sldId id="291" r:id="rId26"/>
     <p:sldId id="287" r:id="rId27"/>
     <p:sldId id="288" r:id="rId28"/>
     <p:sldId id="267" r:id="rId29"/>
@@ -152,7 +152,7 @@
 <file path=ppt/revisionInfo.xml><?xml version="1.0" encoding="utf-8"?>
 <p1510:revInfo xmlns:a="http://schemas.openxmlformats.org/drawingml/2006/main" xmlns:r="http://schemas.openxmlformats.org/officeDocument/2006/relationships" xmlns:p1510="http://schemas.microsoft.com/office/powerpoint/2015/10/main">
   <p1510:revLst>
-    <p1510:client id="{34871B9E-C324-4A34-85B1-28ED0E9916F7}" v="15" dt="2023-03-17T16:20:59.113"/>
+    <p1510:client id="{34871B9E-C324-4A34-85B1-28ED0E9916F7}" v="20" dt="2023-03-24T10:54:14.998"/>
   </p1510:revLst>
 </p1510:revInfo>
 </file>
@@ -239,7 +239,7 @@
           <a:p>
             <a:fld id="{8F591CCF-F6FD-734B-854A-5BC033593B1E}" type="datetimeFigureOut">
               <a:rPr lang="nl-NL" smtClean="0"/>
-              <a:t>17-3-2023</a:t>
+              <a:t>24-3-2023</a:t>
             </a:fld>
             <a:endParaRPr lang="nl-NL"/>
           </a:p>
@@ -404,7 +404,7 @@
           <a:p>
             <a:fld id="{23C66214-DB21-4647-B5DA-0D17CA592867}" type="datetimeFigureOut">
               <a:rPr lang="nl-NL" smtClean="0"/>
-              <a:t>17-3-2023</a:t>
+              <a:t>24-3-2023</a:t>
             </a:fld>
             <a:endParaRPr lang="nl-NL"/>
           </a:p>
@@ -1393,7 +1393,7 @@
           <a:p>
             <a:fld id="{CD8EC345-7FB1-4DDD-8C99-610F4A0CCD77}" type="datetime1">
               <a:rPr lang="nl-BE" smtClean="0"/>
-              <a:t>17/03/2023</a:t>
+              <a:t>24/03/2023</a:t>
             </a:fld>
             <a:endParaRPr lang="nl-NL"/>
           </a:p>
@@ -1676,7 +1676,7 @@
           <a:p>
             <a:fld id="{5487CBB6-2126-41A6-B9B2-1B3E58B7F358}" type="datetime1">
               <a:rPr lang="nl-BE" smtClean="0"/>
-              <a:t>17/03/2023</a:t>
+              <a:t>24/03/2023</a:t>
             </a:fld>
             <a:endParaRPr lang="nl-NL"/>
           </a:p>
@@ -2006,7 +2006,7 @@
           <a:p>
             <a:fld id="{D7A24CD4-5DC9-4118-ABE7-2BE5EAE697B9}" type="datetime1">
               <a:rPr lang="nl-BE" smtClean="0"/>
-              <a:t>17/03/2023</a:t>
+              <a:t>24/03/2023</a:t>
             </a:fld>
             <a:endParaRPr lang="nl-NL"/>
           </a:p>
@@ -2326,7 +2326,7 @@
           <a:p>
             <a:fld id="{5971B238-6ABF-4361-91B6-4E2C76136EFE}" type="datetime1">
               <a:rPr lang="nl-BE" smtClean="0"/>
-              <a:t>17/03/2023</a:t>
+              <a:t>24/03/2023</a:t>
             </a:fld>
             <a:endParaRPr lang="nl-NL" dirty="0"/>
           </a:p>
@@ -2647,7 +2647,7 @@
           <a:p>
             <a:fld id="{7AC2E154-E327-4EA4-B2CC-E57A22EFC917}" type="datetime1">
               <a:rPr lang="nl-BE" smtClean="0"/>
-              <a:t>17/03/2023</a:t>
+              <a:t>24/03/2023</a:t>
             </a:fld>
             <a:endParaRPr lang="nl-NL" dirty="0"/>
           </a:p>
@@ -2789,7 +2789,7 @@
           <a:p>
             <a:fld id="{36FA22F4-6030-4BDD-AF0F-025C87B37A4C}" type="datetime1">
               <a:rPr lang="nl-BE" smtClean="0"/>
-              <a:t>17/03/2023</a:t>
+              <a:t>24/03/2023</a:t>
             </a:fld>
             <a:endParaRPr lang="nl-NL"/>
           </a:p>
@@ -3273,7 +3273,7 @@
           <a:p>
             <a:fld id="{72DCE82B-64D4-4473-A3B4-807D67EBE02B}" type="datetime1">
               <a:rPr lang="nl-BE" smtClean="0"/>
-              <a:t>17/03/2023</a:t>
+              <a:t>24/03/2023</a:t>
             </a:fld>
             <a:endParaRPr lang="nl-NL" dirty="0"/>
           </a:p>
@@ -3394,7 +3394,7 @@
           <a:p>
             <a:fld id="{AB4EBAB5-4286-46F6-A2F8-DF93B69E81D2}" type="datetime1">
               <a:rPr lang="nl-BE" smtClean="0"/>
-              <a:t>17/03/2023</a:t>
+              <a:t>24/03/2023</a:t>
             </a:fld>
             <a:endParaRPr lang="nl-NL"/>
           </a:p>
@@ -3515,7 +3515,7 @@
           <a:p>
             <a:fld id="{DE5B5EFD-5FA7-4ADA-A4C7-6863DCA9031A}" type="datetime1">
               <a:rPr lang="nl-BE" smtClean="0"/>
-              <a:t>17/03/2023</a:t>
+              <a:t>24/03/2023</a:t>
             </a:fld>
             <a:endParaRPr lang="nl-NL"/>
           </a:p>
@@ -3697,7 +3697,7 @@
           <a:p>
             <a:fld id="{61079889-0470-4CFB-95EE-15317261670A}" type="datetime1">
               <a:rPr lang="nl-BE" smtClean="0"/>
-              <a:t>17/03/2023</a:t>
+              <a:t>24/03/2023</a:t>
             </a:fld>
             <a:endParaRPr lang="nl-NL" dirty="0"/>
           </a:p>
@@ -3951,7 +3951,7 @@
           <a:p>
             <a:fld id="{ADC442C5-A06B-4C52-BB6E-6946CDC12E38}" type="datetime1">
               <a:rPr lang="nl-BE" smtClean="0"/>
-              <a:t>17/03/2023</a:t>
+              <a:t>24/03/2023</a:t>
             </a:fld>
             <a:endParaRPr lang="nl-NL" dirty="0"/>
           </a:p>
@@ -4592,7 +4592,7 @@
           <a:p>
             <a:fld id="{39D20C4C-7810-465D-8480-DA5686803D3E}" type="datetime1">
               <a:rPr lang="nl-BE" smtClean="0"/>
-              <a:t>17/03/2023</a:t>
+              <a:t>24/03/2023</a:t>
             </a:fld>
             <a:endParaRPr lang="nl-NL" dirty="0"/>
           </a:p>
@@ -6003,7 +6003,7 @@
           <a:p>
             <a:r>
               <a:rPr lang="nl-BE" dirty="0"/>
-              <a:t>USB Webcam 1080P</a:t>
+              <a:t>USB Webcam 1080P (laptop)</a:t>
             </a:r>
           </a:p>
         </p:txBody>
@@ -6029,8 +6029,56 @@
           <a:bodyPr/>
           <a:lstStyle/>
           <a:p>
+            <a:r>
+              <a:rPr lang="nl-BE" dirty="0"/>
+              <a:t>Draait mee met arm</a:t>
+            </a:r>
+          </a:p>
+          <a:p>
+            <a:r>
+              <a:rPr lang="nl-BE" dirty="0"/>
+              <a:t>Detecteert rode objecten</a:t>
+            </a:r>
+          </a:p>
+          <a:p>
+            <a:r>
+              <a:rPr lang="nl-BE" dirty="0"/>
+              <a:t>Stopt op rood voorwerp met hoek 0°</a:t>
+            </a:r>
+          </a:p>
+          <a:p>
+            <a:r>
+              <a:rPr lang="nl-BE" dirty="0"/>
+              <a:t>Berekent afstand tussen camera en voorwerp</a:t>
+            </a:r>
+          </a:p>
+          <a:p>
             <a:endParaRPr lang="nl-BE" dirty="0"/>
           </a:p>
+          <a:p>
+            <a:pPr marL="0" indent="0">
+              <a:buNone/>
+            </a:pPr>
+            <a:endParaRPr lang="nl-BE" dirty="0"/>
+          </a:p>
+          <a:p>
+            <a:endParaRPr lang="nl-BE" dirty="0"/>
+          </a:p>
+          <a:p>
+            <a:endParaRPr lang="en-GB" b="0" i="0" dirty="0">
+              <a:solidFill>
+                <a:srgbClr val="111111"/>
+              </a:solidFill>
+              <a:effectLst/>
+              <a:latin typeface="Arial" panose="020B0604020202020204" pitchFamily="34" charset="0"/>
+              <a:cs typeface="Arial" panose="020B0604020202020204" pitchFamily="34" charset="0"/>
+            </a:endParaRPr>
+          </a:p>
+          <a:p>
+            <a:endParaRPr lang="nl-BE" dirty="0">
+              <a:latin typeface="+mn-lt"/>
+            </a:endParaRPr>
+          </a:p>
         </p:txBody>
       </p:sp>
       <p:sp>
@@ -6079,7 +6127,14 @@
           <a:bodyPr/>
           <a:lstStyle/>
           <a:p>
-            <a:endParaRPr lang="nl-BE"/>
+            <a:r>
+              <a:rPr lang="nl-BE" dirty="0">
+                <a:highlight>
+                  <a:srgbClr val="FFFF00"/>
+                </a:highlight>
+              </a:rPr>
+              <a:t>Flowchart toevoegen</a:t>
+            </a:r>
           </a:p>
         </p:txBody>
       </p:sp>
@@ -6200,110 +6255,200 @@
       </p:grpSpPr>
       <p:sp>
         <p:nvSpPr>
-          <p:cNvPr id="2" name="Text Placeholder 1">
-            <a:extLst>
-              <a:ext uri="{FF2B5EF4-FFF2-40B4-BE49-F238E27FC236}">
-                <a16:creationId xmlns:a16="http://schemas.microsoft.com/office/drawing/2014/main" id="{336E6CAA-3293-D6E1-0A4D-0390048799A1}"/>
-              </a:ext>
-            </a:extLst>
-          </p:cNvPr>
-          <p:cNvSpPr>
-            <a:spLocks noGrp="1"/>
-          </p:cNvSpPr>
-          <p:nvPr>
-            <p:ph type="body" idx="1"/>
-          </p:nvPr>
-        </p:nvSpPr>
-        <p:spPr/>
-        <p:txBody>
-          <a:bodyPr/>
-          <a:lstStyle/>
-          <a:p>
-            <a:endParaRPr lang="nl-BE"/>
-          </a:p>
-        </p:txBody>
-      </p:sp>
-      <p:sp>
-        <p:nvSpPr>
-          <p:cNvPr id="3" name="Content Placeholder 2">
-            <a:extLst>
-              <a:ext uri="{FF2B5EF4-FFF2-40B4-BE49-F238E27FC236}">
-                <a16:creationId xmlns:a16="http://schemas.microsoft.com/office/drawing/2014/main" id="{C5BFDBFE-D3FE-1387-BA67-625EF384D01F}"/>
-              </a:ext>
-            </a:extLst>
-          </p:cNvPr>
-          <p:cNvSpPr>
-            <a:spLocks noGrp="1"/>
-          </p:cNvSpPr>
-          <p:nvPr>
-            <p:ph sz="half" idx="2"/>
-          </p:nvPr>
-        </p:nvSpPr>
-        <p:spPr/>
-        <p:txBody>
-          <a:bodyPr/>
-          <a:lstStyle/>
-          <a:p>
-            <a:endParaRPr lang="nl-BE"/>
-          </a:p>
-        </p:txBody>
-      </p:sp>
-      <p:sp>
-        <p:nvSpPr>
-          <p:cNvPr id="4" name="Text Placeholder 3">
-            <a:extLst>
-              <a:ext uri="{FF2B5EF4-FFF2-40B4-BE49-F238E27FC236}">
-                <a16:creationId xmlns:a16="http://schemas.microsoft.com/office/drawing/2014/main" id="{F24F0558-F00A-114C-6B48-D1838785020D}"/>
-              </a:ext>
-            </a:extLst>
-          </p:cNvPr>
-          <p:cNvSpPr>
-            <a:spLocks noGrp="1"/>
-          </p:cNvSpPr>
-          <p:nvPr>
-            <p:ph type="body" sz="quarter" idx="3"/>
-          </p:nvPr>
-        </p:nvSpPr>
-        <p:spPr/>
-        <p:txBody>
-          <a:bodyPr/>
-          <a:lstStyle/>
-          <a:p>
-            <a:endParaRPr lang="nl-BE"/>
-          </a:p>
-        </p:txBody>
-      </p:sp>
-      <p:sp>
-        <p:nvSpPr>
-          <p:cNvPr id="5" name="Content Placeholder 4">
-            <a:extLst>
-              <a:ext uri="{FF2B5EF4-FFF2-40B4-BE49-F238E27FC236}">
-                <a16:creationId xmlns:a16="http://schemas.microsoft.com/office/drawing/2014/main" id="{CB960163-4EDC-555E-AF0B-F213A853BF49}"/>
-              </a:ext>
-            </a:extLst>
-          </p:cNvPr>
-          <p:cNvSpPr>
-            <a:spLocks noGrp="1"/>
-          </p:cNvSpPr>
-          <p:nvPr>
-            <p:ph sz="quarter" idx="4"/>
-          </p:nvPr>
-        </p:nvSpPr>
-        <p:spPr/>
-        <p:txBody>
-          <a:bodyPr/>
-          <a:lstStyle/>
-          <a:p>
-            <a:endParaRPr lang="nl-BE"/>
-          </a:p>
-        </p:txBody>
-      </p:sp>
-      <p:sp>
-        <p:nvSpPr>
-          <p:cNvPr id="6" name="Footer Placeholder 5">
-            <a:extLst>
-              <a:ext uri="{FF2B5EF4-FFF2-40B4-BE49-F238E27FC236}">
-                <a16:creationId xmlns:a16="http://schemas.microsoft.com/office/drawing/2014/main" id="{082CD6E7-7BEB-43CA-BAC3-3583013C96E3}"/>
+          <p:cNvPr id="2" name="Content Placeholder 1">
+            <a:extLst>
+              <a:ext uri="{FF2B5EF4-FFF2-40B4-BE49-F238E27FC236}">
+                <a16:creationId xmlns:a16="http://schemas.microsoft.com/office/drawing/2014/main" id="{9572C954-C83C-EE79-685B-900385B3EC4B}"/>
+              </a:ext>
+            </a:extLst>
+          </p:cNvPr>
+          <p:cNvSpPr>
+            <a:spLocks noGrp="1"/>
+          </p:cNvSpPr>
+          <p:nvPr>
+            <p:ph idx="1"/>
+          </p:nvPr>
+        </p:nvSpPr>
+        <p:spPr>
+          <a:xfrm>
+            <a:off x="576000" y="1656000"/>
+            <a:ext cx="11041200" cy="4554000"/>
+          </a:xfrm>
+        </p:spPr>
+        <p:txBody>
+          <a:bodyPr>
+            <a:normAutofit lnSpcReduction="10000"/>
+          </a:bodyPr>
+          <a:lstStyle/>
+          <a:p>
+            <a:pPr marL="457200" indent="-457200">
+              <a:buFont typeface="+mj-lt"/>
+              <a:buAutoNum type="arabicPeriod"/>
+            </a:pPr>
+            <a:r>
+              <a:rPr lang="nl-BE" dirty="0">
+                <a:solidFill>
+                  <a:schemeClr val="bg2">
+                    <a:lumMod val="75000"/>
+                  </a:schemeClr>
+                </a:solidFill>
+              </a:rPr>
+              <a:t>Inleiding</a:t>
+            </a:r>
+          </a:p>
+          <a:p>
+            <a:pPr marL="457200" indent="-457200">
+              <a:buFont typeface="+mj-lt"/>
+              <a:buAutoNum type="arabicPeriod"/>
+            </a:pPr>
+            <a:r>
+              <a:rPr lang="nl-BE" dirty="0">
+                <a:solidFill>
+                  <a:schemeClr val="bg2">
+                    <a:lumMod val="75000"/>
+                  </a:schemeClr>
+                </a:solidFill>
+              </a:rPr>
+              <a:t>Ontwerp</a:t>
+            </a:r>
+          </a:p>
+          <a:p>
+            <a:pPr marL="457200" indent="-457200">
+              <a:buFont typeface="+mj-lt"/>
+              <a:buAutoNum type="arabicPeriod"/>
+            </a:pPr>
+            <a:r>
+              <a:rPr lang="nl-BE" dirty="0">
+                <a:solidFill>
+                  <a:schemeClr val="bg2">
+                    <a:lumMod val="75000"/>
+                  </a:schemeClr>
+                </a:solidFill>
+              </a:rPr>
+              <a:t>Onderdelen</a:t>
+            </a:r>
+          </a:p>
+          <a:p>
+            <a:pPr marL="914400" lvl="1" indent="-457200">
+              <a:buFont typeface="+mj-lt"/>
+              <a:buAutoNum type="arabicPeriod"/>
+            </a:pPr>
+            <a:r>
+              <a:rPr lang="nl-BE" dirty="0">
+                <a:solidFill>
+                  <a:schemeClr val="bg2">
+                    <a:lumMod val="75000"/>
+                  </a:schemeClr>
+                </a:solidFill>
+              </a:rPr>
+              <a:t>Detectie en lokalisatie</a:t>
+            </a:r>
+          </a:p>
+          <a:p>
+            <a:pPr marL="914400" lvl="1" indent="-457200">
+              <a:buFont typeface="+mj-lt"/>
+              <a:buAutoNum type="arabicPeriod"/>
+            </a:pPr>
+            <a:r>
+              <a:rPr lang="nl-BE" dirty="0"/>
+              <a:t>Richten</a:t>
+            </a:r>
+          </a:p>
+          <a:p>
+            <a:pPr marL="914400" lvl="1" indent="-457200">
+              <a:buFont typeface="+mj-lt"/>
+              <a:buAutoNum type="arabicPeriod"/>
+            </a:pPr>
+            <a:r>
+              <a:rPr lang="nl-BE" dirty="0">
+                <a:solidFill>
+                  <a:schemeClr val="bg2">
+                    <a:lumMod val="75000"/>
+                  </a:schemeClr>
+                </a:solidFill>
+              </a:rPr>
+              <a:t>Blussen</a:t>
+            </a:r>
+          </a:p>
+          <a:p>
+            <a:pPr marL="457200" indent="-457200">
+              <a:buFont typeface="+mj-lt"/>
+              <a:buAutoNum type="arabicPeriod"/>
+            </a:pPr>
+            <a:r>
+              <a:rPr lang="nl-BE" dirty="0">
+                <a:solidFill>
+                  <a:schemeClr val="bg2">
+                    <a:lumMod val="75000"/>
+                  </a:schemeClr>
+                </a:solidFill>
+              </a:rPr>
+              <a:t>Wat hebben we al gerealiseerd?</a:t>
+            </a:r>
+          </a:p>
+          <a:p>
+            <a:pPr marL="457200" indent="-457200">
+              <a:buFont typeface="+mj-lt"/>
+              <a:buAutoNum type="arabicPeriod"/>
+            </a:pPr>
+            <a:r>
+              <a:rPr lang="nl-BE" dirty="0">
+                <a:solidFill>
+                  <a:schemeClr val="bg2">
+                    <a:lumMod val="75000"/>
+                  </a:schemeClr>
+                </a:solidFill>
+              </a:rPr>
+              <a:t>Wat moeten we nog doen?</a:t>
+            </a:r>
+          </a:p>
+          <a:p>
+            <a:pPr marL="457200" indent="-457200">
+              <a:buFont typeface="+mj-lt"/>
+              <a:buAutoNum type="arabicPeriod"/>
+            </a:pPr>
+            <a:r>
+              <a:rPr lang="nl-BE" dirty="0">
+                <a:solidFill>
+                  <a:schemeClr val="bg2">
+                    <a:lumMod val="75000"/>
+                  </a:schemeClr>
+                </a:solidFill>
+              </a:rPr>
+              <a:t>Besluit</a:t>
+            </a:r>
+          </a:p>
+          <a:p>
+            <a:pPr marL="457200" indent="-457200">
+              <a:buFont typeface="+mj-lt"/>
+              <a:buAutoNum type="arabicPeriod"/>
+            </a:pPr>
+            <a:r>
+              <a:rPr lang="nl-BE" dirty="0">
+                <a:solidFill>
+                  <a:schemeClr val="bg2">
+                    <a:lumMod val="75000"/>
+                  </a:schemeClr>
+                </a:solidFill>
+              </a:rPr>
+              <a:t>Bibliografie</a:t>
+            </a:r>
+          </a:p>
+          <a:p>
+            <a:pPr marL="457200" indent="-457200">
+              <a:buFont typeface="+mj-lt"/>
+              <a:buAutoNum type="arabicPeriod"/>
+            </a:pPr>
+            <a:endParaRPr lang="nl-BE" dirty="0"/>
+          </a:p>
+        </p:txBody>
+      </p:sp>
+      <p:sp>
+        <p:nvSpPr>
+          <p:cNvPr id="3" name="Footer Placeholder 2">
+            <a:extLst>
+              <a:ext uri="{FF2B5EF4-FFF2-40B4-BE49-F238E27FC236}">
+                <a16:creationId xmlns:a16="http://schemas.microsoft.com/office/drawing/2014/main" id="{87B9D861-BADE-1735-BC5D-FB0CE4C31EFE}"/>
               </a:ext>
             </a:extLst>
           </p:cNvPr>
@@ -6328,10 +6473,10 @@
       </p:sp>
       <p:sp>
         <p:nvSpPr>
-          <p:cNvPr id="7" name="Slide Number Placeholder 6">
-            <a:extLst>
-              <a:ext uri="{FF2B5EF4-FFF2-40B4-BE49-F238E27FC236}">
-                <a16:creationId xmlns:a16="http://schemas.microsoft.com/office/drawing/2014/main" id="{69A603EA-F528-03E2-B2CE-D8B495321DA8}"/>
+          <p:cNvPr id="4" name="Slide Number Placeholder 3">
+            <a:extLst>
+              <a:ext uri="{FF2B5EF4-FFF2-40B4-BE49-F238E27FC236}">
+                <a16:creationId xmlns:a16="http://schemas.microsoft.com/office/drawing/2014/main" id="{FC23E00C-3A77-A444-8280-8A8A5D17B5DF}"/>
               </a:ext>
             </a:extLst>
           </p:cNvPr>
@@ -6357,10 +6502,10 @@
       </p:sp>
       <p:sp>
         <p:nvSpPr>
-          <p:cNvPr id="8" name="Title 7">
-            <a:extLst>
-              <a:ext uri="{FF2B5EF4-FFF2-40B4-BE49-F238E27FC236}">
-                <a16:creationId xmlns:a16="http://schemas.microsoft.com/office/drawing/2014/main" id="{95AC288B-14AE-B4BB-2989-320F98854D2E}"/>
+          <p:cNvPr id="5" name="Title 4">
+            <a:extLst>
+              <a:ext uri="{FF2B5EF4-FFF2-40B4-BE49-F238E27FC236}">
+                <a16:creationId xmlns:a16="http://schemas.microsoft.com/office/drawing/2014/main" id="{344F2F4D-955A-2213-B685-181EC6CE1CBA}"/>
               </a:ext>
             </a:extLst>
           </p:cNvPr>
@@ -6378,7 +6523,7 @@
           <a:p>
             <a:r>
               <a:rPr lang="nl-BE" dirty="0"/>
-              <a:t>Detectie en lokalisatie</a:t>
+              <a:t>Overzicht</a:t>
             </a:r>
           </a:p>
         </p:txBody>
@@ -6386,7 +6531,7 @@
     </p:spTree>
     <p:extLst>
       <p:ext uri="{BB962C8B-B14F-4D97-AF65-F5344CB8AC3E}">
-        <p14:creationId xmlns:p14="http://schemas.microsoft.com/office/powerpoint/2010/main" val="3061421973"/>
+        <p14:creationId xmlns:p14="http://schemas.microsoft.com/office/powerpoint/2010/main" val="3496813920"/>
       </p:ext>
     </p:extLst>
   </p:cSld>
@@ -6415,200 +6560,129 @@
       </p:grpSpPr>
       <p:sp>
         <p:nvSpPr>
-          <p:cNvPr id="2" name="Content Placeholder 1">
-            <a:extLst>
-              <a:ext uri="{FF2B5EF4-FFF2-40B4-BE49-F238E27FC236}">
-                <a16:creationId xmlns:a16="http://schemas.microsoft.com/office/drawing/2014/main" id="{9572C954-C83C-EE79-685B-900385B3EC4B}"/>
-              </a:ext>
-            </a:extLst>
-          </p:cNvPr>
-          <p:cNvSpPr>
-            <a:spLocks noGrp="1"/>
-          </p:cNvSpPr>
-          <p:nvPr>
-            <p:ph idx="1"/>
-          </p:nvPr>
-        </p:nvSpPr>
-        <p:spPr>
-          <a:xfrm>
-            <a:off x="576000" y="1656000"/>
-            <a:ext cx="11041200" cy="4554000"/>
-          </a:xfrm>
-        </p:spPr>
-        <p:txBody>
-          <a:bodyPr>
-            <a:normAutofit lnSpcReduction="10000"/>
-          </a:bodyPr>
-          <a:lstStyle/>
-          <a:p>
-            <a:pPr marL="457200" indent="-457200">
-              <a:buFont typeface="+mj-lt"/>
-              <a:buAutoNum type="arabicPeriod"/>
-            </a:pPr>
+          <p:cNvPr id="2" name="Text Placeholder 1">
+            <a:extLst>
+              <a:ext uri="{FF2B5EF4-FFF2-40B4-BE49-F238E27FC236}">
+                <a16:creationId xmlns:a16="http://schemas.microsoft.com/office/drawing/2014/main" id="{BA4874C3-0F7D-5455-122F-51AB57637ECC}"/>
+              </a:ext>
+            </a:extLst>
+          </p:cNvPr>
+          <p:cNvSpPr>
+            <a:spLocks noGrp="1"/>
+          </p:cNvSpPr>
+          <p:nvPr>
+            <p:ph type="body" idx="1"/>
+          </p:nvPr>
+        </p:nvSpPr>
+        <p:spPr/>
+        <p:txBody>
+          <a:bodyPr/>
+          <a:lstStyle/>
+          <a:p>
+            <a:r>
+              <a:rPr lang="nl-BE" dirty="0"/>
+              <a:t>Hoeken</a:t>
+            </a:r>
+          </a:p>
+        </p:txBody>
+      </p:sp>
+      <p:sp>
+        <p:nvSpPr>
+          <p:cNvPr id="3" name="Content Placeholder 2">
+            <a:extLst>
+              <a:ext uri="{FF2B5EF4-FFF2-40B4-BE49-F238E27FC236}">
+                <a16:creationId xmlns:a16="http://schemas.microsoft.com/office/drawing/2014/main" id="{32177FB9-AF5E-42C7-FE08-E87176B2F8C4}"/>
+              </a:ext>
+            </a:extLst>
+          </p:cNvPr>
+          <p:cNvSpPr>
+            <a:spLocks noGrp="1"/>
+          </p:cNvSpPr>
+          <p:nvPr>
+            <p:ph sz="half" idx="2"/>
+          </p:nvPr>
+        </p:nvSpPr>
+        <p:spPr/>
+        <p:txBody>
+          <a:bodyPr/>
+          <a:lstStyle/>
+          <a:p>
+            <a:r>
+              <a:rPr lang="nl-BE" dirty="0"/>
+              <a:t>Camera zorgt voor correcte hoek bij horizontale rotatie</a:t>
+            </a:r>
+          </a:p>
+          <a:p>
+            <a:r>
+              <a:rPr lang="nl-BE" dirty="0"/>
+              <a:t>Berekeningen op laptop hebben als output de afstand tot het voorwerp</a:t>
+            </a:r>
+          </a:p>
+        </p:txBody>
+      </p:sp>
+      <p:sp>
+        <p:nvSpPr>
+          <p:cNvPr id="4" name="Text Placeholder 3">
+            <a:extLst>
+              <a:ext uri="{FF2B5EF4-FFF2-40B4-BE49-F238E27FC236}">
+                <a16:creationId xmlns:a16="http://schemas.microsoft.com/office/drawing/2014/main" id="{31058FCE-D50B-BC62-DBE6-C01D56B46FE0}"/>
+              </a:ext>
+            </a:extLst>
+          </p:cNvPr>
+          <p:cNvSpPr>
+            <a:spLocks noGrp="1"/>
+          </p:cNvSpPr>
+          <p:nvPr>
+            <p:ph type="body" sz="quarter" idx="3"/>
+          </p:nvPr>
+        </p:nvSpPr>
+        <p:spPr/>
+        <p:txBody>
+          <a:bodyPr/>
+          <a:lstStyle/>
+          <a:p>
+            <a:endParaRPr lang="nl-BE" dirty="0"/>
+          </a:p>
+        </p:txBody>
+      </p:sp>
+      <p:sp>
+        <p:nvSpPr>
+          <p:cNvPr id="5" name="Content Placeholder 4">
+            <a:extLst>
+              <a:ext uri="{FF2B5EF4-FFF2-40B4-BE49-F238E27FC236}">
+                <a16:creationId xmlns:a16="http://schemas.microsoft.com/office/drawing/2014/main" id="{52B1780E-C405-5AA6-7129-327C61D846E9}"/>
+              </a:ext>
+            </a:extLst>
+          </p:cNvPr>
+          <p:cNvSpPr>
+            <a:spLocks noGrp="1"/>
+          </p:cNvSpPr>
+          <p:nvPr>
+            <p:ph sz="quarter" idx="4"/>
+          </p:nvPr>
+        </p:nvSpPr>
+        <p:spPr/>
+        <p:txBody>
+          <a:bodyPr/>
+          <a:lstStyle/>
+          <a:p>
             <a:r>
               <a:rPr lang="nl-BE" dirty="0">
-                <a:solidFill>
-                  <a:schemeClr val="bg2">
-                    <a:lumMod val="75000"/>
-                  </a:schemeClr>
-                </a:solidFill>
+                <a:highlight>
+                  <a:srgbClr val="FFFF00"/>
+                </a:highlight>
               </a:rPr>
-              <a:t>Inleiding</a:t>
-            </a:r>
-          </a:p>
-          <a:p>
-            <a:pPr marL="457200" indent="-457200">
-              <a:buFont typeface="+mj-lt"/>
-              <a:buAutoNum type="arabicPeriod"/>
-            </a:pPr>
-            <a:r>
-              <a:rPr lang="nl-BE" dirty="0">
-                <a:solidFill>
-                  <a:schemeClr val="bg2">
-                    <a:lumMod val="75000"/>
-                  </a:schemeClr>
-                </a:solidFill>
-              </a:rPr>
-              <a:t>Ontwerp</a:t>
-            </a:r>
-          </a:p>
-          <a:p>
-            <a:pPr marL="457200" indent="-457200">
-              <a:buFont typeface="+mj-lt"/>
-              <a:buAutoNum type="arabicPeriod"/>
-            </a:pPr>
-            <a:r>
-              <a:rPr lang="nl-BE" dirty="0">
-                <a:solidFill>
-                  <a:schemeClr val="bg2">
-                    <a:lumMod val="75000"/>
-                  </a:schemeClr>
-                </a:solidFill>
-              </a:rPr>
-              <a:t>Onderdelen</a:t>
-            </a:r>
-          </a:p>
-          <a:p>
-            <a:pPr marL="914400" lvl="1" indent="-457200">
-              <a:buFont typeface="+mj-lt"/>
-              <a:buAutoNum type="arabicPeriod"/>
-            </a:pPr>
-            <a:r>
-              <a:rPr lang="nl-BE" dirty="0">
-                <a:solidFill>
-                  <a:schemeClr val="bg2">
-                    <a:lumMod val="75000"/>
-                  </a:schemeClr>
-                </a:solidFill>
-              </a:rPr>
-              <a:t>Detectie en lokalisatie</a:t>
-            </a:r>
-          </a:p>
-          <a:p>
-            <a:pPr marL="914400" lvl="1" indent="-457200">
-              <a:buFont typeface="+mj-lt"/>
-              <a:buAutoNum type="arabicPeriod"/>
-            </a:pPr>
-            <a:r>
-              <a:rPr lang="nl-BE" dirty="0"/>
-              <a:t>Richten</a:t>
-            </a:r>
-          </a:p>
-          <a:p>
-            <a:pPr marL="914400" lvl="1" indent="-457200">
-              <a:buFont typeface="+mj-lt"/>
-              <a:buAutoNum type="arabicPeriod"/>
-            </a:pPr>
-            <a:r>
-              <a:rPr lang="nl-BE" dirty="0">
-                <a:solidFill>
-                  <a:schemeClr val="bg2">
-                    <a:lumMod val="75000"/>
-                  </a:schemeClr>
-                </a:solidFill>
-              </a:rPr>
-              <a:t>Blussen</a:t>
-            </a:r>
-          </a:p>
-          <a:p>
-            <a:pPr marL="457200" indent="-457200">
-              <a:buFont typeface="+mj-lt"/>
-              <a:buAutoNum type="arabicPeriod"/>
-            </a:pPr>
-            <a:r>
-              <a:rPr lang="nl-BE" dirty="0">
-                <a:solidFill>
-                  <a:schemeClr val="bg2">
-                    <a:lumMod val="75000"/>
-                  </a:schemeClr>
-                </a:solidFill>
-              </a:rPr>
-              <a:t>Wat hebben we al gerealiseerd?</a:t>
-            </a:r>
-          </a:p>
-          <a:p>
-            <a:pPr marL="457200" indent="-457200">
-              <a:buFont typeface="+mj-lt"/>
-              <a:buAutoNum type="arabicPeriod"/>
-            </a:pPr>
-            <a:r>
-              <a:rPr lang="nl-BE" dirty="0">
-                <a:solidFill>
-                  <a:schemeClr val="bg2">
-                    <a:lumMod val="75000"/>
-                  </a:schemeClr>
-                </a:solidFill>
-              </a:rPr>
-              <a:t>Wat moeten we nog doen?</a:t>
-            </a:r>
-          </a:p>
-          <a:p>
-            <a:pPr marL="457200" indent="-457200">
-              <a:buFont typeface="+mj-lt"/>
-              <a:buAutoNum type="arabicPeriod"/>
-            </a:pPr>
-            <a:r>
-              <a:rPr lang="nl-BE" dirty="0">
-                <a:solidFill>
-                  <a:schemeClr val="bg2">
-                    <a:lumMod val="75000"/>
-                  </a:schemeClr>
-                </a:solidFill>
-              </a:rPr>
-              <a:t>Besluit</a:t>
-            </a:r>
-          </a:p>
-          <a:p>
-            <a:pPr marL="457200" indent="-457200">
-              <a:buFont typeface="+mj-lt"/>
-              <a:buAutoNum type="arabicPeriod"/>
-            </a:pPr>
-            <a:r>
-              <a:rPr lang="nl-BE" dirty="0">
-                <a:solidFill>
-                  <a:schemeClr val="bg2">
-                    <a:lumMod val="75000"/>
-                  </a:schemeClr>
-                </a:solidFill>
-              </a:rPr>
-              <a:t>Bibliografie</a:t>
-            </a:r>
-          </a:p>
-          <a:p>
-            <a:pPr marL="457200" indent="-457200">
-              <a:buFont typeface="+mj-lt"/>
-              <a:buAutoNum type="arabicPeriod"/>
-            </a:pPr>
-            <a:endParaRPr lang="nl-BE" dirty="0"/>
-          </a:p>
-        </p:txBody>
-      </p:sp>
-      <p:sp>
-        <p:nvSpPr>
-          <p:cNvPr id="3" name="Footer Placeholder 2">
-            <a:extLst>
-              <a:ext uri="{FF2B5EF4-FFF2-40B4-BE49-F238E27FC236}">
-                <a16:creationId xmlns:a16="http://schemas.microsoft.com/office/drawing/2014/main" id="{87B9D861-BADE-1735-BC5D-FB0CE4C31EFE}"/>
+              <a:t>Flowchart output camera tot richten arm toevoegen</a:t>
+            </a:r>
+          </a:p>
+        </p:txBody>
+      </p:sp>
+      <p:sp>
+        <p:nvSpPr>
+          <p:cNvPr id="6" name="Footer Placeholder 5">
+            <a:extLst>
+              <a:ext uri="{FF2B5EF4-FFF2-40B4-BE49-F238E27FC236}">
+                <a16:creationId xmlns:a16="http://schemas.microsoft.com/office/drawing/2014/main" id="{2E7187E5-4618-71A7-86E8-85CFB224B02F}"/>
               </a:ext>
             </a:extLst>
           </p:cNvPr>
@@ -6633,10 +6707,10 @@
       </p:sp>
       <p:sp>
         <p:nvSpPr>
-          <p:cNvPr id="4" name="Slide Number Placeholder 3">
-            <a:extLst>
-              <a:ext uri="{FF2B5EF4-FFF2-40B4-BE49-F238E27FC236}">
-                <a16:creationId xmlns:a16="http://schemas.microsoft.com/office/drawing/2014/main" id="{FC23E00C-3A77-A444-8280-8A8A5D17B5DF}"/>
+          <p:cNvPr id="7" name="Slide Number Placeholder 6">
+            <a:extLst>
+              <a:ext uri="{FF2B5EF4-FFF2-40B4-BE49-F238E27FC236}">
+                <a16:creationId xmlns:a16="http://schemas.microsoft.com/office/drawing/2014/main" id="{1128EDC2-D57E-204F-7E71-264E36A71C75}"/>
               </a:ext>
             </a:extLst>
           </p:cNvPr>
@@ -6662,10 +6736,10 @@
       </p:sp>
       <p:sp>
         <p:nvSpPr>
-          <p:cNvPr id="5" name="Title 4">
-            <a:extLst>
-              <a:ext uri="{FF2B5EF4-FFF2-40B4-BE49-F238E27FC236}">
-                <a16:creationId xmlns:a16="http://schemas.microsoft.com/office/drawing/2014/main" id="{344F2F4D-955A-2213-B685-181EC6CE1CBA}"/>
+          <p:cNvPr id="8" name="Title 7">
+            <a:extLst>
+              <a:ext uri="{FF2B5EF4-FFF2-40B4-BE49-F238E27FC236}">
+                <a16:creationId xmlns:a16="http://schemas.microsoft.com/office/drawing/2014/main" id="{0933DAEF-FBC3-98BB-99B2-40F4D1AE2E64}"/>
               </a:ext>
             </a:extLst>
           </p:cNvPr>
@@ -6683,7 +6757,7 @@
           <a:p>
             <a:r>
               <a:rPr lang="nl-BE" dirty="0"/>
-              <a:t>Overzicht</a:t>
+              <a:t>Richten</a:t>
             </a:r>
           </a:p>
         </p:txBody>
@@ -6691,7 +6765,7 @@
     </p:spTree>
     <p:extLst>
       <p:ext uri="{BB962C8B-B14F-4D97-AF65-F5344CB8AC3E}">
-        <p14:creationId xmlns:p14="http://schemas.microsoft.com/office/powerpoint/2010/main" val="3496813920"/>
+        <p14:creationId xmlns:p14="http://schemas.microsoft.com/office/powerpoint/2010/main" val="521352389"/>
       </p:ext>
     </p:extLst>
   </p:cSld>
@@ -6723,7 +6797,7 @@
           <p:cNvPr id="2" name="Text Placeholder 1">
             <a:extLst>
               <a:ext uri="{FF2B5EF4-FFF2-40B4-BE49-F238E27FC236}">
-                <a16:creationId xmlns:a16="http://schemas.microsoft.com/office/drawing/2014/main" id="{BA4874C3-0F7D-5455-122F-51AB57637ECC}"/>
+                <a16:creationId xmlns:a16="http://schemas.microsoft.com/office/drawing/2014/main" id="{5E925BC7-2783-5805-B3C1-BADD15B9D513}"/>
               </a:ext>
             </a:extLst>
           </p:cNvPr>
@@ -6739,66 +6813,95 @@
           <a:bodyPr/>
           <a:lstStyle/>
           <a:p>
+            <a:r>
+              <a:rPr lang="nl-BE" dirty="0"/>
+              <a:t>Beweging</a:t>
+            </a:r>
+          </a:p>
+        </p:txBody>
+      </p:sp>
+      <p:sp>
+        <p:nvSpPr>
+          <p:cNvPr id="3" name="Content Placeholder 2">
+            <a:extLst>
+              <a:ext uri="{FF2B5EF4-FFF2-40B4-BE49-F238E27FC236}">
+                <a16:creationId xmlns:a16="http://schemas.microsoft.com/office/drawing/2014/main" id="{1454D4B1-BBA9-833E-209C-1050200223C8}"/>
+              </a:ext>
+            </a:extLst>
+          </p:cNvPr>
+          <p:cNvSpPr>
+            <a:spLocks noGrp="1"/>
+          </p:cNvSpPr>
+          <p:nvPr>
+            <p:ph sz="half" idx="2"/>
+          </p:nvPr>
+        </p:nvSpPr>
+        <p:spPr/>
+        <p:txBody>
+          <a:bodyPr/>
+          <a:lstStyle/>
+          <a:p>
+            <a:r>
+              <a:rPr lang="nl-BE" dirty="0"/>
+              <a:t>2 motoren (Micro Metal Gear Motor 100:1 HP)</a:t>
+            </a:r>
+          </a:p>
+          <a:p>
+            <a:r>
+              <a:rPr lang="nl-BE" dirty="0"/>
+              <a:t>Horizontale rotatie: roterend platform met arm, camera en 2</a:t>
+            </a:r>
+            <a:r>
+              <a:rPr lang="nl-BE" baseline="30000" dirty="0"/>
+              <a:t>de</a:t>
+            </a:r>
+            <a:r>
+              <a:rPr lang="nl-BE" dirty="0"/>
+              <a:t> motor</a:t>
+            </a:r>
+          </a:p>
+          <a:p>
+            <a:r>
+              <a:rPr lang="nl-BE" dirty="0"/>
+              <a:t>Verticale rotatie: motor op platform verbonden met arm</a:t>
+            </a:r>
+          </a:p>
+          <a:p>
+            <a:endParaRPr lang="nl-BE" dirty="0"/>
+          </a:p>
+        </p:txBody>
+      </p:sp>
+      <p:sp>
+        <p:nvSpPr>
+          <p:cNvPr id="4" name="Text Placeholder 3">
+            <a:extLst>
+              <a:ext uri="{FF2B5EF4-FFF2-40B4-BE49-F238E27FC236}">
+                <a16:creationId xmlns:a16="http://schemas.microsoft.com/office/drawing/2014/main" id="{57051C34-B84F-CA87-D0E8-90E875879F58}"/>
+              </a:ext>
+            </a:extLst>
+          </p:cNvPr>
+          <p:cNvSpPr>
+            <a:spLocks noGrp="1"/>
+          </p:cNvSpPr>
+          <p:nvPr>
+            <p:ph type="body" sz="quarter" idx="3"/>
+          </p:nvPr>
+        </p:nvSpPr>
+        <p:spPr/>
+        <p:txBody>
+          <a:bodyPr/>
+          <a:lstStyle/>
+          <a:p>
             <a:endParaRPr lang="nl-BE"/>
           </a:p>
         </p:txBody>
       </p:sp>
       <p:sp>
         <p:nvSpPr>
-          <p:cNvPr id="3" name="Content Placeholder 2">
-            <a:extLst>
-              <a:ext uri="{FF2B5EF4-FFF2-40B4-BE49-F238E27FC236}">
-                <a16:creationId xmlns:a16="http://schemas.microsoft.com/office/drawing/2014/main" id="{32177FB9-AF5E-42C7-FE08-E87176B2F8C4}"/>
-              </a:ext>
-            </a:extLst>
-          </p:cNvPr>
-          <p:cNvSpPr>
-            <a:spLocks noGrp="1"/>
-          </p:cNvSpPr>
-          <p:nvPr>
-            <p:ph sz="half" idx="2"/>
-          </p:nvPr>
-        </p:nvSpPr>
-        <p:spPr/>
-        <p:txBody>
-          <a:bodyPr/>
-          <a:lstStyle/>
-          <a:p>
-            <a:endParaRPr lang="nl-BE"/>
-          </a:p>
-        </p:txBody>
-      </p:sp>
-      <p:sp>
-        <p:nvSpPr>
-          <p:cNvPr id="4" name="Text Placeholder 3">
-            <a:extLst>
-              <a:ext uri="{FF2B5EF4-FFF2-40B4-BE49-F238E27FC236}">
-                <a16:creationId xmlns:a16="http://schemas.microsoft.com/office/drawing/2014/main" id="{31058FCE-D50B-BC62-DBE6-C01D56B46FE0}"/>
-              </a:ext>
-            </a:extLst>
-          </p:cNvPr>
-          <p:cNvSpPr>
-            <a:spLocks noGrp="1"/>
-          </p:cNvSpPr>
-          <p:nvPr>
-            <p:ph type="body" sz="quarter" idx="3"/>
-          </p:nvPr>
-        </p:nvSpPr>
-        <p:spPr/>
-        <p:txBody>
-          <a:bodyPr/>
-          <a:lstStyle/>
-          <a:p>
-            <a:endParaRPr lang="nl-BE"/>
-          </a:p>
-        </p:txBody>
-      </p:sp>
-      <p:sp>
-        <p:nvSpPr>
           <p:cNvPr id="5" name="Content Placeholder 4">
             <a:extLst>
               <a:ext uri="{FF2B5EF4-FFF2-40B4-BE49-F238E27FC236}">
-                <a16:creationId xmlns:a16="http://schemas.microsoft.com/office/drawing/2014/main" id="{52B1780E-C405-5AA6-7129-327C61D846E9}"/>
+                <a16:creationId xmlns:a16="http://schemas.microsoft.com/office/drawing/2014/main" id="{A42F2141-3346-F007-9E06-950D19EE6448}"/>
               </a:ext>
             </a:extLst>
           </p:cNvPr>
@@ -6814,7 +6917,17 @@
           <a:bodyPr/>
           <a:lstStyle/>
           <a:p>
-            <a:endParaRPr lang="nl-BE"/>
+            <a:r>
+              <a:rPr lang="nl-BE" dirty="0">
+                <a:highlight>
+                  <a:srgbClr val="FFFF00"/>
+                </a:highlight>
+              </a:rPr>
+              <a:t>Flowchart output camera tot richten arm toevoegen</a:t>
+            </a:r>
+          </a:p>
+          <a:p>
+            <a:endParaRPr lang="nl-BE" dirty="0"/>
           </a:p>
         </p:txBody>
       </p:sp>
@@ -6823,7 +6936,7 @@
           <p:cNvPr id="6" name="Footer Placeholder 5">
             <a:extLst>
               <a:ext uri="{FF2B5EF4-FFF2-40B4-BE49-F238E27FC236}">
-                <a16:creationId xmlns:a16="http://schemas.microsoft.com/office/drawing/2014/main" id="{2E7187E5-4618-71A7-86E8-85CFB224B02F}"/>
+                <a16:creationId xmlns:a16="http://schemas.microsoft.com/office/drawing/2014/main" id="{D693DDB0-6963-65AA-2FFD-A8BADBC9180D}"/>
               </a:ext>
             </a:extLst>
           </p:cNvPr>
@@ -6851,7 +6964,7 @@
           <p:cNvPr id="7" name="Slide Number Placeholder 6">
             <a:extLst>
               <a:ext uri="{FF2B5EF4-FFF2-40B4-BE49-F238E27FC236}">
-                <a16:creationId xmlns:a16="http://schemas.microsoft.com/office/drawing/2014/main" id="{1128EDC2-D57E-204F-7E71-264E36A71C75}"/>
+                <a16:creationId xmlns:a16="http://schemas.microsoft.com/office/drawing/2014/main" id="{1ACCFD81-E394-7E86-FF33-CF750CD610C3}"/>
               </a:ext>
             </a:extLst>
           </p:cNvPr>
@@ -6880,7 +6993,7 @@
           <p:cNvPr id="8" name="Title 7">
             <a:extLst>
               <a:ext uri="{FF2B5EF4-FFF2-40B4-BE49-F238E27FC236}">
-                <a16:creationId xmlns:a16="http://schemas.microsoft.com/office/drawing/2014/main" id="{0933DAEF-FBC3-98BB-99B2-40F4D1AE2E64}"/>
+                <a16:creationId xmlns:a16="http://schemas.microsoft.com/office/drawing/2014/main" id="{A535BE19-1CD8-CF0B-8D60-42B0794840EE}"/>
               </a:ext>
             </a:extLst>
           </p:cNvPr>
@@ -6906,7 +7019,7 @@
     </p:spTree>
     <p:extLst>
       <p:ext uri="{BB962C8B-B14F-4D97-AF65-F5344CB8AC3E}">
-        <p14:creationId xmlns:p14="http://schemas.microsoft.com/office/powerpoint/2010/main" val="521352389"/>
+        <p14:creationId xmlns:p14="http://schemas.microsoft.com/office/powerpoint/2010/main" val="4123170472"/>
       </p:ext>
     </p:extLst>
   </p:cSld>
@@ -6935,110 +7048,200 @@
       </p:grpSpPr>
       <p:sp>
         <p:nvSpPr>
-          <p:cNvPr id="2" name="Text Placeholder 1">
-            <a:extLst>
-              <a:ext uri="{FF2B5EF4-FFF2-40B4-BE49-F238E27FC236}">
-                <a16:creationId xmlns:a16="http://schemas.microsoft.com/office/drawing/2014/main" id="{5E925BC7-2783-5805-B3C1-BADD15B9D513}"/>
-              </a:ext>
-            </a:extLst>
-          </p:cNvPr>
-          <p:cNvSpPr>
-            <a:spLocks noGrp="1"/>
-          </p:cNvSpPr>
-          <p:nvPr>
-            <p:ph type="body" idx="1"/>
-          </p:nvPr>
-        </p:nvSpPr>
-        <p:spPr/>
-        <p:txBody>
-          <a:bodyPr/>
-          <a:lstStyle/>
-          <a:p>
-            <a:endParaRPr lang="nl-BE"/>
-          </a:p>
-        </p:txBody>
-      </p:sp>
-      <p:sp>
-        <p:nvSpPr>
-          <p:cNvPr id="3" name="Content Placeholder 2">
-            <a:extLst>
-              <a:ext uri="{FF2B5EF4-FFF2-40B4-BE49-F238E27FC236}">
-                <a16:creationId xmlns:a16="http://schemas.microsoft.com/office/drawing/2014/main" id="{1454D4B1-BBA9-833E-209C-1050200223C8}"/>
-              </a:ext>
-            </a:extLst>
-          </p:cNvPr>
-          <p:cNvSpPr>
-            <a:spLocks noGrp="1"/>
-          </p:cNvSpPr>
-          <p:nvPr>
-            <p:ph sz="half" idx="2"/>
-          </p:nvPr>
-        </p:nvSpPr>
-        <p:spPr/>
-        <p:txBody>
-          <a:bodyPr/>
-          <a:lstStyle/>
-          <a:p>
-            <a:endParaRPr lang="nl-BE"/>
-          </a:p>
-        </p:txBody>
-      </p:sp>
-      <p:sp>
-        <p:nvSpPr>
-          <p:cNvPr id="4" name="Text Placeholder 3">
-            <a:extLst>
-              <a:ext uri="{FF2B5EF4-FFF2-40B4-BE49-F238E27FC236}">
-                <a16:creationId xmlns:a16="http://schemas.microsoft.com/office/drawing/2014/main" id="{57051C34-B84F-CA87-D0E8-90E875879F58}"/>
-              </a:ext>
-            </a:extLst>
-          </p:cNvPr>
-          <p:cNvSpPr>
-            <a:spLocks noGrp="1"/>
-          </p:cNvSpPr>
-          <p:nvPr>
-            <p:ph type="body" sz="quarter" idx="3"/>
-          </p:nvPr>
-        </p:nvSpPr>
-        <p:spPr/>
-        <p:txBody>
-          <a:bodyPr/>
-          <a:lstStyle/>
-          <a:p>
-            <a:endParaRPr lang="nl-BE"/>
-          </a:p>
-        </p:txBody>
-      </p:sp>
-      <p:sp>
-        <p:nvSpPr>
-          <p:cNvPr id="5" name="Content Placeholder 4">
-            <a:extLst>
-              <a:ext uri="{FF2B5EF4-FFF2-40B4-BE49-F238E27FC236}">
-                <a16:creationId xmlns:a16="http://schemas.microsoft.com/office/drawing/2014/main" id="{A42F2141-3346-F007-9E06-950D19EE6448}"/>
-              </a:ext>
-            </a:extLst>
-          </p:cNvPr>
-          <p:cNvSpPr>
-            <a:spLocks noGrp="1"/>
-          </p:cNvSpPr>
-          <p:nvPr>
-            <p:ph sz="quarter" idx="4"/>
-          </p:nvPr>
-        </p:nvSpPr>
-        <p:spPr/>
-        <p:txBody>
-          <a:bodyPr/>
-          <a:lstStyle/>
-          <a:p>
-            <a:endParaRPr lang="nl-BE"/>
-          </a:p>
-        </p:txBody>
-      </p:sp>
-      <p:sp>
-        <p:nvSpPr>
-          <p:cNvPr id="6" name="Footer Placeholder 5">
-            <a:extLst>
-              <a:ext uri="{FF2B5EF4-FFF2-40B4-BE49-F238E27FC236}">
-                <a16:creationId xmlns:a16="http://schemas.microsoft.com/office/drawing/2014/main" id="{D693DDB0-6963-65AA-2FFD-A8BADBC9180D}"/>
+          <p:cNvPr id="2" name="Content Placeholder 1">
+            <a:extLst>
+              <a:ext uri="{FF2B5EF4-FFF2-40B4-BE49-F238E27FC236}">
+                <a16:creationId xmlns:a16="http://schemas.microsoft.com/office/drawing/2014/main" id="{9572C954-C83C-EE79-685B-900385B3EC4B}"/>
+              </a:ext>
+            </a:extLst>
+          </p:cNvPr>
+          <p:cNvSpPr>
+            <a:spLocks noGrp="1"/>
+          </p:cNvSpPr>
+          <p:nvPr>
+            <p:ph idx="1"/>
+          </p:nvPr>
+        </p:nvSpPr>
+        <p:spPr>
+          <a:xfrm>
+            <a:off x="576000" y="1656000"/>
+            <a:ext cx="11041200" cy="4554000"/>
+          </a:xfrm>
+        </p:spPr>
+        <p:txBody>
+          <a:bodyPr>
+            <a:normAutofit lnSpcReduction="10000"/>
+          </a:bodyPr>
+          <a:lstStyle/>
+          <a:p>
+            <a:pPr marL="457200" indent="-457200">
+              <a:buFont typeface="+mj-lt"/>
+              <a:buAutoNum type="arabicPeriod"/>
+            </a:pPr>
+            <a:r>
+              <a:rPr lang="nl-BE" dirty="0">
+                <a:solidFill>
+                  <a:schemeClr val="bg2">
+                    <a:lumMod val="75000"/>
+                  </a:schemeClr>
+                </a:solidFill>
+              </a:rPr>
+              <a:t>Inleiding</a:t>
+            </a:r>
+          </a:p>
+          <a:p>
+            <a:pPr marL="457200" indent="-457200">
+              <a:buFont typeface="+mj-lt"/>
+              <a:buAutoNum type="arabicPeriod"/>
+            </a:pPr>
+            <a:r>
+              <a:rPr lang="nl-BE" dirty="0">
+                <a:solidFill>
+                  <a:schemeClr val="bg2">
+                    <a:lumMod val="75000"/>
+                  </a:schemeClr>
+                </a:solidFill>
+              </a:rPr>
+              <a:t>Ontwerp</a:t>
+            </a:r>
+          </a:p>
+          <a:p>
+            <a:pPr marL="457200" indent="-457200">
+              <a:buFont typeface="+mj-lt"/>
+              <a:buAutoNum type="arabicPeriod"/>
+            </a:pPr>
+            <a:r>
+              <a:rPr lang="nl-BE" dirty="0">
+                <a:solidFill>
+                  <a:schemeClr val="bg2">
+                    <a:lumMod val="75000"/>
+                  </a:schemeClr>
+                </a:solidFill>
+              </a:rPr>
+              <a:t>Onderdelen</a:t>
+            </a:r>
+          </a:p>
+          <a:p>
+            <a:pPr marL="914400" lvl="1" indent="-457200">
+              <a:buFont typeface="+mj-lt"/>
+              <a:buAutoNum type="arabicPeriod"/>
+            </a:pPr>
+            <a:r>
+              <a:rPr lang="nl-BE" dirty="0">
+                <a:solidFill>
+                  <a:schemeClr val="bg2">
+                    <a:lumMod val="75000"/>
+                  </a:schemeClr>
+                </a:solidFill>
+              </a:rPr>
+              <a:t>Detectie en lokalisatie</a:t>
+            </a:r>
+          </a:p>
+          <a:p>
+            <a:pPr marL="914400" lvl="1" indent="-457200">
+              <a:buFont typeface="+mj-lt"/>
+              <a:buAutoNum type="arabicPeriod"/>
+            </a:pPr>
+            <a:r>
+              <a:rPr lang="nl-BE" dirty="0">
+                <a:solidFill>
+                  <a:schemeClr val="bg2">
+                    <a:lumMod val="75000"/>
+                  </a:schemeClr>
+                </a:solidFill>
+              </a:rPr>
+              <a:t>Richten</a:t>
+            </a:r>
+          </a:p>
+          <a:p>
+            <a:pPr marL="914400" lvl="1" indent="-457200">
+              <a:buFont typeface="+mj-lt"/>
+              <a:buAutoNum type="arabicPeriod"/>
+            </a:pPr>
+            <a:r>
+              <a:rPr lang="nl-BE" dirty="0"/>
+              <a:t>Blussen</a:t>
+            </a:r>
+          </a:p>
+          <a:p>
+            <a:pPr marL="457200" indent="-457200">
+              <a:buFont typeface="+mj-lt"/>
+              <a:buAutoNum type="arabicPeriod"/>
+            </a:pPr>
+            <a:r>
+              <a:rPr lang="nl-BE" dirty="0">
+                <a:solidFill>
+                  <a:schemeClr val="bg2">
+                    <a:lumMod val="75000"/>
+                  </a:schemeClr>
+                </a:solidFill>
+              </a:rPr>
+              <a:t>Wat hebben we al gerealiseerd?</a:t>
+            </a:r>
+          </a:p>
+          <a:p>
+            <a:pPr marL="457200" indent="-457200">
+              <a:buFont typeface="+mj-lt"/>
+              <a:buAutoNum type="arabicPeriod"/>
+            </a:pPr>
+            <a:r>
+              <a:rPr lang="nl-BE" dirty="0">
+                <a:solidFill>
+                  <a:schemeClr val="bg2">
+                    <a:lumMod val="75000"/>
+                  </a:schemeClr>
+                </a:solidFill>
+              </a:rPr>
+              <a:t>Wat moeten we nog doen?</a:t>
+            </a:r>
+          </a:p>
+          <a:p>
+            <a:pPr marL="457200" indent="-457200">
+              <a:buFont typeface="+mj-lt"/>
+              <a:buAutoNum type="arabicPeriod"/>
+            </a:pPr>
+            <a:r>
+              <a:rPr lang="nl-BE" dirty="0">
+                <a:solidFill>
+                  <a:schemeClr val="bg2">
+                    <a:lumMod val="75000"/>
+                  </a:schemeClr>
+                </a:solidFill>
+              </a:rPr>
+              <a:t>Besluit</a:t>
+            </a:r>
+          </a:p>
+          <a:p>
+            <a:pPr marL="457200" indent="-457200">
+              <a:buFont typeface="+mj-lt"/>
+              <a:buAutoNum type="arabicPeriod"/>
+            </a:pPr>
+            <a:r>
+              <a:rPr lang="nl-BE" dirty="0">
+                <a:solidFill>
+                  <a:schemeClr val="bg2">
+                    <a:lumMod val="75000"/>
+                  </a:schemeClr>
+                </a:solidFill>
+              </a:rPr>
+              <a:t>Bibliografie</a:t>
+            </a:r>
+          </a:p>
+          <a:p>
+            <a:pPr marL="457200" indent="-457200">
+              <a:buFont typeface="+mj-lt"/>
+              <a:buAutoNum type="arabicPeriod"/>
+            </a:pPr>
+            <a:endParaRPr lang="nl-BE" dirty="0"/>
+          </a:p>
+        </p:txBody>
+      </p:sp>
+      <p:sp>
+        <p:nvSpPr>
+          <p:cNvPr id="3" name="Footer Placeholder 2">
+            <a:extLst>
+              <a:ext uri="{FF2B5EF4-FFF2-40B4-BE49-F238E27FC236}">
+                <a16:creationId xmlns:a16="http://schemas.microsoft.com/office/drawing/2014/main" id="{87B9D861-BADE-1735-BC5D-FB0CE4C31EFE}"/>
               </a:ext>
             </a:extLst>
           </p:cNvPr>
@@ -7063,10 +7266,10 @@
       </p:sp>
       <p:sp>
         <p:nvSpPr>
-          <p:cNvPr id="7" name="Slide Number Placeholder 6">
-            <a:extLst>
-              <a:ext uri="{FF2B5EF4-FFF2-40B4-BE49-F238E27FC236}">
-                <a16:creationId xmlns:a16="http://schemas.microsoft.com/office/drawing/2014/main" id="{1ACCFD81-E394-7E86-FF33-CF750CD610C3}"/>
+          <p:cNvPr id="4" name="Slide Number Placeholder 3">
+            <a:extLst>
+              <a:ext uri="{FF2B5EF4-FFF2-40B4-BE49-F238E27FC236}">
+                <a16:creationId xmlns:a16="http://schemas.microsoft.com/office/drawing/2014/main" id="{FC23E00C-3A77-A444-8280-8A8A5D17B5DF}"/>
               </a:ext>
             </a:extLst>
           </p:cNvPr>
@@ -7092,10 +7295,10 @@
       </p:sp>
       <p:sp>
         <p:nvSpPr>
-          <p:cNvPr id="8" name="Title 7">
-            <a:extLst>
-              <a:ext uri="{FF2B5EF4-FFF2-40B4-BE49-F238E27FC236}">
-                <a16:creationId xmlns:a16="http://schemas.microsoft.com/office/drawing/2014/main" id="{A535BE19-1CD8-CF0B-8D60-42B0794840EE}"/>
+          <p:cNvPr id="5" name="Title 4">
+            <a:extLst>
+              <a:ext uri="{FF2B5EF4-FFF2-40B4-BE49-F238E27FC236}">
+                <a16:creationId xmlns:a16="http://schemas.microsoft.com/office/drawing/2014/main" id="{344F2F4D-955A-2213-B685-181EC6CE1CBA}"/>
               </a:ext>
             </a:extLst>
           </p:cNvPr>
@@ -7113,7 +7316,7 @@
           <a:p>
             <a:r>
               <a:rPr lang="nl-BE" dirty="0"/>
-              <a:t>Richten</a:t>
+              <a:t>Overzicht</a:t>
             </a:r>
           </a:p>
         </p:txBody>
@@ -7121,7 +7324,7 @@
     </p:spTree>
     <p:extLst>
       <p:ext uri="{BB962C8B-B14F-4D97-AF65-F5344CB8AC3E}">
-        <p14:creationId xmlns:p14="http://schemas.microsoft.com/office/powerpoint/2010/main" val="4123170472"/>
+        <p14:creationId xmlns:p14="http://schemas.microsoft.com/office/powerpoint/2010/main" val="4078082637"/>
       </p:ext>
     </p:extLst>
   </p:cSld>
@@ -7150,200 +7353,167 @@
       </p:grpSpPr>
       <p:sp>
         <p:nvSpPr>
-          <p:cNvPr id="2" name="Content Placeholder 1">
-            <a:extLst>
-              <a:ext uri="{FF2B5EF4-FFF2-40B4-BE49-F238E27FC236}">
-                <a16:creationId xmlns:a16="http://schemas.microsoft.com/office/drawing/2014/main" id="{9572C954-C83C-EE79-685B-900385B3EC4B}"/>
-              </a:ext>
-            </a:extLst>
-          </p:cNvPr>
-          <p:cNvSpPr>
-            <a:spLocks noGrp="1"/>
-          </p:cNvSpPr>
-          <p:nvPr>
-            <p:ph idx="1"/>
-          </p:nvPr>
-        </p:nvSpPr>
-        <p:spPr>
-          <a:xfrm>
-            <a:off x="576000" y="1656000"/>
-            <a:ext cx="11041200" cy="4554000"/>
-          </a:xfrm>
-        </p:spPr>
-        <p:txBody>
-          <a:bodyPr>
-            <a:normAutofit lnSpcReduction="10000"/>
-          </a:bodyPr>
-          <a:lstStyle/>
-          <a:p>
-            <a:pPr marL="457200" indent="-457200">
-              <a:buFont typeface="+mj-lt"/>
-              <a:buAutoNum type="arabicPeriod"/>
-            </a:pPr>
+          <p:cNvPr id="2" name="Text Placeholder 1">
+            <a:extLst>
+              <a:ext uri="{FF2B5EF4-FFF2-40B4-BE49-F238E27FC236}">
+                <a16:creationId xmlns:a16="http://schemas.microsoft.com/office/drawing/2014/main" id="{50812383-1E2C-0593-3BE3-D56DEB273572}"/>
+              </a:ext>
+            </a:extLst>
+          </p:cNvPr>
+          <p:cNvSpPr>
+            <a:spLocks noGrp="1"/>
+          </p:cNvSpPr>
+          <p:nvPr>
+            <p:ph type="body" idx="1"/>
+          </p:nvPr>
+        </p:nvSpPr>
+        <p:spPr/>
+        <p:txBody>
+          <a:bodyPr/>
+          <a:lstStyle/>
+          <a:p>
+            <a:r>
+              <a:rPr lang="nl-BE" dirty="0"/>
+              <a:t>Pomp</a:t>
+            </a:r>
+          </a:p>
+        </p:txBody>
+      </p:sp>
+      <p:sp>
+        <p:nvSpPr>
+          <p:cNvPr id="3" name="Content Placeholder 2">
+            <a:extLst>
+              <a:ext uri="{FF2B5EF4-FFF2-40B4-BE49-F238E27FC236}">
+                <a16:creationId xmlns:a16="http://schemas.microsoft.com/office/drawing/2014/main" id="{4BCCE717-1B93-CB5A-606B-91B7DF303444}"/>
+              </a:ext>
+            </a:extLst>
+          </p:cNvPr>
+          <p:cNvSpPr>
+            <a:spLocks noGrp="1"/>
+          </p:cNvSpPr>
+          <p:nvPr>
+            <p:ph sz="half" idx="2"/>
+          </p:nvPr>
+        </p:nvSpPr>
+        <p:spPr/>
+        <p:txBody>
+          <a:bodyPr/>
+          <a:lstStyle/>
+          <a:p>
+            <a:r>
+              <a:rPr lang="nl-BE" dirty="0"/>
+              <a:t>Wanneer armen correct gericht </a:t>
+            </a:r>
             <a:r>
               <a:rPr lang="nl-BE" dirty="0">
-                <a:solidFill>
-                  <a:schemeClr val="bg2">
-                    <a:lumMod val="75000"/>
-                  </a:schemeClr>
-                </a:solidFill>
+                <a:sym typeface="Wingdings" panose="05000000000000000000" pitchFamily="2" charset="2"/>
               </a:rPr>
-              <a:t>Inleiding</a:t>
-            </a:r>
-          </a:p>
-          <a:p>
-            <a:pPr marL="457200" indent="-457200">
-              <a:buFont typeface="+mj-lt"/>
-              <a:buAutoNum type="arabicPeriod"/>
-            </a:pPr>
+              <a:t> signaal begin werking pomp</a:t>
+            </a:r>
+          </a:p>
+          <a:p>
+            <a:r>
+              <a:rPr lang="nl-BE" dirty="0" err="1">
+                <a:sym typeface="Wingdings" panose="05000000000000000000" pitchFamily="2" charset="2"/>
+              </a:rPr>
+              <a:t>Whadda</a:t>
+            </a:r>
             <a:r>
               <a:rPr lang="nl-BE" dirty="0">
-                <a:solidFill>
-                  <a:schemeClr val="bg2">
-                    <a:lumMod val="75000"/>
-                  </a:schemeClr>
-                </a:solidFill>
+                <a:sym typeface="Wingdings" panose="05000000000000000000" pitchFamily="2" charset="2"/>
               </a:rPr>
-              <a:t>Ontwerp</a:t>
-            </a:r>
-          </a:p>
-          <a:p>
-            <a:pPr marL="457200" indent="-457200">
-              <a:buFont typeface="+mj-lt"/>
-              <a:buAutoNum type="arabicPeriod"/>
-            </a:pPr>
+              <a:t> WPSE470 waterflowsensor treed in werking voor eventuele aanpassingen van hoek </a:t>
+            </a:r>
+          </a:p>
+          <a:p>
             <a:r>
               <a:rPr lang="nl-BE" dirty="0">
-                <a:solidFill>
-                  <a:schemeClr val="bg2">
-                    <a:lumMod val="75000"/>
-                  </a:schemeClr>
-                </a:solidFill>
+                <a:sym typeface="Wingdings" panose="05000000000000000000" pitchFamily="2" charset="2"/>
               </a:rPr>
-              <a:t>Onderdelen</a:t>
-            </a:r>
-          </a:p>
-          <a:p>
-            <a:pPr marL="914400" lvl="1" indent="-457200">
-              <a:buFont typeface="+mj-lt"/>
-              <a:buAutoNum type="arabicPeriod"/>
-            </a:pPr>
+              <a:t>Juiste hoeveelheid water + ingerekende verspilling water wegspuiten</a:t>
+            </a:r>
+          </a:p>
+          <a:p>
+            <a:endParaRPr lang="nl-BE" dirty="0"/>
+          </a:p>
+        </p:txBody>
+      </p:sp>
+      <p:sp>
+        <p:nvSpPr>
+          <p:cNvPr id="4" name="Text Placeholder 3">
+            <a:extLst>
+              <a:ext uri="{FF2B5EF4-FFF2-40B4-BE49-F238E27FC236}">
+                <a16:creationId xmlns:a16="http://schemas.microsoft.com/office/drawing/2014/main" id="{D1DADE5A-4540-0CF3-F8C4-AE75A86883FD}"/>
+              </a:ext>
+            </a:extLst>
+          </p:cNvPr>
+          <p:cNvSpPr>
+            <a:spLocks noGrp="1"/>
+          </p:cNvSpPr>
+          <p:nvPr>
+            <p:ph type="body" sz="quarter" idx="3"/>
+          </p:nvPr>
+        </p:nvSpPr>
+        <p:spPr/>
+        <p:txBody>
+          <a:bodyPr/>
+          <a:lstStyle/>
+          <a:p>
+            <a:endParaRPr lang="nl-BE"/>
+          </a:p>
+        </p:txBody>
+      </p:sp>
+      <p:sp>
+        <p:nvSpPr>
+          <p:cNvPr id="5" name="Content Placeholder 4">
+            <a:extLst>
+              <a:ext uri="{FF2B5EF4-FFF2-40B4-BE49-F238E27FC236}">
+                <a16:creationId xmlns:a16="http://schemas.microsoft.com/office/drawing/2014/main" id="{23450DFD-699D-E425-7D92-58D7D08A998B}"/>
+              </a:ext>
+            </a:extLst>
+          </p:cNvPr>
+          <p:cNvSpPr>
+            <a:spLocks noGrp="1"/>
+          </p:cNvSpPr>
+          <p:nvPr>
+            <p:ph sz="quarter" idx="4"/>
+          </p:nvPr>
+        </p:nvSpPr>
+        <p:spPr/>
+        <p:txBody>
+          <a:bodyPr/>
+          <a:lstStyle/>
+          <a:p>
             <a:r>
               <a:rPr lang="nl-BE" dirty="0">
-                <a:solidFill>
-                  <a:schemeClr val="bg2">
-                    <a:lumMod val="75000"/>
-                  </a:schemeClr>
-                </a:solidFill>
+                <a:highlight>
+                  <a:srgbClr val="FFFF00"/>
+                </a:highlight>
               </a:rPr>
-              <a:t>Detectie en lokalisatie</a:t>
-            </a:r>
-          </a:p>
-          <a:p>
-            <a:pPr marL="914400" lvl="1" indent="-457200">
-              <a:buFont typeface="+mj-lt"/>
-              <a:buAutoNum type="arabicPeriod"/>
-            </a:pPr>
-            <a:r>
-              <a:rPr lang="nl-BE" dirty="0">
-                <a:solidFill>
-                  <a:schemeClr val="bg2">
-                    <a:lumMod val="75000"/>
-                  </a:schemeClr>
-                </a:solidFill>
+              <a:t>Flowchart waterflowsensor </a:t>
+            </a:r>
+            <a:r>
+              <a:rPr lang="nl-BE" dirty="0" err="1">
+                <a:highlight>
+                  <a:srgbClr val="FFFF00"/>
+                </a:highlight>
               </a:rPr>
-              <a:t>Richten</a:t>
-            </a:r>
-          </a:p>
-          <a:p>
-            <a:pPr marL="914400" lvl="1" indent="-457200">
-              <a:buFont typeface="+mj-lt"/>
-              <a:buAutoNum type="arabicPeriod"/>
-            </a:pPr>
-            <a:r>
-              <a:rPr lang="nl-BE" dirty="0"/>
-              <a:t>Blussen</a:t>
-            </a:r>
-          </a:p>
-          <a:p>
-            <a:pPr marL="457200" indent="-457200">
-              <a:buFont typeface="+mj-lt"/>
-              <a:buAutoNum type="arabicPeriod"/>
-            </a:pPr>
-            <a:r>
-              <a:rPr lang="nl-BE" dirty="0">
-                <a:solidFill>
-                  <a:schemeClr val="bg2">
-                    <a:lumMod val="75000"/>
-                  </a:schemeClr>
-                </a:solidFill>
-              </a:rPr>
-              <a:t>Wat hebben we al gerealiseerd?</a:t>
-            </a:r>
-          </a:p>
-          <a:p>
-            <a:pPr marL="457200" indent="-457200">
-              <a:buFont typeface="+mj-lt"/>
-              <a:buAutoNum type="arabicPeriod"/>
-            </a:pPr>
-            <a:r>
-              <a:rPr lang="nl-BE" dirty="0">
-                <a:solidFill>
-                  <a:schemeClr val="bg2">
-                    <a:lumMod val="75000"/>
-                  </a:schemeClr>
-                </a:solidFill>
-              </a:rPr>
-              <a:t>Wat moeten we nog doen?</a:t>
-            </a:r>
-          </a:p>
-          <a:p>
-            <a:pPr marL="457200" indent="-457200">
-              <a:buFont typeface="+mj-lt"/>
-              <a:buAutoNum type="arabicPeriod"/>
-            </a:pPr>
-            <a:r>
-              <a:rPr lang="nl-BE" dirty="0">
-                <a:solidFill>
-                  <a:schemeClr val="bg2">
-                    <a:lumMod val="75000"/>
-                  </a:schemeClr>
-                </a:solidFill>
-              </a:rPr>
-              <a:t>Besluit</a:t>
-            </a:r>
-          </a:p>
-          <a:p>
-            <a:pPr marL="457200" indent="-457200">
-              <a:buFont typeface="+mj-lt"/>
-              <a:buAutoNum type="arabicPeriod"/>
-            </a:pPr>
-            <a:r>
-              <a:rPr lang="nl-BE" dirty="0">
-                <a:solidFill>
-                  <a:schemeClr val="bg2">
-                    <a:lumMod val="75000"/>
-                  </a:schemeClr>
-                </a:solidFill>
-              </a:rPr>
-              <a:t>Bibliografie</a:t>
-            </a:r>
-          </a:p>
-          <a:p>
-            <a:pPr marL="457200" indent="-457200">
-              <a:buFont typeface="+mj-lt"/>
-              <a:buAutoNum type="arabicPeriod"/>
-            </a:pPr>
-            <a:endParaRPr lang="nl-BE" dirty="0"/>
-          </a:p>
-        </p:txBody>
-      </p:sp>
-      <p:sp>
-        <p:nvSpPr>
-          <p:cNvPr id="3" name="Footer Placeholder 2">
-            <a:extLst>
-              <a:ext uri="{FF2B5EF4-FFF2-40B4-BE49-F238E27FC236}">
-                <a16:creationId xmlns:a16="http://schemas.microsoft.com/office/drawing/2014/main" id="{87B9D861-BADE-1735-BC5D-FB0CE4C31EFE}"/>
+              <a:t>enzo</a:t>
+            </a:r>
+            <a:endParaRPr lang="nl-BE" dirty="0">
+              <a:highlight>
+                <a:srgbClr val="FFFF00"/>
+              </a:highlight>
+            </a:endParaRPr>
+          </a:p>
+        </p:txBody>
+      </p:sp>
+      <p:sp>
+        <p:nvSpPr>
+          <p:cNvPr id="6" name="Footer Placeholder 5">
+            <a:extLst>
+              <a:ext uri="{FF2B5EF4-FFF2-40B4-BE49-F238E27FC236}">
+                <a16:creationId xmlns:a16="http://schemas.microsoft.com/office/drawing/2014/main" id="{E13CA08D-D5EF-EEAC-9FE9-44301BE6DDF9}"/>
               </a:ext>
             </a:extLst>
           </p:cNvPr>
@@ -7368,10 +7538,10 @@
       </p:sp>
       <p:sp>
         <p:nvSpPr>
-          <p:cNvPr id="4" name="Slide Number Placeholder 3">
-            <a:extLst>
-              <a:ext uri="{FF2B5EF4-FFF2-40B4-BE49-F238E27FC236}">
-                <a16:creationId xmlns:a16="http://schemas.microsoft.com/office/drawing/2014/main" id="{FC23E00C-3A77-A444-8280-8A8A5D17B5DF}"/>
+          <p:cNvPr id="7" name="Slide Number Placeholder 6">
+            <a:extLst>
+              <a:ext uri="{FF2B5EF4-FFF2-40B4-BE49-F238E27FC236}">
+                <a16:creationId xmlns:a16="http://schemas.microsoft.com/office/drawing/2014/main" id="{B6711DA2-BB57-AD9E-12B5-F7ABC208B350}"/>
               </a:ext>
             </a:extLst>
           </p:cNvPr>
@@ -7397,10 +7567,10 @@
       </p:sp>
       <p:sp>
         <p:nvSpPr>
-          <p:cNvPr id="5" name="Title 4">
-            <a:extLst>
-              <a:ext uri="{FF2B5EF4-FFF2-40B4-BE49-F238E27FC236}">
-                <a16:creationId xmlns:a16="http://schemas.microsoft.com/office/drawing/2014/main" id="{344F2F4D-955A-2213-B685-181EC6CE1CBA}"/>
+          <p:cNvPr id="8" name="Title 7">
+            <a:extLst>
+              <a:ext uri="{FF2B5EF4-FFF2-40B4-BE49-F238E27FC236}">
+                <a16:creationId xmlns:a16="http://schemas.microsoft.com/office/drawing/2014/main" id="{7475CB8F-7F64-009D-D0F4-18C7B69D1AE7}"/>
               </a:ext>
             </a:extLst>
           </p:cNvPr>
@@ -7418,7 +7588,7 @@
           <a:p>
             <a:r>
               <a:rPr lang="nl-BE" dirty="0"/>
-              <a:t>Overzicht</a:t>
+              <a:t>Blussen</a:t>
             </a:r>
           </a:p>
         </p:txBody>
@@ -7426,7 +7596,7 @@
     </p:spTree>
     <p:extLst>
       <p:ext uri="{BB962C8B-B14F-4D97-AF65-F5344CB8AC3E}">
-        <p14:creationId xmlns:p14="http://schemas.microsoft.com/office/powerpoint/2010/main" val="4078082637"/>
+        <p14:creationId xmlns:p14="http://schemas.microsoft.com/office/powerpoint/2010/main" val="387171481"/>
       </p:ext>
     </p:extLst>
   </p:cSld>
@@ -7455,110 +7625,200 @@
       </p:grpSpPr>
       <p:sp>
         <p:nvSpPr>
-          <p:cNvPr id="2" name="Text Placeholder 1">
-            <a:extLst>
-              <a:ext uri="{FF2B5EF4-FFF2-40B4-BE49-F238E27FC236}">
-                <a16:creationId xmlns:a16="http://schemas.microsoft.com/office/drawing/2014/main" id="{50812383-1E2C-0593-3BE3-D56DEB273572}"/>
-              </a:ext>
-            </a:extLst>
-          </p:cNvPr>
-          <p:cNvSpPr>
-            <a:spLocks noGrp="1"/>
-          </p:cNvSpPr>
-          <p:nvPr>
-            <p:ph type="body" idx="1"/>
-          </p:nvPr>
-        </p:nvSpPr>
-        <p:spPr/>
-        <p:txBody>
-          <a:bodyPr/>
-          <a:lstStyle/>
-          <a:p>
-            <a:endParaRPr lang="nl-BE"/>
-          </a:p>
-        </p:txBody>
-      </p:sp>
-      <p:sp>
-        <p:nvSpPr>
-          <p:cNvPr id="3" name="Content Placeholder 2">
-            <a:extLst>
-              <a:ext uri="{FF2B5EF4-FFF2-40B4-BE49-F238E27FC236}">
-                <a16:creationId xmlns:a16="http://schemas.microsoft.com/office/drawing/2014/main" id="{4BCCE717-1B93-CB5A-606B-91B7DF303444}"/>
-              </a:ext>
-            </a:extLst>
-          </p:cNvPr>
-          <p:cNvSpPr>
-            <a:spLocks noGrp="1"/>
-          </p:cNvSpPr>
-          <p:nvPr>
-            <p:ph sz="half" idx="2"/>
-          </p:nvPr>
-        </p:nvSpPr>
-        <p:spPr/>
-        <p:txBody>
-          <a:bodyPr/>
-          <a:lstStyle/>
-          <a:p>
-            <a:endParaRPr lang="nl-BE"/>
-          </a:p>
-        </p:txBody>
-      </p:sp>
-      <p:sp>
-        <p:nvSpPr>
-          <p:cNvPr id="4" name="Text Placeholder 3">
-            <a:extLst>
-              <a:ext uri="{FF2B5EF4-FFF2-40B4-BE49-F238E27FC236}">
-                <a16:creationId xmlns:a16="http://schemas.microsoft.com/office/drawing/2014/main" id="{D1DADE5A-4540-0CF3-F8C4-AE75A86883FD}"/>
-              </a:ext>
-            </a:extLst>
-          </p:cNvPr>
-          <p:cNvSpPr>
-            <a:spLocks noGrp="1"/>
-          </p:cNvSpPr>
-          <p:nvPr>
-            <p:ph type="body" sz="quarter" idx="3"/>
-          </p:nvPr>
-        </p:nvSpPr>
-        <p:spPr/>
-        <p:txBody>
-          <a:bodyPr/>
-          <a:lstStyle/>
-          <a:p>
-            <a:endParaRPr lang="nl-BE"/>
-          </a:p>
-        </p:txBody>
-      </p:sp>
-      <p:sp>
-        <p:nvSpPr>
-          <p:cNvPr id="5" name="Content Placeholder 4">
-            <a:extLst>
-              <a:ext uri="{FF2B5EF4-FFF2-40B4-BE49-F238E27FC236}">
-                <a16:creationId xmlns:a16="http://schemas.microsoft.com/office/drawing/2014/main" id="{23450DFD-699D-E425-7D92-58D7D08A998B}"/>
-              </a:ext>
-            </a:extLst>
-          </p:cNvPr>
-          <p:cNvSpPr>
-            <a:spLocks noGrp="1"/>
-          </p:cNvSpPr>
-          <p:nvPr>
-            <p:ph sz="quarter" idx="4"/>
-          </p:nvPr>
-        </p:nvSpPr>
-        <p:spPr/>
-        <p:txBody>
-          <a:bodyPr/>
-          <a:lstStyle/>
-          <a:p>
-            <a:endParaRPr lang="nl-BE"/>
-          </a:p>
-        </p:txBody>
-      </p:sp>
-      <p:sp>
-        <p:nvSpPr>
-          <p:cNvPr id="6" name="Footer Placeholder 5">
-            <a:extLst>
-              <a:ext uri="{FF2B5EF4-FFF2-40B4-BE49-F238E27FC236}">
-                <a16:creationId xmlns:a16="http://schemas.microsoft.com/office/drawing/2014/main" id="{E13CA08D-D5EF-EEAC-9FE9-44301BE6DDF9}"/>
+          <p:cNvPr id="2" name="Content Placeholder 1">
+            <a:extLst>
+              <a:ext uri="{FF2B5EF4-FFF2-40B4-BE49-F238E27FC236}">
+                <a16:creationId xmlns:a16="http://schemas.microsoft.com/office/drawing/2014/main" id="{9572C954-C83C-EE79-685B-900385B3EC4B}"/>
+              </a:ext>
+            </a:extLst>
+          </p:cNvPr>
+          <p:cNvSpPr>
+            <a:spLocks noGrp="1"/>
+          </p:cNvSpPr>
+          <p:nvPr>
+            <p:ph idx="1"/>
+          </p:nvPr>
+        </p:nvSpPr>
+        <p:spPr>
+          <a:xfrm>
+            <a:off x="576000" y="1656000"/>
+            <a:ext cx="11041200" cy="4554000"/>
+          </a:xfrm>
+        </p:spPr>
+        <p:txBody>
+          <a:bodyPr>
+            <a:normAutofit lnSpcReduction="10000"/>
+          </a:bodyPr>
+          <a:lstStyle/>
+          <a:p>
+            <a:pPr marL="457200" indent="-457200">
+              <a:buFont typeface="+mj-lt"/>
+              <a:buAutoNum type="arabicPeriod"/>
+            </a:pPr>
+            <a:r>
+              <a:rPr lang="nl-BE" dirty="0">
+                <a:solidFill>
+                  <a:schemeClr val="bg2">
+                    <a:lumMod val="75000"/>
+                  </a:schemeClr>
+                </a:solidFill>
+              </a:rPr>
+              <a:t>Inleiding</a:t>
+            </a:r>
+          </a:p>
+          <a:p>
+            <a:pPr marL="457200" indent="-457200">
+              <a:buFont typeface="+mj-lt"/>
+              <a:buAutoNum type="arabicPeriod"/>
+            </a:pPr>
+            <a:r>
+              <a:rPr lang="nl-BE" dirty="0">
+                <a:solidFill>
+                  <a:schemeClr val="bg2">
+                    <a:lumMod val="75000"/>
+                  </a:schemeClr>
+                </a:solidFill>
+              </a:rPr>
+              <a:t>Ontwerp</a:t>
+            </a:r>
+          </a:p>
+          <a:p>
+            <a:pPr marL="457200" indent="-457200">
+              <a:buFont typeface="+mj-lt"/>
+              <a:buAutoNum type="arabicPeriod"/>
+            </a:pPr>
+            <a:r>
+              <a:rPr lang="nl-BE" dirty="0">
+                <a:solidFill>
+                  <a:schemeClr val="bg2">
+                    <a:lumMod val="75000"/>
+                  </a:schemeClr>
+                </a:solidFill>
+              </a:rPr>
+              <a:t>Onderdelen</a:t>
+            </a:r>
+          </a:p>
+          <a:p>
+            <a:pPr marL="914400" lvl="1" indent="-457200">
+              <a:buFont typeface="+mj-lt"/>
+              <a:buAutoNum type="arabicPeriod"/>
+            </a:pPr>
+            <a:r>
+              <a:rPr lang="nl-BE" dirty="0">
+                <a:solidFill>
+                  <a:schemeClr val="bg2">
+                    <a:lumMod val="75000"/>
+                  </a:schemeClr>
+                </a:solidFill>
+              </a:rPr>
+              <a:t>Detectie en lokalisatie</a:t>
+            </a:r>
+          </a:p>
+          <a:p>
+            <a:pPr marL="914400" lvl="1" indent="-457200">
+              <a:buFont typeface="+mj-lt"/>
+              <a:buAutoNum type="arabicPeriod"/>
+            </a:pPr>
+            <a:r>
+              <a:rPr lang="nl-BE" dirty="0">
+                <a:solidFill>
+                  <a:schemeClr val="bg2">
+                    <a:lumMod val="75000"/>
+                  </a:schemeClr>
+                </a:solidFill>
+              </a:rPr>
+              <a:t>Richten</a:t>
+            </a:r>
+          </a:p>
+          <a:p>
+            <a:pPr marL="914400" lvl="1" indent="-457200">
+              <a:buFont typeface="+mj-lt"/>
+              <a:buAutoNum type="arabicPeriod"/>
+            </a:pPr>
+            <a:r>
+              <a:rPr lang="nl-BE" dirty="0">
+                <a:solidFill>
+                  <a:schemeClr val="bg2">
+                    <a:lumMod val="75000"/>
+                  </a:schemeClr>
+                </a:solidFill>
+              </a:rPr>
+              <a:t>Blussen</a:t>
+            </a:r>
+          </a:p>
+          <a:p>
+            <a:pPr marL="457200" indent="-457200">
+              <a:buFont typeface="+mj-lt"/>
+              <a:buAutoNum type="arabicPeriod"/>
+            </a:pPr>
+            <a:r>
+              <a:rPr lang="nl-BE" dirty="0"/>
+              <a:t>Wat hebben we al gerealiseerd?</a:t>
+            </a:r>
+          </a:p>
+          <a:p>
+            <a:pPr marL="457200" indent="-457200">
+              <a:buFont typeface="+mj-lt"/>
+              <a:buAutoNum type="arabicPeriod"/>
+            </a:pPr>
+            <a:r>
+              <a:rPr lang="nl-BE" dirty="0">
+                <a:solidFill>
+                  <a:schemeClr val="bg2">
+                    <a:lumMod val="75000"/>
+                  </a:schemeClr>
+                </a:solidFill>
+              </a:rPr>
+              <a:t>Wat moeten we nog doen?</a:t>
+            </a:r>
+          </a:p>
+          <a:p>
+            <a:pPr marL="457200" indent="-457200">
+              <a:buFont typeface="+mj-lt"/>
+              <a:buAutoNum type="arabicPeriod"/>
+            </a:pPr>
+            <a:r>
+              <a:rPr lang="nl-BE" dirty="0">
+                <a:solidFill>
+                  <a:schemeClr val="bg2">
+                    <a:lumMod val="75000"/>
+                  </a:schemeClr>
+                </a:solidFill>
+              </a:rPr>
+              <a:t>Besluit</a:t>
+            </a:r>
+          </a:p>
+          <a:p>
+            <a:pPr marL="457200" indent="-457200">
+              <a:buFont typeface="+mj-lt"/>
+              <a:buAutoNum type="arabicPeriod"/>
+            </a:pPr>
+            <a:r>
+              <a:rPr lang="nl-BE" dirty="0">
+                <a:solidFill>
+                  <a:schemeClr val="bg2">
+                    <a:lumMod val="75000"/>
+                  </a:schemeClr>
+                </a:solidFill>
+              </a:rPr>
+              <a:t>Bibliografie</a:t>
+            </a:r>
+          </a:p>
+          <a:p>
+            <a:pPr marL="457200" indent="-457200">
+              <a:buFont typeface="+mj-lt"/>
+              <a:buAutoNum type="arabicPeriod"/>
+            </a:pPr>
+            <a:endParaRPr lang="nl-BE" dirty="0"/>
+          </a:p>
+        </p:txBody>
+      </p:sp>
+      <p:sp>
+        <p:nvSpPr>
+          <p:cNvPr id="3" name="Footer Placeholder 2">
+            <a:extLst>
+              <a:ext uri="{FF2B5EF4-FFF2-40B4-BE49-F238E27FC236}">
+                <a16:creationId xmlns:a16="http://schemas.microsoft.com/office/drawing/2014/main" id="{87B9D861-BADE-1735-BC5D-FB0CE4C31EFE}"/>
               </a:ext>
             </a:extLst>
           </p:cNvPr>
@@ -7583,10 +7843,10 @@
       </p:sp>
       <p:sp>
         <p:nvSpPr>
-          <p:cNvPr id="7" name="Slide Number Placeholder 6">
-            <a:extLst>
-              <a:ext uri="{FF2B5EF4-FFF2-40B4-BE49-F238E27FC236}">
-                <a16:creationId xmlns:a16="http://schemas.microsoft.com/office/drawing/2014/main" id="{B6711DA2-BB57-AD9E-12B5-F7ABC208B350}"/>
+          <p:cNvPr id="4" name="Slide Number Placeholder 3">
+            <a:extLst>
+              <a:ext uri="{FF2B5EF4-FFF2-40B4-BE49-F238E27FC236}">
+                <a16:creationId xmlns:a16="http://schemas.microsoft.com/office/drawing/2014/main" id="{FC23E00C-3A77-A444-8280-8A8A5D17B5DF}"/>
               </a:ext>
             </a:extLst>
           </p:cNvPr>
@@ -7612,10 +7872,10 @@
       </p:sp>
       <p:sp>
         <p:nvSpPr>
-          <p:cNvPr id="8" name="Title 7">
-            <a:extLst>
-              <a:ext uri="{FF2B5EF4-FFF2-40B4-BE49-F238E27FC236}">
-                <a16:creationId xmlns:a16="http://schemas.microsoft.com/office/drawing/2014/main" id="{7475CB8F-7F64-009D-D0F4-18C7B69D1AE7}"/>
+          <p:cNvPr id="5" name="Title 4">
+            <a:extLst>
+              <a:ext uri="{FF2B5EF4-FFF2-40B4-BE49-F238E27FC236}">
+                <a16:creationId xmlns:a16="http://schemas.microsoft.com/office/drawing/2014/main" id="{344F2F4D-955A-2213-B685-181EC6CE1CBA}"/>
               </a:ext>
             </a:extLst>
           </p:cNvPr>
@@ -7633,7 +7893,7 @@
           <a:p>
             <a:r>
               <a:rPr lang="nl-BE" dirty="0"/>
-              <a:t>Blussen</a:t>
+              <a:t>Overzicht</a:t>
             </a:r>
           </a:p>
         </p:txBody>
@@ -7641,7 +7901,7 @@
     </p:spTree>
     <p:extLst>
       <p:ext uri="{BB962C8B-B14F-4D97-AF65-F5344CB8AC3E}">
-        <p14:creationId xmlns:p14="http://schemas.microsoft.com/office/powerpoint/2010/main" val="387171481"/>
+        <p14:creationId xmlns:p14="http://schemas.microsoft.com/office/powerpoint/2010/main" val="244562561"/>
       </p:ext>
     </p:extLst>
   </p:cSld>
@@ -7924,7 +8184,7 @@
           <p:cNvPr id="2" name="Text Placeholder 1">
             <a:extLst>
               <a:ext uri="{FF2B5EF4-FFF2-40B4-BE49-F238E27FC236}">
-                <a16:creationId xmlns:a16="http://schemas.microsoft.com/office/drawing/2014/main" id="{FB674298-31FF-3DCD-E198-4E7B2CD014B4}"/>
+                <a16:creationId xmlns:a16="http://schemas.microsoft.com/office/drawing/2014/main" id="{42671717-52C7-0E8F-8CBA-82691BF1E69D}"/>
               </a:ext>
             </a:extLst>
           </p:cNvPr>
@@ -7940,24 +8200,98 @@
           <a:bodyPr/>
           <a:lstStyle/>
           <a:p>
+            <a:r>
+              <a:rPr lang="nl-BE" dirty="0"/>
+              <a:t>Camera</a:t>
+            </a:r>
+          </a:p>
+        </p:txBody>
+      </p:sp>
+      <p:sp>
+        <p:nvSpPr>
+          <p:cNvPr id="3" name="Content Placeholder 2">
+            <a:extLst>
+              <a:ext uri="{FF2B5EF4-FFF2-40B4-BE49-F238E27FC236}">
+                <a16:creationId xmlns:a16="http://schemas.microsoft.com/office/drawing/2014/main" id="{8FCFCA61-ACBD-CB03-BDBC-7FA6AFD5FF83}"/>
+              </a:ext>
+            </a:extLst>
+          </p:cNvPr>
+          <p:cNvSpPr>
+            <a:spLocks noGrp="1"/>
+          </p:cNvSpPr>
+          <p:nvPr>
+            <p:ph sz="half" idx="2"/>
+          </p:nvPr>
+        </p:nvSpPr>
+        <p:spPr/>
+        <p:txBody>
+          <a:bodyPr/>
+          <a:lstStyle/>
+          <a:p>
+            <a:r>
+              <a:rPr lang="nl-BE" dirty="0"/>
+              <a:t>Detectie van rode objecten</a:t>
+            </a:r>
+          </a:p>
+          <a:p>
+            <a:r>
+              <a:rPr lang="nl-BE" dirty="0"/>
+              <a:t>Schatting afstand tot (rode) object</a:t>
+            </a:r>
+          </a:p>
+          <a:p>
+            <a:endParaRPr lang="nl-BE" dirty="0"/>
+          </a:p>
+          <a:p>
+            <a:endParaRPr lang="nl-BE" dirty="0"/>
+          </a:p>
+          <a:p>
+            <a:endParaRPr lang="nl-BE" dirty="0"/>
+          </a:p>
+          <a:p>
+            <a:endParaRPr lang="nl-BE" dirty="0"/>
+          </a:p>
+        </p:txBody>
+      </p:sp>
+      <p:sp>
+        <p:nvSpPr>
+          <p:cNvPr id="4" name="Text Placeholder 3">
+            <a:extLst>
+              <a:ext uri="{FF2B5EF4-FFF2-40B4-BE49-F238E27FC236}">
+                <a16:creationId xmlns:a16="http://schemas.microsoft.com/office/drawing/2014/main" id="{7B23A01F-059C-4587-B76A-B65CAA425AC3}"/>
+              </a:ext>
+            </a:extLst>
+          </p:cNvPr>
+          <p:cNvSpPr>
+            <a:spLocks noGrp="1"/>
+          </p:cNvSpPr>
+          <p:nvPr>
+            <p:ph type="body" sz="quarter" idx="3"/>
+          </p:nvPr>
+        </p:nvSpPr>
+        <p:spPr/>
+        <p:txBody>
+          <a:bodyPr/>
+          <a:lstStyle/>
+          <a:p>
             <a:endParaRPr lang="nl-BE"/>
           </a:p>
         </p:txBody>
       </p:sp>
       <p:sp>
         <p:nvSpPr>
-          <p:cNvPr id="3" name="Content Placeholder 2">
-            <a:extLst>
-              <a:ext uri="{FF2B5EF4-FFF2-40B4-BE49-F238E27FC236}">
-                <a16:creationId xmlns:a16="http://schemas.microsoft.com/office/drawing/2014/main" id="{2EBF79B9-C46E-4F34-9308-5DF8156862BF}"/>
-              </a:ext>
-            </a:extLst>
-          </p:cNvPr>
-          <p:cNvSpPr>
-            <a:spLocks noGrp="1"/>
-          </p:cNvSpPr>
-          <p:nvPr>
-            <p:ph sz="half" idx="2"/>
+          <p:cNvPr id="5" name="Content Placeholder 4">
+            <a:extLst>
+              <a:ext uri="{FF2B5EF4-FFF2-40B4-BE49-F238E27FC236}">
+                <a16:creationId xmlns:a16="http://schemas.microsoft.com/office/drawing/2014/main" id="{1EB4A612-97F7-2B20-3DB2-67D253B50602}"/>
+              </a:ext>
+            </a:extLst>
+          </p:cNvPr>
+          <p:cNvSpPr>
+            <a:spLocks noGrp="1"/>
+          </p:cNvSpPr>
+          <p:nvPr>
+            <p:ph sz="quarter" idx="4"/>
           </p:nvPr>
         </p:nvSpPr>
         <p:spPr/>
@@ -7971,60 +8305,10 @@
       </p:sp>
       <p:sp>
         <p:nvSpPr>
-          <p:cNvPr id="4" name="Text Placeholder 3">
-            <a:extLst>
-              <a:ext uri="{FF2B5EF4-FFF2-40B4-BE49-F238E27FC236}">
-                <a16:creationId xmlns:a16="http://schemas.microsoft.com/office/drawing/2014/main" id="{AB8BDD30-B952-966D-46F8-77F78A8C3334}"/>
-              </a:ext>
-            </a:extLst>
-          </p:cNvPr>
-          <p:cNvSpPr>
-            <a:spLocks noGrp="1"/>
-          </p:cNvSpPr>
-          <p:nvPr>
-            <p:ph type="body" sz="quarter" idx="3"/>
-          </p:nvPr>
-        </p:nvSpPr>
-        <p:spPr/>
-        <p:txBody>
-          <a:bodyPr/>
-          <a:lstStyle/>
-          <a:p>
-            <a:endParaRPr lang="nl-BE"/>
-          </a:p>
-        </p:txBody>
-      </p:sp>
-      <p:sp>
-        <p:nvSpPr>
-          <p:cNvPr id="5" name="Content Placeholder 4">
-            <a:extLst>
-              <a:ext uri="{FF2B5EF4-FFF2-40B4-BE49-F238E27FC236}">
-                <a16:creationId xmlns:a16="http://schemas.microsoft.com/office/drawing/2014/main" id="{07F342C2-F4F8-C603-39C1-B6A28F13428C}"/>
-              </a:ext>
-            </a:extLst>
-          </p:cNvPr>
-          <p:cNvSpPr>
-            <a:spLocks noGrp="1"/>
-          </p:cNvSpPr>
-          <p:nvPr>
-            <p:ph sz="quarter" idx="4"/>
-          </p:nvPr>
-        </p:nvSpPr>
-        <p:spPr/>
-        <p:txBody>
-          <a:bodyPr/>
-          <a:lstStyle/>
-          <a:p>
-            <a:endParaRPr lang="nl-BE"/>
-          </a:p>
-        </p:txBody>
-      </p:sp>
-      <p:sp>
-        <p:nvSpPr>
           <p:cNvPr id="6" name="Footer Placeholder 5">
             <a:extLst>
               <a:ext uri="{FF2B5EF4-FFF2-40B4-BE49-F238E27FC236}">
-                <a16:creationId xmlns:a16="http://schemas.microsoft.com/office/drawing/2014/main" id="{98C83AC6-1BD0-A2B7-2AC3-01E1C244E416}"/>
+                <a16:creationId xmlns:a16="http://schemas.microsoft.com/office/drawing/2014/main" id="{8BB99E3E-1E5A-E5EF-E353-65D0EB6CA66E}"/>
               </a:ext>
             </a:extLst>
           </p:cNvPr>
@@ -8052,7 +8336,7 @@
           <p:cNvPr id="7" name="Slide Number Placeholder 6">
             <a:extLst>
               <a:ext uri="{FF2B5EF4-FFF2-40B4-BE49-F238E27FC236}">
-                <a16:creationId xmlns:a16="http://schemas.microsoft.com/office/drawing/2014/main" id="{6B9045F1-8215-93FD-1ADA-4E7961BDA77F}"/>
+                <a16:creationId xmlns:a16="http://schemas.microsoft.com/office/drawing/2014/main" id="{D380BCEF-6875-4D68-E6BB-B225F0B47195}"/>
               </a:ext>
             </a:extLst>
           </p:cNvPr>
@@ -8081,7 +8365,7 @@
           <p:cNvPr id="8" name="Title 7">
             <a:extLst>
               <a:ext uri="{FF2B5EF4-FFF2-40B4-BE49-F238E27FC236}">
-                <a16:creationId xmlns:a16="http://schemas.microsoft.com/office/drawing/2014/main" id="{99757148-75C1-E36E-FC7B-62359836E2F5}"/>
+                <a16:creationId xmlns:a16="http://schemas.microsoft.com/office/drawing/2014/main" id="{1050185B-6923-7C42-87E5-8D5CD63462E1}"/>
               </a:ext>
             </a:extLst>
           </p:cNvPr>
@@ -8099,7 +8383,7 @@
           <a:p>
             <a:r>
               <a:rPr lang="nl-BE" dirty="0"/>
-              <a:t>Blussen</a:t>
+              <a:t>Wat hebben we al gerealiseerd?</a:t>
             </a:r>
           </a:p>
         </p:txBody>
@@ -8107,7 +8391,7 @@
     </p:spTree>
     <p:extLst>
       <p:ext uri="{BB962C8B-B14F-4D97-AF65-F5344CB8AC3E}">
-        <p14:creationId xmlns:p14="http://schemas.microsoft.com/office/powerpoint/2010/main" val="1445873230"/>
+        <p14:creationId xmlns:p14="http://schemas.microsoft.com/office/powerpoint/2010/main" val="1527144204"/>
       </p:ext>
     </p:extLst>
   </p:cSld>
@@ -8136,200 +8420,125 @@
       </p:grpSpPr>
       <p:sp>
         <p:nvSpPr>
-          <p:cNvPr id="2" name="Content Placeholder 1">
-            <a:extLst>
-              <a:ext uri="{FF2B5EF4-FFF2-40B4-BE49-F238E27FC236}">
-                <a16:creationId xmlns:a16="http://schemas.microsoft.com/office/drawing/2014/main" id="{9572C954-C83C-EE79-685B-900385B3EC4B}"/>
-              </a:ext>
-            </a:extLst>
-          </p:cNvPr>
-          <p:cNvSpPr>
-            <a:spLocks noGrp="1"/>
-          </p:cNvSpPr>
-          <p:nvPr>
-            <p:ph idx="1"/>
-          </p:nvPr>
-        </p:nvSpPr>
-        <p:spPr>
-          <a:xfrm>
-            <a:off x="576000" y="1656000"/>
-            <a:ext cx="11041200" cy="4554000"/>
-          </a:xfrm>
-        </p:spPr>
-        <p:txBody>
-          <a:bodyPr>
-            <a:normAutofit lnSpcReduction="10000"/>
-          </a:bodyPr>
-          <a:lstStyle/>
-          <a:p>
-            <a:pPr marL="457200" indent="-457200">
-              <a:buFont typeface="+mj-lt"/>
-              <a:buAutoNum type="arabicPeriod"/>
-            </a:pPr>
-            <a:r>
-              <a:rPr lang="nl-BE" dirty="0">
-                <a:solidFill>
-                  <a:schemeClr val="bg2">
-                    <a:lumMod val="75000"/>
-                  </a:schemeClr>
-                </a:solidFill>
-              </a:rPr>
-              <a:t>Inleiding</a:t>
-            </a:r>
-          </a:p>
-          <a:p>
-            <a:pPr marL="457200" indent="-457200">
-              <a:buFont typeface="+mj-lt"/>
-              <a:buAutoNum type="arabicPeriod"/>
-            </a:pPr>
-            <a:r>
-              <a:rPr lang="nl-BE" dirty="0">
-                <a:solidFill>
-                  <a:schemeClr val="bg2">
-                    <a:lumMod val="75000"/>
-                  </a:schemeClr>
-                </a:solidFill>
-              </a:rPr>
-              <a:t>Ontwerp</a:t>
-            </a:r>
-          </a:p>
-          <a:p>
-            <a:pPr marL="457200" indent="-457200">
-              <a:buFont typeface="+mj-lt"/>
-              <a:buAutoNum type="arabicPeriod"/>
-            </a:pPr>
-            <a:r>
-              <a:rPr lang="nl-BE" dirty="0">
-                <a:solidFill>
-                  <a:schemeClr val="bg2">
-                    <a:lumMod val="75000"/>
-                  </a:schemeClr>
-                </a:solidFill>
-              </a:rPr>
-              <a:t>Onderdelen</a:t>
-            </a:r>
-          </a:p>
-          <a:p>
-            <a:pPr marL="914400" lvl="1" indent="-457200">
-              <a:buFont typeface="+mj-lt"/>
-              <a:buAutoNum type="arabicPeriod"/>
-            </a:pPr>
-            <a:r>
-              <a:rPr lang="nl-BE" dirty="0">
-                <a:solidFill>
-                  <a:schemeClr val="bg2">
-                    <a:lumMod val="75000"/>
-                  </a:schemeClr>
-                </a:solidFill>
-              </a:rPr>
-              <a:t>Detectie en lokalisatie</a:t>
-            </a:r>
-          </a:p>
-          <a:p>
-            <a:pPr marL="914400" lvl="1" indent="-457200">
-              <a:buFont typeface="+mj-lt"/>
-              <a:buAutoNum type="arabicPeriod"/>
-            </a:pPr>
-            <a:r>
-              <a:rPr lang="nl-BE" dirty="0">
-                <a:solidFill>
-                  <a:schemeClr val="bg2">
-                    <a:lumMod val="75000"/>
-                  </a:schemeClr>
-                </a:solidFill>
-              </a:rPr>
-              <a:t>Richten</a:t>
-            </a:r>
-          </a:p>
-          <a:p>
-            <a:pPr marL="914400" lvl="1" indent="-457200">
-              <a:buFont typeface="+mj-lt"/>
-              <a:buAutoNum type="arabicPeriod"/>
-            </a:pPr>
-            <a:r>
-              <a:rPr lang="nl-BE" dirty="0">
-                <a:solidFill>
-                  <a:schemeClr val="bg2">
-                    <a:lumMod val="75000"/>
-                  </a:schemeClr>
-                </a:solidFill>
-              </a:rPr>
-              <a:t>Blussen</a:t>
-            </a:r>
-          </a:p>
-          <a:p>
-            <a:pPr marL="457200" indent="-457200">
-              <a:buFont typeface="+mj-lt"/>
-              <a:buAutoNum type="arabicPeriod"/>
-            </a:pPr>
+          <p:cNvPr id="2" name="Text Placeholder 1">
+            <a:extLst>
+              <a:ext uri="{FF2B5EF4-FFF2-40B4-BE49-F238E27FC236}">
+                <a16:creationId xmlns:a16="http://schemas.microsoft.com/office/drawing/2014/main" id="{42671717-52C7-0E8F-8CBA-82691BF1E69D}"/>
+              </a:ext>
+            </a:extLst>
+          </p:cNvPr>
+          <p:cNvSpPr>
+            <a:spLocks noGrp="1"/>
+          </p:cNvSpPr>
+          <p:nvPr>
+            <p:ph type="body" idx="1"/>
+          </p:nvPr>
+        </p:nvSpPr>
+        <p:spPr/>
+        <p:txBody>
+          <a:bodyPr/>
+          <a:lstStyle/>
+          <a:p>
             <a:r>
               <a:rPr lang="nl-BE" dirty="0"/>
-              <a:t>Wat hebben we al gerealiseerd?</a:t>
-            </a:r>
-          </a:p>
-          <a:p>
-            <a:pPr marL="457200" indent="-457200">
-              <a:buFont typeface="+mj-lt"/>
-              <a:buAutoNum type="arabicPeriod"/>
-            </a:pPr>
-            <a:r>
-              <a:rPr lang="nl-BE" dirty="0">
-                <a:solidFill>
-                  <a:schemeClr val="bg2">
-                    <a:lumMod val="75000"/>
-                  </a:schemeClr>
-                </a:solidFill>
-              </a:rPr>
-              <a:t>Wat moeten we nog doen?</a:t>
-            </a:r>
-          </a:p>
-          <a:p>
-            <a:pPr marL="457200" indent="-457200">
-              <a:buFont typeface="+mj-lt"/>
-              <a:buAutoNum type="arabicPeriod"/>
-            </a:pPr>
-            <a:r>
-              <a:rPr lang="nl-BE" dirty="0">
-                <a:solidFill>
-                  <a:schemeClr val="bg2">
-                    <a:lumMod val="75000"/>
-                  </a:schemeClr>
-                </a:solidFill>
-              </a:rPr>
-              <a:t>Besluit</a:t>
-            </a:r>
-          </a:p>
-          <a:p>
-            <a:pPr marL="457200" indent="-457200">
-              <a:buFont typeface="+mj-lt"/>
-              <a:buAutoNum type="arabicPeriod"/>
-            </a:pPr>
-            <a:r>
-              <a:rPr lang="nl-BE" dirty="0">
-                <a:solidFill>
-                  <a:schemeClr val="bg2">
-                    <a:lumMod val="75000"/>
-                  </a:schemeClr>
-                </a:solidFill>
-              </a:rPr>
-              <a:t>Bibliografie</a:t>
-            </a:r>
-          </a:p>
-          <a:p>
-            <a:pPr marL="457200" indent="-457200">
-              <a:buFont typeface="+mj-lt"/>
-              <a:buAutoNum type="arabicPeriod"/>
-            </a:pPr>
+              <a:t>Water en Armen</a:t>
+            </a:r>
+          </a:p>
+        </p:txBody>
+      </p:sp>
+      <p:sp>
+        <p:nvSpPr>
+          <p:cNvPr id="3" name="Content Placeholder 2">
+            <a:extLst>
+              <a:ext uri="{FF2B5EF4-FFF2-40B4-BE49-F238E27FC236}">
+                <a16:creationId xmlns:a16="http://schemas.microsoft.com/office/drawing/2014/main" id="{8FCFCA61-ACBD-CB03-BDBC-7FA6AFD5FF83}"/>
+              </a:ext>
+            </a:extLst>
+          </p:cNvPr>
+          <p:cNvSpPr>
+            <a:spLocks noGrp="1"/>
+          </p:cNvSpPr>
+          <p:nvPr>
+            <p:ph sz="half" idx="2"/>
+          </p:nvPr>
+        </p:nvSpPr>
+        <p:spPr/>
+        <p:txBody>
+          <a:bodyPr/>
+          <a:lstStyle/>
+          <a:p>
+            <a:r>
+              <a:rPr lang="nl-BE" dirty="0"/>
+              <a:t>Code arm richten om afstand tot voorwerp te overbruggen</a:t>
+            </a:r>
+          </a:p>
+          <a:p>
+            <a:r>
+              <a:rPr lang="nl-BE" dirty="0"/>
+              <a:t>Berekening diameter mondstuk</a:t>
+            </a:r>
+          </a:p>
+          <a:p>
             <a:endParaRPr lang="nl-BE" dirty="0"/>
           </a:p>
         </p:txBody>
       </p:sp>
       <p:sp>
         <p:nvSpPr>
-          <p:cNvPr id="3" name="Footer Placeholder 2">
-            <a:extLst>
-              <a:ext uri="{FF2B5EF4-FFF2-40B4-BE49-F238E27FC236}">
-                <a16:creationId xmlns:a16="http://schemas.microsoft.com/office/drawing/2014/main" id="{87B9D861-BADE-1735-BC5D-FB0CE4C31EFE}"/>
+          <p:cNvPr id="4" name="Text Placeholder 3">
+            <a:extLst>
+              <a:ext uri="{FF2B5EF4-FFF2-40B4-BE49-F238E27FC236}">
+                <a16:creationId xmlns:a16="http://schemas.microsoft.com/office/drawing/2014/main" id="{7B23A01F-059C-4587-B76A-B65CAA425AC3}"/>
+              </a:ext>
+            </a:extLst>
+          </p:cNvPr>
+          <p:cNvSpPr>
+            <a:spLocks noGrp="1"/>
+          </p:cNvSpPr>
+          <p:nvPr>
+            <p:ph type="body" sz="quarter" idx="3"/>
+          </p:nvPr>
+        </p:nvSpPr>
+        <p:spPr/>
+        <p:txBody>
+          <a:bodyPr/>
+          <a:lstStyle/>
+          <a:p>
+            <a:endParaRPr lang="nl-BE"/>
+          </a:p>
+        </p:txBody>
+      </p:sp>
+      <p:sp>
+        <p:nvSpPr>
+          <p:cNvPr id="5" name="Content Placeholder 4">
+            <a:extLst>
+              <a:ext uri="{FF2B5EF4-FFF2-40B4-BE49-F238E27FC236}">
+                <a16:creationId xmlns:a16="http://schemas.microsoft.com/office/drawing/2014/main" id="{1EB4A612-97F7-2B20-3DB2-67D253B50602}"/>
+              </a:ext>
+            </a:extLst>
+          </p:cNvPr>
+          <p:cNvSpPr>
+            <a:spLocks noGrp="1"/>
+          </p:cNvSpPr>
+          <p:nvPr>
+            <p:ph sz="quarter" idx="4"/>
+          </p:nvPr>
+        </p:nvSpPr>
+        <p:spPr/>
+        <p:txBody>
+          <a:bodyPr/>
+          <a:lstStyle/>
+          <a:p>
+            <a:endParaRPr lang="nl-BE"/>
+          </a:p>
+        </p:txBody>
+      </p:sp>
+      <p:sp>
+        <p:nvSpPr>
+          <p:cNvPr id="6" name="Footer Placeholder 5">
+            <a:extLst>
+              <a:ext uri="{FF2B5EF4-FFF2-40B4-BE49-F238E27FC236}">
+                <a16:creationId xmlns:a16="http://schemas.microsoft.com/office/drawing/2014/main" id="{8BB99E3E-1E5A-E5EF-E353-65D0EB6CA66E}"/>
               </a:ext>
             </a:extLst>
           </p:cNvPr>
@@ -8354,10 +8563,10 @@
       </p:sp>
       <p:sp>
         <p:nvSpPr>
-          <p:cNvPr id="4" name="Slide Number Placeholder 3">
-            <a:extLst>
-              <a:ext uri="{FF2B5EF4-FFF2-40B4-BE49-F238E27FC236}">
-                <a16:creationId xmlns:a16="http://schemas.microsoft.com/office/drawing/2014/main" id="{FC23E00C-3A77-A444-8280-8A8A5D17B5DF}"/>
+          <p:cNvPr id="7" name="Slide Number Placeholder 6">
+            <a:extLst>
+              <a:ext uri="{FF2B5EF4-FFF2-40B4-BE49-F238E27FC236}">
+                <a16:creationId xmlns:a16="http://schemas.microsoft.com/office/drawing/2014/main" id="{D380BCEF-6875-4D68-E6BB-B225F0B47195}"/>
               </a:ext>
             </a:extLst>
           </p:cNvPr>
@@ -8383,10 +8592,10 @@
       </p:sp>
       <p:sp>
         <p:nvSpPr>
-          <p:cNvPr id="5" name="Title 4">
-            <a:extLst>
-              <a:ext uri="{FF2B5EF4-FFF2-40B4-BE49-F238E27FC236}">
-                <a16:creationId xmlns:a16="http://schemas.microsoft.com/office/drawing/2014/main" id="{344F2F4D-955A-2213-B685-181EC6CE1CBA}"/>
+          <p:cNvPr id="8" name="Title 7">
+            <a:extLst>
+              <a:ext uri="{FF2B5EF4-FFF2-40B4-BE49-F238E27FC236}">
+                <a16:creationId xmlns:a16="http://schemas.microsoft.com/office/drawing/2014/main" id="{1050185B-6923-7C42-87E5-8D5CD63462E1}"/>
               </a:ext>
             </a:extLst>
           </p:cNvPr>
@@ -8404,7 +8613,7 @@
           <a:p>
             <a:r>
               <a:rPr lang="nl-BE" dirty="0"/>
-              <a:t>Overzicht</a:t>
+              <a:t>Wat hebben we al gerealiseerd?</a:t>
             </a:r>
           </a:p>
         </p:txBody>
@@ -8412,7 +8621,7 @@
     </p:spTree>
     <p:extLst>
       <p:ext uri="{BB962C8B-B14F-4D97-AF65-F5344CB8AC3E}">
-        <p14:creationId xmlns:p14="http://schemas.microsoft.com/office/powerpoint/2010/main" val="244562561"/>
+        <p14:creationId xmlns:p14="http://schemas.microsoft.com/office/powerpoint/2010/main" val="2196326793"/>
       </p:ext>
     </p:extLst>
   </p:cSld>
@@ -8444,7 +8653,7 @@
           <p:cNvPr id="2" name="Content Placeholder 1">
             <a:extLst>
               <a:ext uri="{FF2B5EF4-FFF2-40B4-BE49-F238E27FC236}">
-                <a16:creationId xmlns:a16="http://schemas.microsoft.com/office/drawing/2014/main" id="{5260AF46-65B7-D5F6-05E6-E21379E49831}"/>
+                <a16:creationId xmlns:a16="http://schemas.microsoft.com/office/drawing/2014/main" id="{9572C954-C83C-EE79-685B-900385B3EC4B}"/>
               </a:ext>
             </a:extLst>
           </p:cNvPr>
@@ -8455,12 +8664,177 @@
             <p:ph idx="1"/>
           </p:nvPr>
         </p:nvSpPr>
-        <p:spPr/>
-        <p:txBody>
-          <a:bodyPr/>
-          <a:lstStyle/>
-          <a:p>
-            <a:endParaRPr lang="nl-BE"/>
+        <p:spPr>
+          <a:xfrm>
+            <a:off x="576000" y="1656000"/>
+            <a:ext cx="11041200" cy="4554000"/>
+          </a:xfrm>
+        </p:spPr>
+        <p:txBody>
+          <a:bodyPr>
+            <a:normAutofit lnSpcReduction="10000"/>
+          </a:bodyPr>
+          <a:lstStyle/>
+          <a:p>
+            <a:pPr marL="457200" indent="-457200">
+              <a:buFont typeface="+mj-lt"/>
+              <a:buAutoNum type="arabicPeriod"/>
+            </a:pPr>
+            <a:r>
+              <a:rPr lang="nl-BE" dirty="0">
+                <a:solidFill>
+                  <a:schemeClr val="bg2">
+                    <a:lumMod val="75000"/>
+                  </a:schemeClr>
+                </a:solidFill>
+              </a:rPr>
+              <a:t>Inleiding</a:t>
+            </a:r>
+          </a:p>
+          <a:p>
+            <a:pPr marL="457200" indent="-457200">
+              <a:buFont typeface="+mj-lt"/>
+              <a:buAutoNum type="arabicPeriod"/>
+            </a:pPr>
+            <a:r>
+              <a:rPr lang="nl-BE" dirty="0">
+                <a:solidFill>
+                  <a:schemeClr val="bg2">
+                    <a:lumMod val="75000"/>
+                  </a:schemeClr>
+                </a:solidFill>
+              </a:rPr>
+              <a:t>Ontwerp</a:t>
+            </a:r>
+          </a:p>
+          <a:p>
+            <a:pPr marL="457200" indent="-457200">
+              <a:buFont typeface="+mj-lt"/>
+              <a:buAutoNum type="arabicPeriod"/>
+            </a:pPr>
+            <a:r>
+              <a:rPr lang="nl-BE" dirty="0">
+                <a:solidFill>
+                  <a:schemeClr val="bg2">
+                    <a:lumMod val="75000"/>
+                  </a:schemeClr>
+                </a:solidFill>
+              </a:rPr>
+              <a:t>Onderdelen</a:t>
+            </a:r>
+          </a:p>
+          <a:p>
+            <a:pPr marL="914400" lvl="1" indent="-457200">
+              <a:buFont typeface="+mj-lt"/>
+              <a:buAutoNum type="arabicPeriod"/>
+            </a:pPr>
+            <a:r>
+              <a:rPr lang="nl-BE" dirty="0">
+                <a:solidFill>
+                  <a:schemeClr val="bg2">
+                    <a:lumMod val="75000"/>
+                  </a:schemeClr>
+                </a:solidFill>
+              </a:rPr>
+              <a:t>Detectie en lokalisatie</a:t>
+            </a:r>
+          </a:p>
+          <a:p>
+            <a:pPr marL="914400" lvl="1" indent="-457200">
+              <a:buFont typeface="+mj-lt"/>
+              <a:buAutoNum type="arabicPeriod"/>
+            </a:pPr>
+            <a:r>
+              <a:rPr lang="nl-BE" dirty="0">
+                <a:solidFill>
+                  <a:schemeClr val="bg2">
+                    <a:lumMod val="75000"/>
+                  </a:schemeClr>
+                </a:solidFill>
+              </a:rPr>
+              <a:t>Richten</a:t>
+            </a:r>
+          </a:p>
+          <a:p>
+            <a:pPr marL="914400" lvl="1" indent="-457200">
+              <a:buFont typeface="+mj-lt"/>
+              <a:buAutoNum type="arabicPeriod"/>
+            </a:pPr>
+            <a:r>
+              <a:rPr lang="nl-BE" dirty="0">
+                <a:solidFill>
+                  <a:schemeClr val="bg2">
+                    <a:lumMod val="75000"/>
+                  </a:schemeClr>
+                </a:solidFill>
+              </a:rPr>
+              <a:t>Blussen</a:t>
+            </a:r>
+          </a:p>
+          <a:p>
+            <a:pPr marL="457200" indent="-457200">
+              <a:buFont typeface="+mj-lt"/>
+              <a:buAutoNum type="arabicPeriod"/>
+            </a:pPr>
+            <a:r>
+              <a:rPr lang="nl-BE" dirty="0">
+                <a:solidFill>
+                  <a:schemeClr val="bg2">
+                    <a:lumMod val="75000"/>
+                  </a:schemeClr>
+                </a:solidFill>
+              </a:rPr>
+              <a:t>Wat hebben we al gerealiseerd?</a:t>
+            </a:r>
+          </a:p>
+          <a:p>
+            <a:pPr marL="457200" indent="-457200">
+              <a:buFont typeface="+mj-lt"/>
+              <a:buAutoNum type="arabicPeriod"/>
+            </a:pPr>
+            <a:r>
+              <a:rPr lang="nl-BE" dirty="0"/>
+              <a:t>Wat moeten we nog doen?</a:t>
+            </a:r>
+          </a:p>
+          <a:p>
+            <a:pPr marL="457200" indent="-457200">
+              <a:buFont typeface="+mj-lt"/>
+              <a:buAutoNum type="arabicPeriod"/>
+            </a:pPr>
+            <a:r>
+              <a:rPr lang="nl-BE" dirty="0">
+                <a:solidFill>
+                  <a:schemeClr val="bg2">
+                    <a:lumMod val="75000"/>
+                  </a:schemeClr>
+                </a:solidFill>
+              </a:rPr>
+              <a:t>Besluit</a:t>
+            </a:r>
+          </a:p>
+          <a:p>
+            <a:pPr marL="457200" indent="-457200">
+              <a:buFont typeface="+mj-lt"/>
+              <a:buAutoNum type="arabicPeriod"/>
+            </a:pPr>
+            <a:r>
+              <a:rPr lang="nl-BE" dirty="0">
+                <a:solidFill>
+                  <a:schemeClr val="bg2">
+                    <a:lumMod val="75000"/>
+                  </a:schemeClr>
+                </a:solidFill>
+              </a:rPr>
+              <a:t>Bibliografie</a:t>
+            </a:r>
+          </a:p>
+          <a:p>
+            <a:pPr marL="457200" indent="-457200">
+              <a:buFont typeface="+mj-lt"/>
+              <a:buAutoNum type="arabicPeriod"/>
+            </a:pPr>
+            <a:endParaRPr lang="nl-BE" dirty="0"/>
           </a:p>
         </p:txBody>
       </p:sp>
@@ -8469,7 +8843,7 @@
           <p:cNvPr id="3" name="Footer Placeholder 2">
             <a:extLst>
               <a:ext uri="{FF2B5EF4-FFF2-40B4-BE49-F238E27FC236}">
-                <a16:creationId xmlns:a16="http://schemas.microsoft.com/office/drawing/2014/main" id="{9EF1A00F-E0D2-4C00-0678-32E557838D7E}"/>
+                <a16:creationId xmlns:a16="http://schemas.microsoft.com/office/drawing/2014/main" id="{87B9D861-BADE-1735-BC5D-FB0CE4C31EFE}"/>
               </a:ext>
             </a:extLst>
           </p:cNvPr>
@@ -8497,7 +8871,7 @@
           <p:cNvPr id="4" name="Slide Number Placeholder 3">
             <a:extLst>
               <a:ext uri="{FF2B5EF4-FFF2-40B4-BE49-F238E27FC236}">
-                <a16:creationId xmlns:a16="http://schemas.microsoft.com/office/drawing/2014/main" id="{8987AFD2-E0BB-A1F5-B919-E51E216513EB}"/>
+                <a16:creationId xmlns:a16="http://schemas.microsoft.com/office/drawing/2014/main" id="{FC23E00C-3A77-A444-8280-8A8A5D17B5DF}"/>
               </a:ext>
             </a:extLst>
           </p:cNvPr>
@@ -8526,7 +8900,7 @@
           <p:cNvPr id="5" name="Title 4">
             <a:extLst>
               <a:ext uri="{FF2B5EF4-FFF2-40B4-BE49-F238E27FC236}">
-                <a16:creationId xmlns:a16="http://schemas.microsoft.com/office/drawing/2014/main" id="{B629BCE4-9E98-F904-19C5-E30F08530C61}"/>
+                <a16:creationId xmlns:a16="http://schemas.microsoft.com/office/drawing/2014/main" id="{344F2F4D-955A-2213-B685-181EC6CE1CBA}"/>
               </a:ext>
             </a:extLst>
           </p:cNvPr>
@@ -8544,7 +8918,7 @@
           <a:p>
             <a:r>
               <a:rPr lang="nl-BE" dirty="0"/>
-              <a:t>Wat hebben we al gerealiseerd?</a:t>
+              <a:t>Overzicht</a:t>
             </a:r>
           </a:p>
         </p:txBody>
@@ -8552,7 +8926,7 @@
     </p:spTree>
     <p:extLst>
       <p:ext uri="{BB962C8B-B14F-4D97-AF65-F5344CB8AC3E}">
-        <p14:creationId xmlns:p14="http://schemas.microsoft.com/office/powerpoint/2010/main" val="578053596"/>
+        <p14:creationId xmlns:p14="http://schemas.microsoft.com/office/powerpoint/2010/main" val="2118278311"/>
       </p:ext>
     </p:extLst>
   </p:cSld>
@@ -8581,200 +8955,128 @@
       </p:grpSpPr>
       <p:sp>
         <p:nvSpPr>
-          <p:cNvPr id="2" name="Content Placeholder 1">
-            <a:extLst>
-              <a:ext uri="{FF2B5EF4-FFF2-40B4-BE49-F238E27FC236}">
-                <a16:creationId xmlns:a16="http://schemas.microsoft.com/office/drawing/2014/main" id="{9572C954-C83C-EE79-685B-900385B3EC4B}"/>
-              </a:ext>
-            </a:extLst>
-          </p:cNvPr>
-          <p:cNvSpPr>
-            <a:spLocks noGrp="1"/>
-          </p:cNvSpPr>
-          <p:nvPr>
-            <p:ph idx="1"/>
-          </p:nvPr>
-        </p:nvSpPr>
-        <p:spPr>
-          <a:xfrm>
-            <a:off x="576000" y="1656000"/>
-            <a:ext cx="11041200" cy="4554000"/>
-          </a:xfrm>
-        </p:spPr>
-        <p:txBody>
-          <a:bodyPr>
-            <a:normAutofit lnSpcReduction="10000"/>
-          </a:bodyPr>
-          <a:lstStyle/>
-          <a:p>
-            <a:pPr marL="457200" indent="-457200">
-              <a:buFont typeface="+mj-lt"/>
-              <a:buAutoNum type="arabicPeriod"/>
-            </a:pPr>
-            <a:r>
-              <a:rPr lang="nl-BE" dirty="0">
-                <a:solidFill>
-                  <a:schemeClr val="bg2">
-                    <a:lumMod val="75000"/>
-                  </a:schemeClr>
-                </a:solidFill>
-              </a:rPr>
-              <a:t>Inleiding</a:t>
-            </a:r>
-          </a:p>
-          <a:p>
-            <a:pPr marL="457200" indent="-457200">
-              <a:buFont typeface="+mj-lt"/>
-              <a:buAutoNum type="arabicPeriod"/>
-            </a:pPr>
-            <a:r>
-              <a:rPr lang="nl-BE" dirty="0">
-                <a:solidFill>
-                  <a:schemeClr val="bg2">
-                    <a:lumMod val="75000"/>
-                  </a:schemeClr>
-                </a:solidFill>
-              </a:rPr>
-              <a:t>Ontwerp</a:t>
-            </a:r>
-          </a:p>
-          <a:p>
-            <a:pPr marL="457200" indent="-457200">
-              <a:buFont typeface="+mj-lt"/>
-              <a:buAutoNum type="arabicPeriod"/>
-            </a:pPr>
-            <a:r>
-              <a:rPr lang="nl-BE" dirty="0">
-                <a:solidFill>
-                  <a:schemeClr val="bg2">
-                    <a:lumMod val="75000"/>
-                  </a:schemeClr>
-                </a:solidFill>
-              </a:rPr>
-              <a:t>Onderdelen</a:t>
-            </a:r>
-          </a:p>
-          <a:p>
-            <a:pPr marL="914400" lvl="1" indent="-457200">
-              <a:buFont typeface="+mj-lt"/>
-              <a:buAutoNum type="arabicPeriod"/>
-            </a:pPr>
-            <a:r>
-              <a:rPr lang="nl-BE" dirty="0">
-                <a:solidFill>
-                  <a:schemeClr val="bg2">
-                    <a:lumMod val="75000"/>
-                  </a:schemeClr>
-                </a:solidFill>
-              </a:rPr>
-              <a:t>Detectie en lokalisatie</a:t>
-            </a:r>
-          </a:p>
-          <a:p>
-            <a:pPr marL="914400" lvl="1" indent="-457200">
-              <a:buFont typeface="+mj-lt"/>
-              <a:buAutoNum type="arabicPeriod"/>
-            </a:pPr>
-            <a:r>
-              <a:rPr lang="nl-BE" dirty="0">
-                <a:solidFill>
-                  <a:schemeClr val="bg2">
-                    <a:lumMod val="75000"/>
-                  </a:schemeClr>
-                </a:solidFill>
-              </a:rPr>
+          <p:cNvPr id="2" name="Text Placeholder 1">
+            <a:extLst>
+              <a:ext uri="{FF2B5EF4-FFF2-40B4-BE49-F238E27FC236}">
+                <a16:creationId xmlns:a16="http://schemas.microsoft.com/office/drawing/2014/main" id="{AA374080-FDE0-F154-2EF7-C8C94C09C5A2}"/>
+              </a:ext>
+            </a:extLst>
+          </p:cNvPr>
+          <p:cNvSpPr>
+            <a:spLocks noGrp="1"/>
+          </p:cNvSpPr>
+          <p:nvPr>
+            <p:ph type="body" idx="1"/>
+          </p:nvPr>
+        </p:nvSpPr>
+        <p:spPr/>
+        <p:txBody>
+          <a:bodyPr/>
+          <a:lstStyle/>
+          <a:p>
+            <a:r>
+              <a:rPr lang="nl-BE" dirty="0"/>
+              <a:t>Lokalisatie</a:t>
+            </a:r>
+          </a:p>
+        </p:txBody>
+      </p:sp>
+      <p:sp>
+        <p:nvSpPr>
+          <p:cNvPr id="3" name="Content Placeholder 2">
+            <a:extLst>
+              <a:ext uri="{FF2B5EF4-FFF2-40B4-BE49-F238E27FC236}">
+                <a16:creationId xmlns:a16="http://schemas.microsoft.com/office/drawing/2014/main" id="{B4833FFA-663B-841C-AB8D-5402BE0BA8E2}"/>
+              </a:ext>
+            </a:extLst>
+          </p:cNvPr>
+          <p:cNvSpPr>
+            <a:spLocks noGrp="1"/>
+          </p:cNvSpPr>
+          <p:nvPr>
+            <p:ph sz="half" idx="2"/>
+          </p:nvPr>
+        </p:nvSpPr>
+        <p:spPr/>
+        <p:txBody>
+          <a:bodyPr/>
+          <a:lstStyle/>
+          <a:p>
+            <a:r>
+              <a:rPr lang="nl-BE" dirty="0"/>
+              <a:t>Testen uitvoeren en indien nodig camera kalibreren</a:t>
+            </a:r>
+          </a:p>
+          <a:p>
+            <a:r>
+              <a:rPr lang="nl-BE" dirty="0"/>
+              <a:t>Aanpassingen aan code als verwarring tussen voorwerpen</a:t>
+            </a:r>
+          </a:p>
+          <a:p>
+            <a:endParaRPr lang="nl-BE" dirty="0"/>
+          </a:p>
+        </p:txBody>
+      </p:sp>
+      <p:sp>
+        <p:nvSpPr>
+          <p:cNvPr id="4" name="Text Placeholder 3">
+            <a:extLst>
+              <a:ext uri="{FF2B5EF4-FFF2-40B4-BE49-F238E27FC236}">
+                <a16:creationId xmlns:a16="http://schemas.microsoft.com/office/drawing/2014/main" id="{035C8CD6-38C8-C526-0B17-94D0463F146A}"/>
+              </a:ext>
+            </a:extLst>
+          </p:cNvPr>
+          <p:cNvSpPr>
+            <a:spLocks noGrp="1"/>
+          </p:cNvSpPr>
+          <p:nvPr>
+            <p:ph type="body" sz="quarter" idx="3"/>
+          </p:nvPr>
+        </p:nvSpPr>
+        <p:spPr/>
+        <p:txBody>
+          <a:bodyPr/>
+          <a:lstStyle/>
+          <a:p>
+            <a:r>
+              <a:rPr lang="nl-BE" dirty="0"/>
               <a:t>Richten</a:t>
             </a:r>
           </a:p>
-          <a:p>
-            <a:pPr marL="914400" lvl="1" indent="-457200">
-              <a:buFont typeface="+mj-lt"/>
-              <a:buAutoNum type="arabicPeriod"/>
-            </a:pPr>
-            <a:r>
-              <a:rPr lang="nl-BE" dirty="0">
-                <a:solidFill>
-                  <a:schemeClr val="bg2">
-                    <a:lumMod val="75000"/>
-                  </a:schemeClr>
-                </a:solidFill>
-              </a:rPr>
-              <a:t>Blussen</a:t>
-            </a:r>
-          </a:p>
-          <a:p>
-            <a:pPr marL="457200" indent="-457200">
-              <a:buFont typeface="+mj-lt"/>
-              <a:buAutoNum type="arabicPeriod"/>
-            </a:pPr>
-            <a:r>
-              <a:rPr lang="nl-BE" dirty="0">
-                <a:solidFill>
-                  <a:schemeClr val="bg2">
-                    <a:lumMod val="75000"/>
-                  </a:schemeClr>
-                </a:solidFill>
-              </a:rPr>
-              <a:t>Wat hebben we al gerealiseerd?</a:t>
-            </a:r>
-          </a:p>
-          <a:p>
-            <a:pPr marL="457200" indent="-457200">
-              <a:buFont typeface="+mj-lt"/>
-              <a:buAutoNum type="arabicPeriod"/>
-            </a:pPr>
-            <a:r>
-              <a:rPr lang="nl-BE" dirty="0"/>
-              <a:t>Wat moeten we nog doen?</a:t>
-            </a:r>
-          </a:p>
-          <a:p>
-            <a:pPr marL="457200" indent="-457200">
-              <a:buFont typeface="+mj-lt"/>
-              <a:buAutoNum type="arabicPeriod"/>
-            </a:pPr>
-            <a:r>
-              <a:rPr lang="nl-BE" dirty="0">
-                <a:solidFill>
-                  <a:schemeClr val="bg2">
-                    <a:lumMod val="75000"/>
-                  </a:schemeClr>
-                </a:solidFill>
-              </a:rPr>
-              <a:t>Besluit</a:t>
-            </a:r>
-          </a:p>
-          <a:p>
-            <a:pPr marL="457200" indent="-457200">
-              <a:buFont typeface="+mj-lt"/>
-              <a:buAutoNum type="arabicPeriod"/>
-            </a:pPr>
-            <a:r>
-              <a:rPr lang="nl-BE" dirty="0">
-                <a:solidFill>
-                  <a:schemeClr val="bg2">
-                    <a:lumMod val="75000"/>
-                  </a:schemeClr>
-                </a:solidFill>
-              </a:rPr>
-              <a:t>Bibliografie</a:t>
-            </a:r>
-          </a:p>
-          <a:p>
-            <a:pPr marL="457200" indent="-457200">
-              <a:buFont typeface="+mj-lt"/>
-              <a:buAutoNum type="arabicPeriod"/>
-            </a:pPr>
-            <a:endParaRPr lang="nl-BE" dirty="0"/>
-          </a:p>
-        </p:txBody>
-      </p:sp>
-      <p:sp>
-        <p:nvSpPr>
-          <p:cNvPr id="3" name="Footer Placeholder 2">
-            <a:extLst>
-              <a:ext uri="{FF2B5EF4-FFF2-40B4-BE49-F238E27FC236}">
-                <a16:creationId xmlns:a16="http://schemas.microsoft.com/office/drawing/2014/main" id="{87B9D861-BADE-1735-BC5D-FB0CE4C31EFE}"/>
+        </p:txBody>
+      </p:sp>
+      <p:sp>
+        <p:nvSpPr>
+          <p:cNvPr id="5" name="Content Placeholder 4">
+            <a:extLst>
+              <a:ext uri="{FF2B5EF4-FFF2-40B4-BE49-F238E27FC236}">
+                <a16:creationId xmlns:a16="http://schemas.microsoft.com/office/drawing/2014/main" id="{1E0811B4-F1E3-FAFC-E95A-C1AE5891E7A0}"/>
+              </a:ext>
+            </a:extLst>
+          </p:cNvPr>
+          <p:cNvSpPr>
+            <a:spLocks noGrp="1"/>
+          </p:cNvSpPr>
+          <p:nvPr>
+            <p:ph sz="quarter" idx="4"/>
+          </p:nvPr>
+        </p:nvSpPr>
+        <p:spPr/>
+        <p:txBody>
+          <a:bodyPr/>
+          <a:lstStyle/>
+          <a:p>
+            <a:endParaRPr lang="nl-BE"/>
+          </a:p>
+        </p:txBody>
+      </p:sp>
+      <p:sp>
+        <p:nvSpPr>
+          <p:cNvPr id="6" name="Footer Placeholder 5">
+            <a:extLst>
+              <a:ext uri="{FF2B5EF4-FFF2-40B4-BE49-F238E27FC236}">
+                <a16:creationId xmlns:a16="http://schemas.microsoft.com/office/drawing/2014/main" id="{A5D769F1-6CBB-431E-4C1F-357F61F51094}"/>
               </a:ext>
             </a:extLst>
           </p:cNvPr>
@@ -8799,10 +9101,10 @@
       </p:sp>
       <p:sp>
         <p:nvSpPr>
-          <p:cNvPr id="4" name="Slide Number Placeholder 3">
-            <a:extLst>
-              <a:ext uri="{FF2B5EF4-FFF2-40B4-BE49-F238E27FC236}">
-                <a16:creationId xmlns:a16="http://schemas.microsoft.com/office/drawing/2014/main" id="{FC23E00C-3A77-A444-8280-8A8A5D17B5DF}"/>
+          <p:cNvPr id="7" name="Slide Number Placeholder 6">
+            <a:extLst>
+              <a:ext uri="{FF2B5EF4-FFF2-40B4-BE49-F238E27FC236}">
+                <a16:creationId xmlns:a16="http://schemas.microsoft.com/office/drawing/2014/main" id="{573F4B3D-FE69-DD51-2A8E-A739C269E0DC}"/>
               </a:ext>
             </a:extLst>
           </p:cNvPr>
@@ -8828,10 +9130,10 @@
       </p:sp>
       <p:sp>
         <p:nvSpPr>
-          <p:cNvPr id="5" name="Title 4">
-            <a:extLst>
-              <a:ext uri="{FF2B5EF4-FFF2-40B4-BE49-F238E27FC236}">
-                <a16:creationId xmlns:a16="http://schemas.microsoft.com/office/drawing/2014/main" id="{344F2F4D-955A-2213-B685-181EC6CE1CBA}"/>
+          <p:cNvPr id="8" name="Title 7">
+            <a:extLst>
+              <a:ext uri="{FF2B5EF4-FFF2-40B4-BE49-F238E27FC236}">
+                <a16:creationId xmlns:a16="http://schemas.microsoft.com/office/drawing/2014/main" id="{07D18A09-467D-D5A0-79C1-C8F36D7960C6}"/>
               </a:ext>
             </a:extLst>
           </p:cNvPr>
@@ -8849,7 +9151,7 @@
           <a:p>
             <a:r>
               <a:rPr lang="nl-BE" dirty="0"/>
-              <a:t>Overzicht</a:t>
+              <a:t>Wat moeten we nog doen?</a:t>
             </a:r>
           </a:p>
         </p:txBody>
@@ -8857,7 +9159,7 @@
     </p:spTree>
     <p:extLst>
       <p:ext uri="{BB962C8B-B14F-4D97-AF65-F5344CB8AC3E}">
-        <p14:creationId xmlns:p14="http://schemas.microsoft.com/office/powerpoint/2010/main" val="2118278311"/>
+        <p14:creationId xmlns:p14="http://schemas.microsoft.com/office/powerpoint/2010/main" val="61076732"/>
       </p:ext>
     </p:extLst>
   </p:cSld>
@@ -8889,7 +9191,7 @@
           <p:cNvPr id="2" name="Text Placeholder 1">
             <a:extLst>
               <a:ext uri="{FF2B5EF4-FFF2-40B4-BE49-F238E27FC236}">
-                <a16:creationId xmlns:a16="http://schemas.microsoft.com/office/drawing/2014/main" id="{AA374080-FDE0-F154-2EF7-C8C94C09C5A2}"/>
+                <a16:creationId xmlns:a16="http://schemas.microsoft.com/office/drawing/2014/main" id="{AD42E057-EFE4-72C3-E92E-B658AF552CBA}"/>
               </a:ext>
             </a:extLst>
           </p:cNvPr>
@@ -8905,24 +9207,52 @@
           <a:bodyPr/>
           <a:lstStyle/>
           <a:p>
+            <a:r>
+              <a:rPr lang="nl-BE" dirty="0"/>
+              <a:t>Water</a:t>
+            </a:r>
+          </a:p>
+        </p:txBody>
+      </p:sp>
+      <p:sp>
+        <p:nvSpPr>
+          <p:cNvPr id="3" name="Content Placeholder 2">
+            <a:extLst>
+              <a:ext uri="{FF2B5EF4-FFF2-40B4-BE49-F238E27FC236}">
+                <a16:creationId xmlns:a16="http://schemas.microsoft.com/office/drawing/2014/main" id="{951D2737-1D0F-7ECF-F041-F698153EE01C}"/>
+              </a:ext>
+            </a:extLst>
+          </p:cNvPr>
+          <p:cNvSpPr>
+            <a:spLocks noGrp="1"/>
+          </p:cNvSpPr>
+          <p:nvPr>
+            <p:ph sz="half" idx="2"/>
+          </p:nvPr>
+        </p:nvSpPr>
+        <p:spPr/>
+        <p:txBody>
+          <a:bodyPr/>
+          <a:lstStyle/>
+          <a:p>
             <a:endParaRPr lang="nl-BE"/>
           </a:p>
         </p:txBody>
       </p:sp>
       <p:sp>
         <p:nvSpPr>
-          <p:cNvPr id="3" name="Content Placeholder 2">
-            <a:extLst>
-              <a:ext uri="{FF2B5EF4-FFF2-40B4-BE49-F238E27FC236}">
-                <a16:creationId xmlns:a16="http://schemas.microsoft.com/office/drawing/2014/main" id="{B4833FFA-663B-841C-AB8D-5402BE0BA8E2}"/>
-              </a:ext>
-            </a:extLst>
-          </p:cNvPr>
-          <p:cNvSpPr>
-            <a:spLocks noGrp="1"/>
-          </p:cNvSpPr>
-          <p:nvPr>
-            <p:ph sz="half" idx="2"/>
+          <p:cNvPr id="4" name="Text Placeholder 3">
+            <a:extLst>
+              <a:ext uri="{FF2B5EF4-FFF2-40B4-BE49-F238E27FC236}">
+                <a16:creationId xmlns:a16="http://schemas.microsoft.com/office/drawing/2014/main" id="{9F54CFBB-7DA6-779C-1ADC-29AF5A9E6C3F}"/>
+              </a:ext>
+            </a:extLst>
+          </p:cNvPr>
+          <p:cNvSpPr>
+            <a:spLocks noGrp="1"/>
+          </p:cNvSpPr>
+          <p:nvPr>
+            <p:ph type="body" sz="quarter" idx="3"/>
           </p:nvPr>
         </p:nvSpPr>
         <p:spPr/>
@@ -8936,18 +9266,18 @@
       </p:sp>
       <p:sp>
         <p:nvSpPr>
-          <p:cNvPr id="4" name="Text Placeholder 3">
-            <a:extLst>
-              <a:ext uri="{FF2B5EF4-FFF2-40B4-BE49-F238E27FC236}">
-                <a16:creationId xmlns:a16="http://schemas.microsoft.com/office/drawing/2014/main" id="{035C8CD6-38C8-C526-0B17-94D0463F146A}"/>
-              </a:ext>
-            </a:extLst>
-          </p:cNvPr>
-          <p:cNvSpPr>
-            <a:spLocks noGrp="1"/>
-          </p:cNvSpPr>
-          <p:nvPr>
-            <p:ph type="body" sz="quarter" idx="3"/>
+          <p:cNvPr id="5" name="Content Placeholder 4">
+            <a:extLst>
+              <a:ext uri="{FF2B5EF4-FFF2-40B4-BE49-F238E27FC236}">
+                <a16:creationId xmlns:a16="http://schemas.microsoft.com/office/drawing/2014/main" id="{747486B2-8306-0167-D24A-784D8DCAA856}"/>
+              </a:ext>
+            </a:extLst>
+          </p:cNvPr>
+          <p:cNvSpPr>
+            <a:spLocks noGrp="1"/>
+          </p:cNvSpPr>
+          <p:nvPr>
+            <p:ph sz="quarter" idx="4"/>
           </p:nvPr>
         </p:nvSpPr>
         <p:spPr/>
@@ -8961,35 +9291,10 @@
       </p:sp>
       <p:sp>
         <p:nvSpPr>
-          <p:cNvPr id="5" name="Content Placeholder 4">
-            <a:extLst>
-              <a:ext uri="{FF2B5EF4-FFF2-40B4-BE49-F238E27FC236}">
-                <a16:creationId xmlns:a16="http://schemas.microsoft.com/office/drawing/2014/main" id="{1E0811B4-F1E3-FAFC-E95A-C1AE5891E7A0}"/>
-              </a:ext>
-            </a:extLst>
-          </p:cNvPr>
-          <p:cNvSpPr>
-            <a:spLocks noGrp="1"/>
-          </p:cNvSpPr>
-          <p:nvPr>
-            <p:ph sz="quarter" idx="4"/>
-          </p:nvPr>
-        </p:nvSpPr>
-        <p:spPr/>
-        <p:txBody>
-          <a:bodyPr/>
-          <a:lstStyle/>
-          <a:p>
-            <a:endParaRPr lang="nl-BE"/>
-          </a:p>
-        </p:txBody>
-      </p:sp>
-      <p:sp>
-        <p:nvSpPr>
           <p:cNvPr id="6" name="Footer Placeholder 5">
             <a:extLst>
               <a:ext uri="{FF2B5EF4-FFF2-40B4-BE49-F238E27FC236}">
-                <a16:creationId xmlns:a16="http://schemas.microsoft.com/office/drawing/2014/main" id="{A5D769F1-6CBB-431E-4C1F-357F61F51094}"/>
+                <a16:creationId xmlns:a16="http://schemas.microsoft.com/office/drawing/2014/main" id="{09D62747-77D2-295E-008A-9E5B4B0C7B75}"/>
               </a:ext>
             </a:extLst>
           </p:cNvPr>
@@ -9017,7 +9322,7 @@
           <p:cNvPr id="7" name="Slide Number Placeholder 6">
             <a:extLst>
               <a:ext uri="{FF2B5EF4-FFF2-40B4-BE49-F238E27FC236}">
-                <a16:creationId xmlns:a16="http://schemas.microsoft.com/office/drawing/2014/main" id="{573F4B3D-FE69-DD51-2A8E-A739C269E0DC}"/>
+                <a16:creationId xmlns:a16="http://schemas.microsoft.com/office/drawing/2014/main" id="{E46571D5-FFC0-C3FE-DC7F-471E263E400E}"/>
               </a:ext>
             </a:extLst>
           </p:cNvPr>
@@ -9046,7 +9351,7 @@
           <p:cNvPr id="8" name="Title 7">
             <a:extLst>
               <a:ext uri="{FF2B5EF4-FFF2-40B4-BE49-F238E27FC236}">
-                <a16:creationId xmlns:a16="http://schemas.microsoft.com/office/drawing/2014/main" id="{07D18A09-467D-D5A0-79C1-C8F36D7960C6}"/>
+                <a16:creationId xmlns:a16="http://schemas.microsoft.com/office/drawing/2014/main" id="{89B9F6DE-7B12-89C9-3E56-D29F680983DD}"/>
               </a:ext>
             </a:extLst>
           </p:cNvPr>
@@ -9072,7 +9377,7 @@
     </p:spTree>
     <p:extLst>
       <p:ext uri="{BB962C8B-B14F-4D97-AF65-F5344CB8AC3E}">
-        <p14:creationId xmlns:p14="http://schemas.microsoft.com/office/powerpoint/2010/main" val="61076732"/>
+        <p14:creationId xmlns:p14="http://schemas.microsoft.com/office/powerpoint/2010/main" val="95221954"/>
       </p:ext>
     </p:extLst>
   </p:cSld>
@@ -9425,7 +9730,7 @@
           <a:bodyPr/>
           <a:lstStyle/>
           <a:p>
-            <a:endParaRPr lang="nl-BE"/>
+            <a:endParaRPr lang="nl-BE" dirty="0"/>
           </a:p>
         </p:txBody>
       </p:sp>
@@ -9872,13 +10177,30 @@
           <a:p>
             <a:r>
               <a:rPr lang="nl-BE" dirty="0"/>
-              <a:t>Foto sprinkler: </a:t>
+              <a:t>Foto slide 4: </a:t>
             </a:r>
             <a:r>
               <a:rPr lang="en-GB" dirty="0">
                 <a:hlinkClick r:id="rId2"/>
               </a:rPr>
               <a:t>Atlanta Fire Sprinkler System Maintenance, Inspection | Fire Systems, Inc</a:t>
+            </a:r>
+            <a:endParaRPr lang="en-GB" dirty="0"/>
+          </a:p>
+          <a:p>
+            <a:r>
+              <a:rPr lang="en-GB" dirty="0" err="1"/>
+              <a:t>Foto</a:t>
+            </a:r>
+            <a:r>
+              <a:rPr lang="en-GB" dirty="0"/>
+              <a:t> slide 5: </a:t>
+            </a:r>
+            <a:r>
+              <a:rPr lang="en-GB" dirty="0">
+                <a:hlinkClick r:id="rId3"/>
+              </a:rPr>
+              <a:t>Fire Fighting – Home (fsip.co.uk)</a:t>
             </a:r>
             <a:endParaRPr lang="nl-BE" dirty="0"/>
           </a:p>
@@ -10760,6 +11082,53 @@
           </a:p>
         </p:txBody>
       </p:sp>
+      <p:pic>
+        <p:nvPicPr>
+          <p:cNvPr id="1026" name="Picture 2" descr="Fire Fighting – Home">
+            <a:extLst>
+              <a:ext uri="{FF2B5EF4-FFF2-40B4-BE49-F238E27FC236}">
+                <a16:creationId xmlns:a16="http://schemas.microsoft.com/office/drawing/2014/main" id="{5205B291-E1E4-8542-7472-7BB1E57C92E8}"/>
+              </a:ext>
+            </a:extLst>
+          </p:cNvPr>
+          <p:cNvPicPr>
+            <a:picLocks noChangeAspect="1" noChangeArrowheads="1"/>
+          </p:cNvPicPr>
+          <p:nvPr/>
+        </p:nvPicPr>
+        <p:blipFill>
+          <a:blip r:embed="rId2">
+            <a:extLst>
+              <a:ext uri="{28A0092B-C50C-407E-A947-70E740481C1C}">
+                <a14:useLocalDpi xmlns:a14="http://schemas.microsoft.com/office/drawing/2010/main" val="0"/>
+              </a:ext>
+            </a:extLst>
+          </a:blip>
+          <a:srcRect/>
+          <a:stretch>
+            <a:fillRect/>
+          </a:stretch>
+        </p:blipFill>
+        <p:spPr bwMode="auto">
+          <a:xfrm>
+            <a:off x="7148969" y="1195484"/>
+            <a:ext cx="4467031" cy="4467031"/>
+          </a:xfrm>
+          <a:prstGeom prst="rect">
+            <a:avLst/>
+          </a:prstGeom>
+          <a:noFill/>
+          <a:extLst>
+            <a:ext uri="{909E8E84-426E-40DD-AFC4-6F175D3DCCD1}">
+              <a14:hiddenFill xmlns:a14="http://schemas.microsoft.com/office/drawing/2010/main">
+                <a:solidFill>
+                  <a:srgbClr val="FFFFFF"/>
+                </a:solidFill>
+              </a14:hiddenFill>
+            </a:ext>
+          </a:extLst>
+        </p:spPr>
+      </p:pic>
     </p:spTree>
     <p:extLst>
       <p:ext uri="{BB962C8B-B14F-4D97-AF65-F5344CB8AC3E}">
@@ -11139,9 +11508,16 @@
             <p:ph sz="half" idx="2"/>
           </p:nvPr>
         </p:nvSpPr>
-        <p:spPr/>
-        <p:txBody>
-          <a:bodyPr/>
+        <p:spPr>
+          <a:xfrm>
+            <a:off x="576000" y="2276271"/>
+            <a:ext cx="9566376" cy="3837658"/>
+          </a:xfrm>
+        </p:spPr>
+        <p:txBody>
+          <a:bodyPr>
+            <a:normAutofit lnSpcReduction="10000"/>
+          </a:bodyPr>
           <a:lstStyle/>
           <a:p>
             <a:r>
@@ -11191,40 +11567,43 @@
             </a:r>
           </a:p>
           <a:p>
-            <a:endParaRPr lang="nl-BE" dirty="0"/>
-          </a:p>
-          <a:p>
-            <a:endParaRPr lang="nl-BE" dirty="0"/>
-          </a:p>
-        </p:txBody>
-      </p:sp>
-      <p:sp>
-        <p:nvSpPr>
-          <p:cNvPr id="5" name="Content Placeholder 4">
-            <a:extLst>
-              <a:ext uri="{FF2B5EF4-FFF2-40B4-BE49-F238E27FC236}">
-                <a16:creationId xmlns:a16="http://schemas.microsoft.com/office/drawing/2014/main" id="{CC7579B8-7955-A479-8061-A697AD7FCD7A}"/>
-              </a:ext>
-            </a:extLst>
-          </p:cNvPr>
-          <p:cNvSpPr>
-            <a:spLocks noGrp="1"/>
-          </p:cNvSpPr>
-          <p:nvPr>
-            <p:ph sz="quarter" idx="4"/>
-          </p:nvPr>
-        </p:nvSpPr>
-        <p:spPr/>
-        <p:txBody>
-          <a:bodyPr/>
-          <a:lstStyle/>
-          <a:p>
             <a:r>
               <a:rPr lang="nl-BE" dirty="0"/>
               <a:t>Makkelijk vervoerbaar</a:t>
             </a:r>
           </a:p>
           <a:p>
+            <a:endParaRPr lang="nl-BE" dirty="0"/>
+          </a:p>
+          <a:p>
+            <a:endParaRPr lang="nl-BE" dirty="0"/>
+          </a:p>
+        </p:txBody>
+      </p:sp>
+      <p:sp>
+        <p:nvSpPr>
+          <p:cNvPr id="5" name="Content Placeholder 4">
+            <a:extLst>
+              <a:ext uri="{FF2B5EF4-FFF2-40B4-BE49-F238E27FC236}">
+                <a16:creationId xmlns:a16="http://schemas.microsoft.com/office/drawing/2014/main" id="{CC7579B8-7955-A479-8061-A697AD7FCD7A}"/>
+              </a:ext>
+            </a:extLst>
+          </p:cNvPr>
+          <p:cNvSpPr>
+            <a:spLocks noGrp="1"/>
+          </p:cNvSpPr>
+          <p:nvPr>
+            <p:ph sz="quarter" idx="4"/>
+          </p:nvPr>
+        </p:nvSpPr>
+        <p:spPr/>
+        <p:txBody>
+          <a:bodyPr/>
+          <a:lstStyle/>
+          <a:p>
+            <a:pPr marL="0" indent="0">
+              <a:buNone/>
+            </a:pPr>
             <a:endParaRPr lang="nl-BE" dirty="0"/>
           </a:p>
           <a:p>
@@ -11366,12 +11745,12 @@
         <p:spPr>
           <a:xfrm>
             <a:off x="576000" y="1656000"/>
-            <a:ext cx="4098637" cy="4464000"/>
+            <a:ext cx="6356645" cy="4464000"/>
           </a:xfrm>
         </p:spPr>
         <p:txBody>
           <a:bodyPr>
-            <a:normAutofit fontScale="92500"/>
+            <a:normAutofit/>
           </a:bodyPr>
           <a:lstStyle/>
           <a:p>

</xml_diff>

<commit_message>
aanpassing van mijn slides
</commit_message>
<xml_diff>
--- a/Tussentijdse Presentatie .pptx
+++ b/Tussentijdse Presentatie .pptx
@@ -235,7 +235,7 @@
           <a:p>
             <a:fld id="{8F591CCF-F6FD-734B-854A-5BC033593B1E}" type="datetimeFigureOut">
               <a:rPr lang="nl-NL" smtClean="0"/>
-              <a:t>29-3-2023</a:t>
+              <a:t>30-3-2023</a:t>
             </a:fld>
             <a:endParaRPr lang="nl-NL"/>
           </a:p>
@@ -301,7 +301,7 @@
           <a:p>
             <a:fld id="{E152A6D4-CD3D-5148-8B70-A84796F20135}" type="slidenum">
               <a:rPr lang="nl-NL" smtClean="0"/>
-              <a:t>‹#›</a:t>
+              <a:t>‹nr.›</a:t>
             </a:fld>
             <a:endParaRPr lang="nl-NL"/>
           </a:p>
@@ -400,7 +400,7 @@
           <a:p>
             <a:fld id="{23C66214-DB21-4647-B5DA-0D17CA592867}" type="datetimeFigureOut">
               <a:rPr lang="nl-NL" smtClean="0"/>
-              <a:t>29-3-2023</a:t>
+              <a:t>30-3-2023</a:t>
             </a:fld>
             <a:endParaRPr lang="nl-NL"/>
           </a:p>
@@ -558,7 +558,7 @@
           <a:p>
             <a:fld id="{8954E32A-327F-AF4B-8E1F-209FBF93D26D}" type="slidenum">
               <a:rPr lang="nl-NL" smtClean="0"/>
-              <a:t>‹#›</a:t>
+              <a:t>‹nr.›</a:t>
             </a:fld>
             <a:endParaRPr lang="nl-NL"/>
           </a:p>
@@ -1389,7 +1389,7 @@
           <a:p>
             <a:fld id="{CD8EC345-7FB1-4DDD-8C99-610F4A0CCD77}" type="datetime1">
               <a:rPr lang="nl-BE" smtClean="0"/>
-              <a:t>29/03/2023</a:t>
+              <a:t>30/03/2023</a:t>
             </a:fld>
             <a:endParaRPr lang="nl-NL"/>
           </a:p>
@@ -1434,7 +1434,7 @@
           <a:p>
             <a:fld id="{CF179DAE-D0A6-40C3-B8BC-6A97C268D03A}" type="slidenum">
               <a:rPr lang="nl-NL" smtClean="0"/>
-              <a:t>‹#›</a:t>
+              <a:t>‹nr.›</a:t>
             </a:fld>
             <a:endParaRPr lang="nl-NL"/>
           </a:p>
@@ -1672,7 +1672,7 @@
           <a:p>
             <a:fld id="{5487CBB6-2126-41A6-B9B2-1B3E58B7F358}" type="datetime1">
               <a:rPr lang="nl-BE" smtClean="0"/>
-              <a:t>29/03/2023</a:t>
+              <a:t>30/03/2023</a:t>
             </a:fld>
             <a:endParaRPr lang="nl-NL"/>
           </a:p>
@@ -1717,7 +1717,7 @@
           <a:p>
             <a:fld id="{CF179DAE-D0A6-40C3-B8BC-6A97C268D03A}" type="slidenum">
               <a:rPr lang="nl-NL" smtClean="0"/>
-              <a:t>‹#›</a:t>
+              <a:t>‹nr.›</a:t>
             </a:fld>
             <a:endParaRPr lang="nl-NL"/>
           </a:p>
@@ -2002,7 +2002,7 @@
           <a:p>
             <a:fld id="{D7A24CD4-5DC9-4118-ABE7-2BE5EAE697B9}" type="datetime1">
               <a:rPr lang="nl-BE" smtClean="0"/>
-              <a:t>29/03/2023</a:t>
+              <a:t>30/03/2023</a:t>
             </a:fld>
             <a:endParaRPr lang="nl-NL"/>
           </a:p>
@@ -2047,7 +2047,7 @@
           <a:p>
             <a:fld id="{0A297500-7527-634B-90F4-69D0994C32B4}" type="slidenum">
               <a:rPr lang="nl-NL" smtClean="0"/>
-              <a:t>‹#›</a:t>
+              <a:t>‹nr.›</a:t>
             </a:fld>
             <a:endParaRPr lang="nl-NL"/>
           </a:p>
@@ -2322,7 +2322,7 @@
           <a:p>
             <a:fld id="{5971B238-6ABF-4361-91B6-4E2C76136EFE}" type="datetime1">
               <a:rPr lang="nl-BE" smtClean="0"/>
-              <a:t>29/03/2023</a:t>
+              <a:t>30/03/2023</a:t>
             </a:fld>
             <a:endParaRPr lang="nl-NL" dirty="0"/>
           </a:p>
@@ -2367,7 +2367,7 @@
           <a:p>
             <a:fld id="{0A297500-7527-634B-90F4-69D0994C32B4}" type="slidenum">
               <a:rPr lang="nl-NL" smtClean="0"/>
-              <a:t>‹#›</a:t>
+              <a:t>‹nr.›</a:t>
             </a:fld>
             <a:endParaRPr lang="nl-NL"/>
           </a:p>
@@ -2643,7 +2643,7 @@
           <a:p>
             <a:fld id="{7AC2E154-E327-4EA4-B2CC-E57A22EFC917}" type="datetime1">
               <a:rPr lang="nl-BE" smtClean="0"/>
-              <a:t>29/03/2023</a:t>
+              <a:t>30/03/2023</a:t>
             </a:fld>
             <a:endParaRPr lang="nl-NL" dirty="0"/>
           </a:p>
@@ -2688,7 +2688,7 @@
           <a:p>
             <a:fld id="{0A297500-7527-634B-90F4-69D0994C32B4}" type="slidenum">
               <a:rPr lang="nl-NL" smtClean="0"/>
-              <a:t>‹#›</a:t>
+              <a:t>‹nr.›</a:t>
             </a:fld>
             <a:endParaRPr lang="nl-NL"/>
           </a:p>
@@ -2785,7 +2785,7 @@
           <a:p>
             <a:fld id="{36FA22F4-6030-4BDD-AF0F-025C87B37A4C}" type="datetime1">
               <a:rPr lang="nl-BE" smtClean="0"/>
-              <a:t>29/03/2023</a:t>
+              <a:t>30/03/2023</a:t>
             </a:fld>
             <a:endParaRPr lang="nl-NL"/>
           </a:p>
@@ -2830,7 +2830,7 @@
           <a:p>
             <a:fld id="{0A297500-7527-634B-90F4-69D0994C32B4}" type="slidenum">
               <a:rPr lang="nl-NL" smtClean="0"/>
-              <a:t>‹#›</a:t>
+              <a:t>‹nr.›</a:t>
             </a:fld>
             <a:endParaRPr lang="nl-NL"/>
           </a:p>
@@ -3269,7 +3269,7 @@
           <a:p>
             <a:fld id="{72DCE82B-64D4-4473-A3B4-807D67EBE02B}" type="datetime1">
               <a:rPr lang="nl-BE" smtClean="0"/>
-              <a:t>29/03/2023</a:t>
+              <a:t>30/03/2023</a:t>
             </a:fld>
             <a:endParaRPr lang="nl-NL" dirty="0"/>
           </a:p>
@@ -3314,7 +3314,7 @@
           <a:p>
             <a:fld id="{0A297500-7527-634B-90F4-69D0994C32B4}" type="slidenum">
               <a:rPr lang="nl-NL" smtClean="0"/>
-              <a:t>‹#›</a:t>
+              <a:t>‹nr.›</a:t>
             </a:fld>
             <a:endParaRPr lang="nl-NL"/>
           </a:p>
@@ -3390,7 +3390,7 @@
           <a:p>
             <a:fld id="{AB4EBAB5-4286-46F6-A2F8-DF93B69E81D2}" type="datetime1">
               <a:rPr lang="nl-BE" smtClean="0"/>
-              <a:t>29/03/2023</a:t>
+              <a:t>30/03/2023</a:t>
             </a:fld>
             <a:endParaRPr lang="nl-NL"/>
           </a:p>
@@ -3435,7 +3435,7 @@
           <a:p>
             <a:fld id="{0A297500-7527-634B-90F4-69D0994C32B4}" type="slidenum">
               <a:rPr lang="nl-NL" smtClean="0"/>
-              <a:t>‹#›</a:t>
+              <a:t>‹nr.›</a:t>
             </a:fld>
             <a:endParaRPr lang="nl-NL"/>
           </a:p>
@@ -3511,7 +3511,7 @@
           <a:p>
             <a:fld id="{DE5B5EFD-5FA7-4ADA-A4C7-6863DCA9031A}" type="datetime1">
               <a:rPr lang="nl-BE" smtClean="0"/>
-              <a:t>29/03/2023</a:t>
+              <a:t>30/03/2023</a:t>
             </a:fld>
             <a:endParaRPr lang="nl-NL"/>
           </a:p>
@@ -3556,7 +3556,7 @@
           <a:p>
             <a:fld id="{0A297500-7527-634B-90F4-69D0994C32B4}" type="slidenum">
               <a:rPr lang="nl-NL" smtClean="0"/>
-              <a:t>‹#›</a:t>
+              <a:t>‹nr.›</a:t>
             </a:fld>
             <a:endParaRPr lang="nl-NL"/>
           </a:p>
@@ -3693,7 +3693,7 @@
           <a:p>
             <a:fld id="{61079889-0470-4CFB-95EE-15317261670A}" type="datetime1">
               <a:rPr lang="nl-BE" smtClean="0"/>
-              <a:t>29/03/2023</a:t>
+              <a:t>30/03/2023</a:t>
             </a:fld>
             <a:endParaRPr lang="nl-NL" dirty="0"/>
           </a:p>
@@ -3738,7 +3738,7 @@
           <a:p>
             <a:fld id="{0A297500-7527-634B-90F4-69D0994C32B4}" type="slidenum">
               <a:rPr lang="nl-NL" smtClean="0"/>
-              <a:t>‹#›</a:t>
+              <a:t>‹nr.›</a:t>
             </a:fld>
             <a:endParaRPr lang="nl-NL"/>
           </a:p>
@@ -3947,7 +3947,7 @@
           <a:p>
             <a:fld id="{ADC442C5-A06B-4C52-BB6E-6946CDC12E38}" type="datetime1">
               <a:rPr lang="nl-BE" smtClean="0"/>
-              <a:t>29/03/2023</a:t>
+              <a:t>30/03/2023</a:t>
             </a:fld>
             <a:endParaRPr lang="nl-NL" dirty="0"/>
           </a:p>
@@ -4028,7 +4028,7 @@
             <a:fld id="{0A297500-7527-634B-90F4-69D0994C32B4}" type="slidenum">
               <a:rPr lang="nl-NL" smtClean="0"/>
               <a:pPr/>
-              <a:t>‹#›</a:t>
+              <a:t>‹nr.›</a:t>
             </a:fld>
             <a:endParaRPr lang="nl-NL" dirty="0"/>
           </a:p>
@@ -4588,7 +4588,7 @@
           <a:p>
             <a:fld id="{39D20C4C-7810-465D-8480-DA5686803D3E}" type="datetime1">
               <a:rPr lang="nl-BE" smtClean="0"/>
-              <a:t>29/03/2023</a:t>
+              <a:t>30/03/2023</a:t>
             </a:fld>
             <a:endParaRPr lang="nl-NL" dirty="0"/>
           </a:p>
@@ -4669,7 +4669,7 @@
             <a:fld id="{0A297500-7527-634B-90F4-69D0994C32B4}" type="slidenum">
               <a:rPr lang="nl-NL" smtClean="0"/>
               <a:pPr/>
-              <a:t>‹#›</a:t>
+              <a:t>‹nr.›</a:t>
             </a:fld>
             <a:endParaRPr lang="nl-NL" dirty="0"/>
           </a:p>
@@ -7250,7 +7250,7 @@
           <a:p>
             <a:r>
               <a:rPr lang="nl-BE" dirty="0"/>
-              <a:t>Wanneer armen correct gericht </a:t>
+              <a:t>Wanneer arm correct gericht </a:t>
             </a:r>
             <a:r>
               <a:rPr lang="nl-BE" dirty="0">
@@ -8539,7 +8539,12 @@
             <p:ph type="body" idx="1"/>
           </p:nvPr>
         </p:nvSpPr>
-        <p:spPr/>
+        <p:spPr>
+          <a:xfrm>
+            <a:off x="6195625" y="2116378"/>
+            <a:ext cx="5421575" cy="540000"/>
+          </a:xfrm>
+        </p:spPr>
         <p:txBody>
           <a:bodyPr/>
           <a:lstStyle/>
@@ -8567,7 +8572,12 @@
             <p:ph sz="half" idx="2"/>
           </p:nvPr>
         </p:nvSpPr>
-        <p:spPr/>
+        <p:spPr>
+          <a:xfrm>
+            <a:off x="6267623" y="2785860"/>
+            <a:ext cx="5421575" cy="3837658"/>
+          </a:xfrm>
+        </p:spPr>
         <p:txBody>
           <a:bodyPr/>
           <a:lstStyle/>
@@ -8610,7 +8620,12 @@
             <p:ph type="body" sz="quarter" idx="3"/>
           </p:nvPr>
         </p:nvSpPr>
-        <p:spPr/>
+        <p:spPr>
+          <a:xfrm>
+            <a:off x="632796" y="2116378"/>
+            <a:ext cx="5445000" cy="540000"/>
+          </a:xfrm>
+        </p:spPr>
         <p:txBody>
           <a:bodyPr/>
           <a:lstStyle/>
@@ -8638,12 +8653,20 @@
             <p:ph sz="quarter" idx="4"/>
           </p:nvPr>
         </p:nvSpPr>
-        <p:spPr/>
-        <p:txBody>
-          <a:bodyPr/>
-          <a:lstStyle/>
-          <a:p>
-            <a:endParaRPr lang="nl-BE"/>
+        <p:spPr>
+          <a:xfrm>
+            <a:off x="502802" y="2785860"/>
+            <a:ext cx="5445000" cy="829238"/>
+          </a:xfrm>
+        </p:spPr>
+        <p:txBody>
+          <a:bodyPr/>
+          <a:lstStyle/>
+          <a:p>
+            <a:r>
+              <a:rPr lang="nl-BE" dirty="0"/>
+              <a:t>Testen hoe accuraat de motoren</a:t>
+            </a:r>
           </a:p>
         </p:txBody>
       </p:sp>
@@ -8728,6 +8751,405 @@
             <a:r>
               <a:rPr lang="nl-BE" dirty="0"/>
               <a:t>Wat moeten we nog doen?</a:t>
+            </a:r>
+          </a:p>
+        </p:txBody>
+      </p:sp>
+      <p:sp>
+        <p:nvSpPr>
+          <p:cNvPr id="9" name="Text Placeholder 3">
+            <a:extLst>
+              <a:ext uri="{FF2B5EF4-FFF2-40B4-BE49-F238E27FC236}">
+                <a16:creationId xmlns:a16="http://schemas.microsoft.com/office/drawing/2014/main" id="{80B66C74-4CD6-CECD-8E9D-B79FCB9D8AC0}"/>
+              </a:ext>
+            </a:extLst>
+          </p:cNvPr>
+          <p:cNvSpPr txBox="1">
+            <a:spLocks/>
+          </p:cNvSpPr>
+          <p:nvPr/>
+        </p:nvSpPr>
+        <p:spPr>
+          <a:xfrm>
+            <a:off x="574800" y="1359036"/>
+            <a:ext cx="5445000" cy="540000"/>
+          </a:xfrm>
+          <a:prstGeom prst="rect">
+            <a:avLst/>
+          </a:prstGeom>
+        </p:spPr>
+        <p:txBody>
+          <a:bodyPr vert="horz" lIns="91440" tIns="45720" rIns="91440" bIns="45720" rtlCol="0" anchor="b">
+            <a:normAutofit/>
+          </a:bodyPr>
+          <a:lstStyle>
+            <a:lvl1pPr marL="0" indent="0" algn="l" defTabSz="914400" rtl="0" eaLnBrk="1" latinLnBrk="0" hangingPunct="1">
+              <a:lnSpc>
+                <a:spcPct val="100000"/>
+              </a:lnSpc>
+              <a:spcBef>
+                <a:spcPts val="1000"/>
+              </a:spcBef>
+              <a:buFont typeface="Arial"/>
+              <a:buNone/>
+              <a:defRPr sz="2400" b="1" kern="1200" baseline="0">
+                <a:solidFill>
+                  <a:schemeClr val="tx1"/>
+                </a:solidFill>
+                <a:latin typeface="Arial" charset="0"/>
+                <a:ea typeface="+mn-ea"/>
+                <a:cs typeface="+mn-cs"/>
+              </a:defRPr>
+            </a:lvl1pPr>
+            <a:lvl2pPr marL="457200" indent="0" algn="l" defTabSz="914400" rtl="0" eaLnBrk="1" latinLnBrk="0" hangingPunct="1">
+              <a:lnSpc>
+                <a:spcPct val="100000"/>
+              </a:lnSpc>
+              <a:spcBef>
+                <a:spcPts val="500"/>
+              </a:spcBef>
+              <a:buFont typeface="Arial"/>
+              <a:buNone/>
+              <a:defRPr sz="2000" b="1" kern="1200" baseline="0">
+                <a:solidFill>
+                  <a:schemeClr val="tx1"/>
+                </a:solidFill>
+                <a:latin typeface="Arial" charset="0"/>
+                <a:ea typeface="+mn-ea"/>
+                <a:cs typeface="+mn-cs"/>
+              </a:defRPr>
+            </a:lvl2pPr>
+            <a:lvl3pPr marL="914400" indent="0" algn="l" defTabSz="914400" rtl="0" eaLnBrk="1" latinLnBrk="0" hangingPunct="1">
+              <a:lnSpc>
+                <a:spcPct val="100000"/>
+              </a:lnSpc>
+              <a:spcBef>
+                <a:spcPts val="500"/>
+              </a:spcBef>
+              <a:buFont typeface="Arial"/>
+              <a:buNone/>
+              <a:defRPr sz="1800" b="1" kern="1200" baseline="0">
+                <a:solidFill>
+                  <a:schemeClr val="tx1"/>
+                </a:solidFill>
+                <a:latin typeface="Arial" charset="0"/>
+                <a:ea typeface="+mn-ea"/>
+                <a:cs typeface="+mn-cs"/>
+              </a:defRPr>
+            </a:lvl3pPr>
+            <a:lvl4pPr marL="1371600" indent="0" algn="l" defTabSz="914400" rtl="0" eaLnBrk="1" latinLnBrk="0" hangingPunct="1">
+              <a:lnSpc>
+                <a:spcPct val="100000"/>
+              </a:lnSpc>
+              <a:spcBef>
+                <a:spcPts val="500"/>
+              </a:spcBef>
+              <a:buFont typeface="Arial"/>
+              <a:buNone/>
+              <a:defRPr sz="1600" b="1" kern="1200" baseline="0">
+                <a:solidFill>
+                  <a:schemeClr val="tx1"/>
+                </a:solidFill>
+                <a:latin typeface="Arial" charset="0"/>
+                <a:ea typeface="+mn-ea"/>
+                <a:cs typeface="+mn-cs"/>
+              </a:defRPr>
+            </a:lvl4pPr>
+            <a:lvl5pPr marL="1828800" indent="0" algn="l" defTabSz="914400" rtl="0" eaLnBrk="1" latinLnBrk="0" hangingPunct="1">
+              <a:lnSpc>
+                <a:spcPct val="100000"/>
+              </a:lnSpc>
+              <a:spcBef>
+                <a:spcPts val="500"/>
+              </a:spcBef>
+              <a:buFont typeface="Arial"/>
+              <a:buNone/>
+              <a:defRPr sz="1600" b="1" kern="1200" baseline="0">
+                <a:solidFill>
+                  <a:schemeClr val="tx1"/>
+                </a:solidFill>
+                <a:latin typeface="Arial" charset="0"/>
+                <a:ea typeface="+mn-ea"/>
+                <a:cs typeface="+mn-cs"/>
+              </a:defRPr>
+            </a:lvl5pPr>
+            <a:lvl6pPr marL="2286000" indent="0" algn="l" defTabSz="914400" rtl="0" eaLnBrk="1" latinLnBrk="0" hangingPunct="1">
+              <a:lnSpc>
+                <a:spcPct val="90000"/>
+              </a:lnSpc>
+              <a:spcBef>
+                <a:spcPts val="500"/>
+              </a:spcBef>
+              <a:buFont typeface="Arial"/>
+              <a:buNone/>
+              <a:defRPr sz="1600" b="1" kern="1200">
+                <a:solidFill>
+                  <a:schemeClr val="tx1"/>
+                </a:solidFill>
+                <a:latin typeface="+mn-lt"/>
+                <a:ea typeface="+mn-ea"/>
+                <a:cs typeface="+mn-cs"/>
+              </a:defRPr>
+            </a:lvl6pPr>
+            <a:lvl7pPr marL="2743200" indent="0" algn="l" defTabSz="914400" rtl="0" eaLnBrk="1" latinLnBrk="0" hangingPunct="1">
+              <a:lnSpc>
+                <a:spcPct val="90000"/>
+              </a:lnSpc>
+              <a:spcBef>
+                <a:spcPts val="500"/>
+              </a:spcBef>
+              <a:buFont typeface="Arial"/>
+              <a:buNone/>
+              <a:defRPr sz="1600" b="1" kern="1200">
+                <a:solidFill>
+                  <a:schemeClr val="tx1"/>
+                </a:solidFill>
+                <a:latin typeface="+mn-lt"/>
+                <a:ea typeface="+mn-ea"/>
+                <a:cs typeface="+mn-cs"/>
+              </a:defRPr>
+            </a:lvl7pPr>
+            <a:lvl8pPr marL="3200400" indent="0" algn="l" defTabSz="914400" rtl="0" eaLnBrk="1" latinLnBrk="0" hangingPunct="1">
+              <a:lnSpc>
+                <a:spcPct val="90000"/>
+              </a:lnSpc>
+              <a:spcBef>
+                <a:spcPts val="500"/>
+              </a:spcBef>
+              <a:buFont typeface="Arial"/>
+              <a:buNone/>
+              <a:defRPr sz="1600" b="1" kern="1200">
+                <a:solidFill>
+                  <a:schemeClr val="tx1"/>
+                </a:solidFill>
+                <a:latin typeface="+mn-lt"/>
+                <a:ea typeface="+mn-ea"/>
+                <a:cs typeface="+mn-cs"/>
+              </a:defRPr>
+            </a:lvl8pPr>
+            <a:lvl9pPr marL="3657600" indent="0" algn="l" defTabSz="914400" rtl="0" eaLnBrk="1" latinLnBrk="0" hangingPunct="1">
+              <a:lnSpc>
+                <a:spcPct val="90000"/>
+              </a:lnSpc>
+              <a:spcBef>
+                <a:spcPts val="500"/>
+              </a:spcBef>
+              <a:buFont typeface="Arial"/>
+              <a:buNone/>
+              <a:defRPr sz="1600" b="1" kern="1200">
+                <a:solidFill>
+                  <a:schemeClr val="tx1"/>
+                </a:solidFill>
+                <a:latin typeface="+mn-lt"/>
+                <a:ea typeface="+mn-ea"/>
+                <a:cs typeface="+mn-cs"/>
+              </a:defRPr>
+            </a:lvl9pPr>
+          </a:lstStyle>
+          <a:p>
+            <a:r>
+              <a:rPr lang="nl-BE" dirty="0" err="1"/>
+              <a:t>Arduino</a:t>
+            </a:r>
+            <a:endParaRPr lang="nl-BE" dirty="0"/>
+          </a:p>
+        </p:txBody>
+      </p:sp>
+      <p:sp>
+        <p:nvSpPr>
+          <p:cNvPr id="10" name="Text Placeholder 3">
+            <a:extLst>
+              <a:ext uri="{FF2B5EF4-FFF2-40B4-BE49-F238E27FC236}">
+                <a16:creationId xmlns:a16="http://schemas.microsoft.com/office/drawing/2014/main" id="{5527F96A-5D73-BB25-B0BB-009988E594D2}"/>
+              </a:ext>
+            </a:extLst>
+          </p:cNvPr>
+          <p:cNvSpPr txBox="1">
+            <a:spLocks/>
+          </p:cNvSpPr>
+          <p:nvPr/>
+        </p:nvSpPr>
+        <p:spPr>
+          <a:xfrm>
+            <a:off x="632796" y="3543202"/>
+            <a:ext cx="5445000" cy="540000"/>
+          </a:xfrm>
+          <a:prstGeom prst="rect">
+            <a:avLst/>
+          </a:prstGeom>
+        </p:spPr>
+        <p:txBody>
+          <a:bodyPr vert="horz" lIns="91440" tIns="45720" rIns="91440" bIns="45720" rtlCol="0" anchor="b">
+            <a:normAutofit/>
+          </a:bodyPr>
+          <a:lstStyle>
+            <a:lvl1pPr marL="0" indent="0" algn="l" defTabSz="914400" rtl="0" eaLnBrk="1" latinLnBrk="0" hangingPunct="1">
+              <a:lnSpc>
+                <a:spcPct val="100000"/>
+              </a:lnSpc>
+              <a:spcBef>
+                <a:spcPts val="1000"/>
+              </a:spcBef>
+              <a:buFont typeface="Arial"/>
+              <a:buNone/>
+              <a:defRPr sz="2400" b="1" kern="1200" baseline="0">
+                <a:solidFill>
+                  <a:schemeClr val="tx1"/>
+                </a:solidFill>
+                <a:latin typeface="Arial" charset="0"/>
+                <a:ea typeface="+mn-ea"/>
+                <a:cs typeface="+mn-cs"/>
+              </a:defRPr>
+            </a:lvl1pPr>
+            <a:lvl2pPr marL="457200" indent="0" algn="l" defTabSz="914400" rtl="0" eaLnBrk="1" latinLnBrk="0" hangingPunct="1">
+              <a:lnSpc>
+                <a:spcPct val="100000"/>
+              </a:lnSpc>
+              <a:spcBef>
+                <a:spcPts val="500"/>
+              </a:spcBef>
+              <a:buFont typeface="Arial"/>
+              <a:buNone/>
+              <a:defRPr sz="2000" b="1" kern="1200" baseline="0">
+                <a:solidFill>
+                  <a:schemeClr val="tx1"/>
+                </a:solidFill>
+                <a:latin typeface="Arial" charset="0"/>
+                <a:ea typeface="+mn-ea"/>
+                <a:cs typeface="+mn-cs"/>
+              </a:defRPr>
+            </a:lvl2pPr>
+            <a:lvl3pPr marL="914400" indent="0" algn="l" defTabSz="914400" rtl="0" eaLnBrk="1" latinLnBrk="0" hangingPunct="1">
+              <a:lnSpc>
+                <a:spcPct val="100000"/>
+              </a:lnSpc>
+              <a:spcBef>
+                <a:spcPts val="500"/>
+              </a:spcBef>
+              <a:buFont typeface="Arial"/>
+              <a:buNone/>
+              <a:defRPr sz="1800" b="1" kern="1200" baseline="0">
+                <a:solidFill>
+                  <a:schemeClr val="tx1"/>
+                </a:solidFill>
+                <a:latin typeface="Arial" charset="0"/>
+                <a:ea typeface="+mn-ea"/>
+                <a:cs typeface="+mn-cs"/>
+              </a:defRPr>
+            </a:lvl3pPr>
+            <a:lvl4pPr marL="1371600" indent="0" algn="l" defTabSz="914400" rtl="0" eaLnBrk="1" latinLnBrk="0" hangingPunct="1">
+              <a:lnSpc>
+                <a:spcPct val="100000"/>
+              </a:lnSpc>
+              <a:spcBef>
+                <a:spcPts val="500"/>
+              </a:spcBef>
+              <a:buFont typeface="Arial"/>
+              <a:buNone/>
+              <a:defRPr sz="1600" b="1" kern="1200" baseline="0">
+                <a:solidFill>
+                  <a:schemeClr val="tx1"/>
+                </a:solidFill>
+                <a:latin typeface="Arial" charset="0"/>
+                <a:ea typeface="+mn-ea"/>
+                <a:cs typeface="+mn-cs"/>
+              </a:defRPr>
+            </a:lvl4pPr>
+            <a:lvl5pPr marL="1828800" indent="0" algn="l" defTabSz="914400" rtl="0" eaLnBrk="1" latinLnBrk="0" hangingPunct="1">
+              <a:lnSpc>
+                <a:spcPct val="100000"/>
+              </a:lnSpc>
+              <a:spcBef>
+                <a:spcPts val="500"/>
+              </a:spcBef>
+              <a:buFont typeface="Arial"/>
+              <a:buNone/>
+              <a:defRPr sz="1600" b="1" kern="1200" baseline="0">
+                <a:solidFill>
+                  <a:schemeClr val="tx1"/>
+                </a:solidFill>
+                <a:latin typeface="Arial" charset="0"/>
+                <a:ea typeface="+mn-ea"/>
+                <a:cs typeface="+mn-cs"/>
+              </a:defRPr>
+            </a:lvl5pPr>
+            <a:lvl6pPr marL="2286000" indent="0" algn="l" defTabSz="914400" rtl="0" eaLnBrk="1" latinLnBrk="0" hangingPunct="1">
+              <a:lnSpc>
+                <a:spcPct val="90000"/>
+              </a:lnSpc>
+              <a:spcBef>
+                <a:spcPts val="500"/>
+              </a:spcBef>
+              <a:buFont typeface="Arial"/>
+              <a:buNone/>
+              <a:defRPr sz="1600" b="1" kern="1200">
+                <a:solidFill>
+                  <a:schemeClr val="tx1"/>
+                </a:solidFill>
+                <a:latin typeface="+mn-lt"/>
+                <a:ea typeface="+mn-ea"/>
+                <a:cs typeface="+mn-cs"/>
+              </a:defRPr>
+            </a:lvl6pPr>
+            <a:lvl7pPr marL="2743200" indent="0" algn="l" defTabSz="914400" rtl="0" eaLnBrk="1" latinLnBrk="0" hangingPunct="1">
+              <a:lnSpc>
+                <a:spcPct val="90000"/>
+              </a:lnSpc>
+              <a:spcBef>
+                <a:spcPts val="500"/>
+              </a:spcBef>
+              <a:buFont typeface="Arial"/>
+              <a:buNone/>
+              <a:defRPr sz="1600" b="1" kern="1200">
+                <a:solidFill>
+                  <a:schemeClr val="tx1"/>
+                </a:solidFill>
+                <a:latin typeface="+mn-lt"/>
+                <a:ea typeface="+mn-ea"/>
+                <a:cs typeface="+mn-cs"/>
+              </a:defRPr>
+            </a:lvl7pPr>
+            <a:lvl8pPr marL="3200400" indent="0" algn="l" defTabSz="914400" rtl="0" eaLnBrk="1" latinLnBrk="0" hangingPunct="1">
+              <a:lnSpc>
+                <a:spcPct val="90000"/>
+              </a:lnSpc>
+              <a:spcBef>
+                <a:spcPts val="500"/>
+              </a:spcBef>
+              <a:buFont typeface="Arial"/>
+              <a:buNone/>
+              <a:defRPr sz="1600" b="1" kern="1200">
+                <a:solidFill>
+                  <a:schemeClr val="tx1"/>
+                </a:solidFill>
+                <a:latin typeface="+mn-lt"/>
+                <a:ea typeface="+mn-ea"/>
+                <a:cs typeface="+mn-cs"/>
+              </a:defRPr>
+            </a:lvl8pPr>
+            <a:lvl9pPr marL="3657600" indent="0" algn="l" defTabSz="914400" rtl="0" eaLnBrk="1" latinLnBrk="0" hangingPunct="1">
+              <a:lnSpc>
+                <a:spcPct val="90000"/>
+              </a:lnSpc>
+              <a:spcBef>
+                <a:spcPts val="500"/>
+              </a:spcBef>
+              <a:buFont typeface="Arial"/>
+              <a:buNone/>
+              <a:defRPr sz="1600" b="1" kern="1200">
+                <a:solidFill>
+                  <a:schemeClr val="tx1"/>
+                </a:solidFill>
+                <a:latin typeface="+mn-lt"/>
+                <a:ea typeface="+mn-ea"/>
+                <a:cs typeface="+mn-cs"/>
+              </a:defRPr>
+            </a:lvl9pPr>
+          </a:lstStyle>
+          <a:p>
+            <a:r>
+              <a:rPr lang="nl-BE" dirty="0"/>
+              <a:t>Constructie</a:t>
             </a:r>
           </a:p>
         </p:txBody>
@@ -10818,7 +11240,7 @@
           <a:p>
             <a:r>
               <a:rPr lang="nl-NL" dirty="0"/>
-              <a:t>Minimale watersnelheid:</a:t>
+              <a:t>Minimale watersnelheid</a:t>
             </a:r>
             <a:r>
               <a:rPr lang="nl-NL" dirty="0">
@@ -10826,13 +11248,13 @@
                   <a:srgbClr val="FFFF00"/>
                 </a:highlight>
               </a:rPr>
-              <a:t> … </a:t>
+              <a:t> </a:t>
             </a:r>
           </a:p>
           <a:p>
             <a:r>
               <a:rPr lang="nl-NL" dirty="0"/>
-              <a:t>Hoeveelheid water per blussing: (wordt nog bekend gemaakt, foutenmarge nog inrekenen) </a:t>
+              <a:t>Hoeveelheid water per blussing + foutenmarge</a:t>
             </a:r>
           </a:p>
           <a:p>

</xml_diff>

<commit_message>
nog wa aanpassingen aan ppt
</commit_message>
<xml_diff>
--- a/Tussentijdse Presentatie .pptx
+++ b/Tussentijdse Presentatie .pptx
@@ -235,7 +235,7 @@
           <a:p>
             <a:fld id="{8F591CCF-F6FD-734B-854A-5BC033593B1E}" type="datetimeFigureOut">
               <a:rPr lang="nl-NL" smtClean="0"/>
-              <a:t>30-3-2023</a:t>
+              <a:t>31-3-2023</a:t>
             </a:fld>
             <a:endParaRPr lang="nl-NL"/>
           </a:p>
@@ -400,7 +400,7 @@
           <a:p>
             <a:fld id="{23C66214-DB21-4647-B5DA-0D17CA592867}" type="datetimeFigureOut">
               <a:rPr lang="nl-NL" smtClean="0"/>
-              <a:t>30-3-2023</a:t>
+              <a:t>31-3-2023</a:t>
             </a:fld>
             <a:endParaRPr lang="nl-NL"/>
           </a:p>
@@ -1389,7 +1389,7 @@
           <a:p>
             <a:fld id="{CD8EC345-7FB1-4DDD-8C99-610F4A0CCD77}" type="datetime1">
               <a:rPr lang="nl-BE" smtClean="0"/>
-              <a:t>30/03/2023</a:t>
+              <a:t>31/03/2023</a:t>
             </a:fld>
             <a:endParaRPr lang="nl-NL"/>
           </a:p>
@@ -1672,7 +1672,7 @@
           <a:p>
             <a:fld id="{5487CBB6-2126-41A6-B9B2-1B3E58B7F358}" type="datetime1">
               <a:rPr lang="nl-BE" smtClean="0"/>
-              <a:t>30/03/2023</a:t>
+              <a:t>31/03/2023</a:t>
             </a:fld>
             <a:endParaRPr lang="nl-NL"/>
           </a:p>
@@ -2002,7 +2002,7 @@
           <a:p>
             <a:fld id="{D7A24CD4-5DC9-4118-ABE7-2BE5EAE697B9}" type="datetime1">
               <a:rPr lang="nl-BE" smtClean="0"/>
-              <a:t>30/03/2023</a:t>
+              <a:t>31/03/2023</a:t>
             </a:fld>
             <a:endParaRPr lang="nl-NL"/>
           </a:p>
@@ -2322,7 +2322,7 @@
           <a:p>
             <a:fld id="{5971B238-6ABF-4361-91B6-4E2C76136EFE}" type="datetime1">
               <a:rPr lang="nl-BE" smtClean="0"/>
-              <a:t>30/03/2023</a:t>
+              <a:t>31/03/2023</a:t>
             </a:fld>
             <a:endParaRPr lang="nl-NL" dirty="0"/>
           </a:p>
@@ -2643,7 +2643,7 @@
           <a:p>
             <a:fld id="{7AC2E154-E327-4EA4-B2CC-E57A22EFC917}" type="datetime1">
               <a:rPr lang="nl-BE" smtClean="0"/>
-              <a:t>30/03/2023</a:t>
+              <a:t>31/03/2023</a:t>
             </a:fld>
             <a:endParaRPr lang="nl-NL" dirty="0"/>
           </a:p>
@@ -2785,7 +2785,7 @@
           <a:p>
             <a:fld id="{36FA22F4-6030-4BDD-AF0F-025C87B37A4C}" type="datetime1">
               <a:rPr lang="nl-BE" smtClean="0"/>
-              <a:t>30/03/2023</a:t>
+              <a:t>31/03/2023</a:t>
             </a:fld>
             <a:endParaRPr lang="nl-NL"/>
           </a:p>
@@ -3269,7 +3269,7 @@
           <a:p>
             <a:fld id="{72DCE82B-64D4-4473-A3B4-807D67EBE02B}" type="datetime1">
               <a:rPr lang="nl-BE" smtClean="0"/>
-              <a:t>30/03/2023</a:t>
+              <a:t>31/03/2023</a:t>
             </a:fld>
             <a:endParaRPr lang="nl-NL" dirty="0"/>
           </a:p>
@@ -3390,7 +3390,7 @@
           <a:p>
             <a:fld id="{AB4EBAB5-4286-46F6-A2F8-DF93B69E81D2}" type="datetime1">
               <a:rPr lang="nl-BE" smtClean="0"/>
-              <a:t>30/03/2023</a:t>
+              <a:t>31/03/2023</a:t>
             </a:fld>
             <a:endParaRPr lang="nl-NL"/>
           </a:p>
@@ -3511,7 +3511,7 @@
           <a:p>
             <a:fld id="{DE5B5EFD-5FA7-4ADA-A4C7-6863DCA9031A}" type="datetime1">
               <a:rPr lang="nl-BE" smtClean="0"/>
-              <a:t>30/03/2023</a:t>
+              <a:t>31/03/2023</a:t>
             </a:fld>
             <a:endParaRPr lang="nl-NL"/>
           </a:p>
@@ -3693,7 +3693,7 @@
           <a:p>
             <a:fld id="{61079889-0470-4CFB-95EE-15317261670A}" type="datetime1">
               <a:rPr lang="nl-BE" smtClean="0"/>
-              <a:t>30/03/2023</a:t>
+              <a:t>31/03/2023</a:t>
             </a:fld>
             <a:endParaRPr lang="nl-NL" dirty="0"/>
           </a:p>
@@ -3947,7 +3947,7 @@
           <a:p>
             <a:fld id="{ADC442C5-A06B-4C52-BB6E-6946CDC12E38}" type="datetime1">
               <a:rPr lang="nl-BE" smtClean="0"/>
-              <a:t>30/03/2023</a:t>
+              <a:t>31/03/2023</a:t>
             </a:fld>
             <a:endParaRPr lang="nl-NL" dirty="0"/>
           </a:p>
@@ -4588,7 +4588,7 @@
           <a:p>
             <a:fld id="{39D20C4C-7810-465D-8480-DA5686803D3E}" type="datetime1">
               <a:rPr lang="nl-BE" smtClean="0"/>
-              <a:t>30/03/2023</a:t>
+              <a:t>31/03/2023</a:t>
             </a:fld>
             <a:endParaRPr lang="nl-NL" dirty="0"/>
           </a:p>
@@ -5431,7 +5431,7 @@
             </a:pPr>
             <a:r>
               <a:rPr lang="nl-BE" dirty="0"/>
-              <a:t>Onderdelen</a:t>
+              <a:t>Stappen</a:t>
             </a:r>
           </a:p>
           <a:p>
@@ -5708,7 +5708,7 @@
                   </a:schemeClr>
                 </a:solidFill>
               </a:rPr>
-              <a:t>Onderdelen</a:t>
+              <a:t>Stappen</a:t>
             </a:r>
           </a:p>
           <a:p>
@@ -6242,7 +6242,7 @@
                   </a:schemeClr>
                 </a:solidFill>
               </a:rPr>
-              <a:t>Onderdelen</a:t>
+              <a:t>Stappen</a:t>
             </a:r>
           </a:p>
           <a:p>
@@ -6963,7 +6963,7 @@
                   </a:schemeClr>
                 </a:solidFill>
               </a:rPr>
-              <a:t>Onderdelen</a:t>
+              <a:t>Stappen</a:t>
             </a:r>
           </a:p>
           <a:p>
@@ -7484,7 +7484,7 @@
                   </a:schemeClr>
                 </a:solidFill>
               </a:rPr>
-              <a:t>Onderdelen</a:t>
+              <a:t>Stappen</a:t>
             </a:r>
           </a:p>
           <a:p>
@@ -7755,7 +7755,7 @@
             </a:pPr>
             <a:r>
               <a:rPr lang="nl-BE" dirty="0"/>
-              <a:t>Onderdelen</a:t>
+              <a:t>Stappen</a:t>
             </a:r>
           </a:p>
           <a:p>
@@ -8287,7 +8287,7 @@
                   </a:schemeClr>
                 </a:solidFill>
               </a:rPr>
-              <a:t>Onderdelen</a:t>
+              <a:t>Stappen</a:t>
             </a:r>
           </a:p>
           <a:p>
@@ -8815,7 +8815,7 @@
                   </a:schemeClr>
                 </a:solidFill>
               </a:rPr>
-              <a:t>Onderdelen</a:t>
+              <a:t>Stappen</a:t>
             </a:r>
           </a:p>
           <a:p>
@@ -9265,7 +9265,7 @@
                   </a:schemeClr>
                 </a:solidFill>
               </a:rPr>
-              <a:t>Onderdelen</a:t>
+              <a:t>Stappen</a:t>
             </a:r>
           </a:p>
           <a:p>
@@ -10087,7 +10087,7 @@
                   </a:schemeClr>
                 </a:solidFill>
               </a:rPr>
-              <a:t>Onderdelen</a:t>
+              <a:t>Stappen</a:t>
             </a:r>
           </a:p>
           <a:p>

</xml_diff>